<commit_message>
Fix typo on Title slide
</commit_message>
<xml_diff>
--- a/slides/advanced_intro.pptx
+++ b/slides/advanced_intro.pptx
@@ -260,7 +260,7 @@
             <a:fld id="{92597E5C-85BB-4669-9209-B5E04E6ED101}" type="datetimeFigureOut">
               <a:rPr lang="en-GB" smtClean="0"/>
               <a:pPr/>
-              <a:t>05/05/15</a:t>
+              <a:t>06/05/15</a:t>
             </a:fld>
             <a:endParaRPr lang="en-GB"/>
           </a:p>
@@ -971,7 +971,7 @@
             <a:fld id="{19E03964-7D59-4BF8-AE10-3A215A42C3E4}" type="datetime1">
               <a:rPr lang="en-GB" smtClean="0"/>
               <a:pPr/>
-              <a:t>05/05/15</a:t>
+              <a:t>06/05/15</a:t>
             </a:fld>
             <a:endParaRPr lang="en-GB"/>
           </a:p>
@@ -1138,7 +1138,7 @@
             <a:fld id="{8E5ADEB7-8139-4AC1-94DC-FE9E54B1CCD2}" type="datetime1">
               <a:rPr lang="en-GB" smtClean="0"/>
               <a:pPr/>
-              <a:t>05/05/15</a:t>
+              <a:t>06/05/15</a:t>
             </a:fld>
             <a:endParaRPr lang="en-GB"/>
           </a:p>
@@ -1315,7 +1315,7 @@
             <a:fld id="{9C77A686-1785-49A1-B4C9-55A3C7EEADE4}" type="datetime1">
               <a:rPr lang="en-GB" smtClean="0"/>
               <a:pPr/>
-              <a:t>05/05/15</a:t>
+              <a:t>06/05/15</a:t>
             </a:fld>
             <a:endParaRPr lang="en-GB"/>
           </a:p>
@@ -1554,7 +1554,7 @@
             <a:fld id="{19E03964-7D59-4BF8-AE10-3A215A42C3E4}" type="datetime1">
               <a:rPr lang="en-GB" smtClean="0"/>
               <a:pPr/>
-              <a:t>05/05/15</a:t>
+              <a:t>06/05/15</a:t>
             </a:fld>
             <a:endParaRPr lang="en-GB"/>
           </a:p>
@@ -1721,7 +1721,7 @@
             <a:fld id="{D65327FA-D1E5-40CA-8941-3DD0B6730F8A}" type="datetime1">
               <a:rPr lang="en-GB" smtClean="0"/>
               <a:pPr/>
-              <a:t>05/05/15</a:t>
+              <a:t>06/05/15</a:t>
             </a:fld>
             <a:endParaRPr lang="en-GB"/>
           </a:p>
@@ -1964,7 +1964,7 @@
             <a:fld id="{DB33F153-90AC-449F-A303-26940247ABC8}" type="datetime1">
               <a:rPr lang="en-GB" smtClean="0"/>
               <a:pPr/>
-              <a:t>05/05/15</a:t>
+              <a:t>06/05/15</a:t>
             </a:fld>
             <a:endParaRPr lang="en-GB"/>
           </a:p>
@@ -2249,7 +2249,7 @@
             <a:fld id="{84E24492-3EA5-478D-9F72-7B8FF369DDEB}" type="datetime1">
               <a:rPr lang="en-GB" smtClean="0"/>
               <a:pPr/>
-              <a:t>05/05/15</a:t>
+              <a:t>06/05/15</a:t>
             </a:fld>
             <a:endParaRPr lang="en-GB"/>
           </a:p>
@@ -2668,7 +2668,7 @@
             <a:fld id="{43976A03-596E-4490-AE35-AFB744E08901}" type="datetime1">
               <a:rPr lang="en-GB" smtClean="0"/>
               <a:pPr/>
-              <a:t>05/05/15</a:t>
+              <a:t>06/05/15</a:t>
             </a:fld>
             <a:endParaRPr lang="en-GB"/>
           </a:p>
@@ -2783,7 +2783,7 @@
             <a:fld id="{4C8E3CB4-829C-4F19-9E86-B2AAEC36BD90}" type="datetime1">
               <a:rPr lang="en-GB" smtClean="0"/>
               <a:pPr/>
-              <a:t>05/05/15</a:t>
+              <a:t>06/05/15</a:t>
             </a:fld>
             <a:endParaRPr lang="en-GB"/>
           </a:p>
@@ -2875,7 +2875,7 @@
             <a:fld id="{D4A6FE01-96D8-461F-B1B2-1F0C16D98900}" type="datetime1">
               <a:rPr lang="en-GB" smtClean="0"/>
               <a:pPr/>
-              <a:t>05/05/15</a:t>
+              <a:t>06/05/15</a:t>
             </a:fld>
             <a:endParaRPr lang="en-GB"/>
           </a:p>
@@ -3149,7 +3149,7 @@
             <a:fld id="{B24CB088-CFF7-44C4-9CCE-18845754E6D4}" type="datetime1">
               <a:rPr lang="en-GB" smtClean="0"/>
               <a:pPr/>
-              <a:t>05/05/15</a:t>
+              <a:t>06/05/15</a:t>
             </a:fld>
             <a:endParaRPr lang="en-GB"/>
           </a:p>
@@ -3316,7 +3316,7 @@
             <a:fld id="{D65327FA-D1E5-40CA-8941-3DD0B6730F8A}" type="datetime1">
               <a:rPr lang="en-GB" smtClean="0"/>
               <a:pPr/>
-              <a:t>05/05/15</a:t>
+              <a:t>06/05/15</a:t>
             </a:fld>
             <a:endParaRPr lang="en-GB"/>
           </a:p>
@@ -3570,7 +3570,7 @@
             <a:fld id="{CD3A280C-4DEC-4EEC-BD59-A30886E06BA1}" type="datetime1">
               <a:rPr lang="en-GB" smtClean="0"/>
               <a:pPr/>
-              <a:t>05/05/15</a:t>
+              <a:t>06/05/15</a:t>
             </a:fld>
             <a:endParaRPr lang="en-GB"/>
           </a:p>
@@ -3737,7 +3737,7 @@
             <a:fld id="{8E5ADEB7-8139-4AC1-94DC-FE9E54B1CCD2}" type="datetime1">
               <a:rPr lang="en-GB" smtClean="0"/>
               <a:pPr/>
-              <a:t>05/05/15</a:t>
+              <a:t>06/05/15</a:t>
             </a:fld>
             <a:endParaRPr lang="en-GB"/>
           </a:p>
@@ -3914,7 +3914,7 @@
             <a:fld id="{9C77A686-1785-49A1-B4C9-55A3C7EEADE4}" type="datetime1">
               <a:rPr lang="en-GB" smtClean="0"/>
               <a:pPr/>
-              <a:t>05/05/15</a:t>
+              <a:t>06/05/15</a:t>
             </a:fld>
             <a:endParaRPr lang="en-GB"/>
           </a:p>
@@ -4464,7 +4464,7 @@
             <a:fld id="{DB33F153-90AC-449F-A303-26940247ABC8}" type="datetime1">
               <a:rPr lang="en-GB" smtClean="0"/>
               <a:pPr/>
-              <a:t>05/05/15</a:t>
+              <a:t>06/05/15</a:t>
             </a:fld>
             <a:endParaRPr lang="en-GB"/>
           </a:p>
@@ -4749,7 +4749,7 @@
             <a:fld id="{84E24492-3EA5-478D-9F72-7B8FF369DDEB}" type="datetime1">
               <a:rPr lang="en-GB" smtClean="0"/>
               <a:pPr/>
-              <a:t>05/05/15</a:t>
+              <a:t>06/05/15</a:t>
             </a:fld>
             <a:endParaRPr lang="en-GB"/>
           </a:p>
@@ -5168,7 +5168,7 @@
             <a:fld id="{43976A03-596E-4490-AE35-AFB744E08901}" type="datetime1">
               <a:rPr lang="en-GB" smtClean="0"/>
               <a:pPr/>
-              <a:t>05/05/15</a:t>
+              <a:t>06/05/15</a:t>
             </a:fld>
             <a:endParaRPr lang="en-GB"/>
           </a:p>
@@ -5283,7 +5283,7 @@
             <a:fld id="{4C8E3CB4-829C-4F19-9E86-B2AAEC36BD90}" type="datetime1">
               <a:rPr lang="en-GB" smtClean="0"/>
               <a:pPr/>
-              <a:t>05/05/15</a:t>
+              <a:t>06/05/15</a:t>
             </a:fld>
             <a:endParaRPr lang="en-GB"/>
           </a:p>
@@ -5375,7 +5375,7 @@
             <a:fld id="{D4A6FE01-96D8-461F-B1B2-1F0C16D98900}" type="datetime1">
               <a:rPr lang="en-GB" smtClean="0"/>
               <a:pPr/>
-              <a:t>05/05/15</a:t>
+              <a:t>06/05/15</a:t>
             </a:fld>
             <a:endParaRPr lang="en-GB"/>
           </a:p>
@@ -5649,7 +5649,7 @@
             <a:fld id="{B24CB088-CFF7-44C4-9CCE-18845754E6D4}" type="datetime1">
               <a:rPr lang="en-GB" smtClean="0"/>
               <a:pPr/>
-              <a:t>05/05/15</a:t>
+              <a:t>06/05/15</a:t>
             </a:fld>
             <a:endParaRPr lang="en-GB"/>
           </a:p>
@@ -5903,7 +5903,7 @@
             <a:fld id="{CD3A280C-4DEC-4EEC-BD59-A30886E06BA1}" type="datetime1">
               <a:rPr lang="en-GB" smtClean="0"/>
               <a:pPr/>
-              <a:t>05/05/15</a:t>
+              <a:t>06/05/15</a:t>
             </a:fld>
             <a:endParaRPr lang="en-GB"/>
           </a:p>
@@ -6113,7 +6113,7 @@
             <a:fld id="{E222BC38-3FAE-415B-AD1C-2D338E3D6B03}" type="datetime1">
               <a:rPr lang="en-GB" smtClean="0"/>
               <a:pPr/>
-              <a:t>05/05/15</a:t>
+              <a:t>06/05/15</a:t>
             </a:fld>
             <a:endParaRPr lang="en-GB"/>
           </a:p>
@@ -6621,7 +6621,7 @@
             <a:fld id="{E222BC38-3FAE-415B-AD1C-2D338E3D6B03}" type="datetime1">
               <a:rPr lang="en-GB" smtClean="0"/>
               <a:pPr/>
-              <a:t>05/05/15</a:t>
+              <a:t>06/05/15</a:t>
             </a:fld>
             <a:endParaRPr lang="en-GB"/>
           </a:p>
@@ -7025,11 +7025,7 @@
             </a:br>
             <a:r>
               <a:rPr lang="en-GB" sz="5400" b="1" dirty="0" smtClean="0"/>
-              <a:t>Hands </a:t>
-            </a:r>
-            <a:r>
-              <a:rPr lang="en-GB" sz="5400" b="1" dirty="0" smtClean="0"/>
-              <a:t>On </a:t>
+              <a:t>Hands On </a:t>
             </a:r>
             <a:r>
               <a:rPr lang="en-GB" sz="5400" b="1" dirty="0" err="1" smtClean="0"/>
@@ -7177,17 +7173,7 @@
                   <a:schemeClr val="tx2"/>
                 </a:solidFill>
               </a:rPr>
-              <a:t> (UWE),</a:t>
-            </a:r>
-          </a:p>
-          <a:p>
-            <a:r>
-              <a:rPr lang="en-GB" sz="1600" dirty="0" err="1" smtClean="0">
-                <a:solidFill>
-                  <a:schemeClr val="tx2"/>
-                </a:solidFill>
-              </a:rPr>
-              <a:t>Deakin</a:t>
+              <a:t> (UWE)</a:t>
             </a:r>
             <a:r>
               <a:rPr lang="en-GB" sz="1600" dirty="0" smtClean="0">
@@ -7195,7 +7181,25 @@
                   <a:schemeClr val="tx2"/>
                 </a:solidFill>
               </a:rPr>
-              <a:t>, Dan Curran and Mike </a:t>
+              <a:t>,</a:t>
+            </a:r>
+          </a:p>
+          <a:p>
+            <a:r>
+              <a:rPr lang="en-GB" sz="1600" dirty="0" smtClean="0">
+                <a:solidFill>
+                  <a:schemeClr val="tx2"/>
+                </a:solidFill>
+              </a:rPr>
+              <a:t>Dan </a:t>
+            </a:r>
+            <a:r>
+              <a:rPr lang="en-GB" sz="1600" dirty="0" smtClean="0">
+                <a:solidFill>
+                  <a:schemeClr val="tx2"/>
+                </a:solidFill>
+              </a:rPr>
+              <a:t>Curran and Mike </a:t>
             </a:r>
             <a:r>
               <a:rPr lang="en-GB" sz="1600" dirty="0" err="1" smtClean="0">
@@ -8688,11 +8692,7 @@
           <a:p>
             <a:r>
               <a:rPr lang="en-US" dirty="0" smtClean="0"/>
-              <a:t>OpenCL </a:t>
-            </a:r>
-            <a:r>
-              <a:rPr lang="en-US" dirty="0" smtClean="0"/>
-              <a:t>progress</a:t>
+              <a:t>OpenCL progress</a:t>
             </a:r>
             <a:endParaRPr lang="en-US" dirty="0"/>
           </a:p>
@@ -8827,7 +8827,7 @@
         </p:nvSpPr>
         <p:spPr bwMode="auto">
           <a:xfrm>
-            <a:off x="6828624" y="2751667"/>
+            <a:off x="6737017" y="2751667"/>
             <a:ext cx="2346292" cy="2372154"/>
           </a:xfrm>
           <a:prstGeom prst="irregularSeal1">
@@ -10518,7 +10518,7 @@
         </p:nvSpPr>
         <p:spPr bwMode="auto">
           <a:xfrm>
-            <a:off x="6676479" y="3293031"/>
+            <a:off x="6584872" y="3293031"/>
             <a:ext cx="2607354" cy="1200329"/>
           </a:xfrm>
           <a:prstGeom prst="rect">
@@ -29740,11 +29740,7 @@
           <a:p>
             <a:r>
               <a:rPr lang="en-GB" dirty="0" smtClean="0"/>
-              <a:t>C++ </a:t>
-            </a:r>
-            <a:r>
-              <a:rPr lang="en-GB" dirty="0" smtClean="0"/>
-              <a:t>interface example</a:t>
+              <a:t>C++ interface example</a:t>
             </a:r>
             <a:endParaRPr lang="en-GB" dirty="0"/>
           </a:p>
@@ -30802,13 +30798,7 @@
               <a:rPr lang="en-GB" sz="1200" b="1" dirty="0" smtClean="0">
                 <a:latin typeface="Courier New Bold"/>
               </a:rPr>
-              <a:t>()</a:t>
-            </a:r>
-            <a:r>
-              <a:rPr lang="en-GB" sz="1200" b="1" dirty="0" smtClean="0">
-                <a:latin typeface="Courier New Bold"/>
-              </a:rPr>
-              <a:t>, </a:t>
+              <a:t>(), </a:t>
             </a:r>
             <a:r>
               <a:rPr lang="en-GB" sz="1200" b="1" dirty="0" err="1" smtClean="0">
@@ -30831,13 +30821,7 @@
               <a:rPr lang="en-GB" sz="1200" b="1" dirty="0" smtClean="0">
                 <a:latin typeface="Courier New Bold"/>
               </a:rPr>
-              <a:t>()</a:t>
-            </a:r>
-            <a:r>
-              <a:rPr lang="en-GB" sz="1200" b="1" dirty="0" smtClean="0">
-                <a:latin typeface="Courier New Bold"/>
-              </a:rPr>
-              <a:t>);</a:t>
+              <a:t>());</a:t>
             </a:r>
           </a:p>
           <a:p>
@@ -31237,17 +31221,8 @@
             </a:pPr>
             <a:r>
               <a:rPr lang="en-GB" b="1" dirty="0" smtClean="0"/>
-              <a:t>OpenCL </a:t>
-            </a:r>
-            <a:r>
-              <a:rPr lang="en-GB" b="1" dirty="0" smtClean="0"/>
-              <a:t>Reference </a:t>
-            </a:r>
-            <a:r>
-              <a:rPr lang="en-GB" b="1" dirty="0" smtClean="0"/>
-              <a:t>Cards</a:t>
-            </a:r>
-            <a:endParaRPr lang="en-GB" b="1" dirty="0" smtClean="0"/>
+              <a:t>OpenCL Reference Cards</a:t>
+            </a:r>
           </a:p>
           <a:p>
             <a:pPr marL="0" indent="0">
@@ -31381,11 +31356,7 @@
           <a:p>
             <a:r>
               <a:rPr lang="en-GB" dirty="0" smtClean="0"/>
-              <a:t>A quick recap of </a:t>
-            </a:r>
-            <a:r>
-              <a:rPr lang="en-GB" dirty="0" smtClean="0"/>
-              <a:t>OpenCL</a:t>
+              <a:t>A quick recap of OpenCL</a:t>
             </a:r>
             <a:endParaRPr lang="en-GB" dirty="0"/>
           </a:p>
@@ -31642,11 +31613,7 @@
             </a:pPr>
             <a:r>
               <a:rPr lang="en-GB" sz="2800" dirty="0" smtClean="0"/>
-              <a:t>From integrated CPUs in smart</a:t>
-            </a:r>
-            <a:r>
-              <a:rPr lang="en-GB" sz="2800" dirty="0" smtClean="0"/>
-              <a:t>phones, tablets and laptops through high-end desktops and servers with discrete GPUs</a:t>
+              <a:t>From integrated CPUs in smartphones, tablets and laptops through high-end desktops and servers with discrete GPUs</a:t>
             </a:r>
             <a:endParaRPr lang="en-GB" sz="2800" dirty="0">
               <a:solidFill>
@@ -32963,15 +32930,7 @@
           <a:p>
             <a:r>
               <a:rPr lang="en-GB" dirty="0" smtClean="0"/>
-              <a:t>Unlocking </a:t>
-            </a:r>
-            <a:r>
-              <a:rPr lang="en-GB" dirty="0" smtClean="0"/>
-              <a:t>this </a:t>
-            </a:r>
-            <a:r>
-              <a:rPr lang="en-GB" dirty="0" smtClean="0"/>
-              <a:t>potential</a:t>
+              <a:t>Unlocking this potential</a:t>
             </a:r>
             <a:endParaRPr lang="en-GB" dirty="0"/>
           </a:p>

</xml_diff>

<commit_message>
Add amd box connection info
</commit_message>
<xml_diff>
--- a/slides/advanced_intro.pptx
+++ b/slides/advanced_intro.pptx
@@ -264,7 +264,7 @@
             <a:fld id="{92597E5C-85BB-4669-9209-B5E04E6ED101}" type="datetimeFigureOut">
               <a:rPr lang="en-GB" smtClean="0"/>
               <a:pPr/>
-              <a:t>10/05/15</a:t>
+              <a:t>11/05/15</a:t>
             </a:fld>
             <a:endParaRPr lang="en-GB"/>
           </a:p>
@@ -1128,7 +1128,7 @@
             <a:fld id="{19E03964-7D59-4BF8-AE10-3A215A42C3E4}" type="datetime1">
               <a:rPr lang="en-GB" smtClean="0"/>
               <a:pPr/>
-              <a:t>10/05/15</a:t>
+              <a:t>11/05/15</a:t>
             </a:fld>
             <a:endParaRPr lang="en-GB"/>
           </a:p>
@@ -1295,7 +1295,7 @@
             <a:fld id="{8E5ADEB7-8139-4AC1-94DC-FE9E54B1CCD2}" type="datetime1">
               <a:rPr lang="en-GB" smtClean="0"/>
               <a:pPr/>
-              <a:t>10/05/15</a:t>
+              <a:t>11/05/15</a:t>
             </a:fld>
             <a:endParaRPr lang="en-GB"/>
           </a:p>
@@ -1472,7 +1472,7 @@
             <a:fld id="{9C77A686-1785-49A1-B4C9-55A3C7EEADE4}" type="datetime1">
               <a:rPr lang="en-GB" smtClean="0"/>
               <a:pPr/>
-              <a:t>10/05/15</a:t>
+              <a:t>11/05/15</a:t>
             </a:fld>
             <a:endParaRPr lang="en-GB"/>
           </a:p>
@@ -1711,7 +1711,7 @@
             <a:fld id="{19E03964-7D59-4BF8-AE10-3A215A42C3E4}" type="datetime1">
               <a:rPr lang="en-GB" smtClean="0"/>
               <a:pPr/>
-              <a:t>10/05/15</a:t>
+              <a:t>11/05/15</a:t>
             </a:fld>
             <a:endParaRPr lang="en-GB"/>
           </a:p>
@@ -1878,7 +1878,7 @@
             <a:fld id="{D65327FA-D1E5-40CA-8941-3DD0B6730F8A}" type="datetime1">
               <a:rPr lang="en-GB" smtClean="0"/>
               <a:pPr/>
-              <a:t>10/05/15</a:t>
+              <a:t>11/05/15</a:t>
             </a:fld>
             <a:endParaRPr lang="en-GB"/>
           </a:p>
@@ -2121,7 +2121,7 @@
             <a:fld id="{DB33F153-90AC-449F-A303-26940247ABC8}" type="datetime1">
               <a:rPr lang="en-GB" smtClean="0"/>
               <a:pPr/>
-              <a:t>10/05/15</a:t>
+              <a:t>11/05/15</a:t>
             </a:fld>
             <a:endParaRPr lang="en-GB"/>
           </a:p>
@@ -2406,7 +2406,7 @@
             <a:fld id="{84E24492-3EA5-478D-9F72-7B8FF369DDEB}" type="datetime1">
               <a:rPr lang="en-GB" smtClean="0"/>
               <a:pPr/>
-              <a:t>10/05/15</a:t>
+              <a:t>11/05/15</a:t>
             </a:fld>
             <a:endParaRPr lang="en-GB"/>
           </a:p>
@@ -2825,7 +2825,7 @@
             <a:fld id="{43976A03-596E-4490-AE35-AFB744E08901}" type="datetime1">
               <a:rPr lang="en-GB" smtClean="0"/>
               <a:pPr/>
-              <a:t>10/05/15</a:t>
+              <a:t>11/05/15</a:t>
             </a:fld>
             <a:endParaRPr lang="en-GB"/>
           </a:p>
@@ -2940,7 +2940,7 @@
             <a:fld id="{4C8E3CB4-829C-4F19-9E86-B2AAEC36BD90}" type="datetime1">
               <a:rPr lang="en-GB" smtClean="0"/>
               <a:pPr/>
-              <a:t>10/05/15</a:t>
+              <a:t>11/05/15</a:t>
             </a:fld>
             <a:endParaRPr lang="en-GB"/>
           </a:p>
@@ -3032,7 +3032,7 @@
             <a:fld id="{D4A6FE01-96D8-461F-B1B2-1F0C16D98900}" type="datetime1">
               <a:rPr lang="en-GB" smtClean="0"/>
               <a:pPr/>
-              <a:t>10/05/15</a:t>
+              <a:t>11/05/15</a:t>
             </a:fld>
             <a:endParaRPr lang="en-GB"/>
           </a:p>
@@ -3306,7 +3306,7 @@
             <a:fld id="{B24CB088-CFF7-44C4-9CCE-18845754E6D4}" type="datetime1">
               <a:rPr lang="en-GB" smtClean="0"/>
               <a:pPr/>
-              <a:t>10/05/15</a:t>
+              <a:t>11/05/15</a:t>
             </a:fld>
             <a:endParaRPr lang="en-GB"/>
           </a:p>
@@ -3473,7 +3473,7 @@
             <a:fld id="{D65327FA-D1E5-40CA-8941-3DD0B6730F8A}" type="datetime1">
               <a:rPr lang="en-GB" smtClean="0"/>
               <a:pPr/>
-              <a:t>10/05/15</a:t>
+              <a:t>11/05/15</a:t>
             </a:fld>
             <a:endParaRPr lang="en-GB"/>
           </a:p>
@@ -3727,7 +3727,7 @@
             <a:fld id="{CD3A280C-4DEC-4EEC-BD59-A30886E06BA1}" type="datetime1">
               <a:rPr lang="en-GB" smtClean="0"/>
               <a:pPr/>
-              <a:t>10/05/15</a:t>
+              <a:t>11/05/15</a:t>
             </a:fld>
             <a:endParaRPr lang="en-GB"/>
           </a:p>
@@ -3894,7 +3894,7 @@
             <a:fld id="{8E5ADEB7-8139-4AC1-94DC-FE9E54B1CCD2}" type="datetime1">
               <a:rPr lang="en-GB" smtClean="0"/>
               <a:pPr/>
-              <a:t>10/05/15</a:t>
+              <a:t>11/05/15</a:t>
             </a:fld>
             <a:endParaRPr lang="en-GB"/>
           </a:p>
@@ -4071,7 +4071,7 @@
             <a:fld id="{9C77A686-1785-49A1-B4C9-55A3C7EEADE4}" type="datetime1">
               <a:rPr lang="en-GB" smtClean="0"/>
               <a:pPr/>
-              <a:t>10/05/15</a:t>
+              <a:t>11/05/15</a:t>
             </a:fld>
             <a:endParaRPr lang="en-GB"/>
           </a:p>
@@ -4621,7 +4621,7 @@
             <a:fld id="{DB33F153-90AC-449F-A303-26940247ABC8}" type="datetime1">
               <a:rPr lang="en-GB" smtClean="0"/>
               <a:pPr/>
-              <a:t>10/05/15</a:t>
+              <a:t>11/05/15</a:t>
             </a:fld>
             <a:endParaRPr lang="en-GB"/>
           </a:p>
@@ -4906,7 +4906,7 @@
             <a:fld id="{84E24492-3EA5-478D-9F72-7B8FF369DDEB}" type="datetime1">
               <a:rPr lang="en-GB" smtClean="0"/>
               <a:pPr/>
-              <a:t>10/05/15</a:t>
+              <a:t>11/05/15</a:t>
             </a:fld>
             <a:endParaRPr lang="en-GB"/>
           </a:p>
@@ -5325,7 +5325,7 @@
             <a:fld id="{43976A03-596E-4490-AE35-AFB744E08901}" type="datetime1">
               <a:rPr lang="en-GB" smtClean="0"/>
               <a:pPr/>
-              <a:t>10/05/15</a:t>
+              <a:t>11/05/15</a:t>
             </a:fld>
             <a:endParaRPr lang="en-GB"/>
           </a:p>
@@ -5440,7 +5440,7 @@
             <a:fld id="{4C8E3CB4-829C-4F19-9E86-B2AAEC36BD90}" type="datetime1">
               <a:rPr lang="en-GB" smtClean="0"/>
               <a:pPr/>
-              <a:t>10/05/15</a:t>
+              <a:t>11/05/15</a:t>
             </a:fld>
             <a:endParaRPr lang="en-GB"/>
           </a:p>
@@ -5532,7 +5532,7 @@
             <a:fld id="{D4A6FE01-96D8-461F-B1B2-1F0C16D98900}" type="datetime1">
               <a:rPr lang="en-GB" smtClean="0"/>
               <a:pPr/>
-              <a:t>10/05/15</a:t>
+              <a:t>11/05/15</a:t>
             </a:fld>
             <a:endParaRPr lang="en-GB"/>
           </a:p>
@@ -5806,7 +5806,7 @@
             <a:fld id="{B24CB088-CFF7-44C4-9CCE-18845754E6D4}" type="datetime1">
               <a:rPr lang="en-GB" smtClean="0"/>
               <a:pPr/>
-              <a:t>10/05/15</a:t>
+              <a:t>11/05/15</a:t>
             </a:fld>
             <a:endParaRPr lang="en-GB"/>
           </a:p>
@@ -6060,7 +6060,7 @@
             <a:fld id="{CD3A280C-4DEC-4EEC-BD59-A30886E06BA1}" type="datetime1">
               <a:rPr lang="en-GB" smtClean="0"/>
               <a:pPr/>
-              <a:t>10/05/15</a:t>
+              <a:t>11/05/15</a:t>
             </a:fld>
             <a:endParaRPr lang="en-GB"/>
           </a:p>
@@ -6270,7 +6270,7 @@
             <a:fld id="{E222BC38-3FAE-415B-AD1C-2D338E3D6B03}" type="datetime1">
               <a:rPr lang="en-GB" smtClean="0"/>
               <a:pPr/>
-              <a:t>10/05/15</a:t>
+              <a:t>11/05/15</a:t>
             </a:fld>
             <a:endParaRPr lang="en-GB"/>
           </a:p>
@@ -6778,7 +6778,7 @@
             <a:fld id="{E222BC38-3FAE-415B-AD1C-2D338E3D6B03}" type="datetime1">
               <a:rPr lang="en-GB" smtClean="0"/>
               <a:pPr/>
-              <a:t>10/05/15</a:t>
+              <a:t>11/05/15</a:t>
             </a:fld>
             <a:endParaRPr lang="en-GB"/>
           </a:p>
@@ -32756,16 +32756,67 @@
                 </a:solidFill>
                 <a:latin typeface="Courier New"/>
                 <a:cs typeface="Courier New"/>
+                <a:hlinkClick r:id="rId2"/>
               </a:rPr>
               <a:t>user</a:t>
+            </a:r>
+            <a:r>
+              <a:rPr lang="en-US" dirty="0" smtClean="0">
+                <a:latin typeface="Courier New"/>
+                <a:cs typeface="Courier New"/>
+                <a:hlinkClick r:id="rId2"/>
+              </a:rPr>
+              <a:t>@192.168.2.2</a:t>
+            </a:r>
+            <a:endParaRPr lang="en-US" dirty="0" smtClean="0">
+              <a:latin typeface="Courier New"/>
+              <a:cs typeface="Courier New"/>
+            </a:endParaRPr>
+          </a:p>
+          <a:p>
+            <a:pPr lvl="1"/>
+            <a:r>
+              <a:rPr lang="en-US" dirty="0" smtClean="0">
+                <a:latin typeface="+mj-lt"/>
+                <a:cs typeface="Courier New"/>
+              </a:rPr>
+              <a:t>Connect via FirePro5 or FirePro24 </a:t>
+            </a:r>
+            <a:r>
+              <a:rPr lang="en-US" dirty="0" err="1" smtClean="0">
+                <a:latin typeface="+mj-lt"/>
+                <a:cs typeface="Courier New"/>
+              </a:rPr>
+              <a:t>WiFi</a:t>
+            </a:r>
+            <a:r>
+              <a:rPr lang="en-US" dirty="0" smtClean="0">
+                <a:latin typeface="+mj-lt"/>
+                <a:cs typeface="Courier New"/>
+              </a:rPr>
+              <a:t> network.</a:t>
+            </a:r>
+          </a:p>
+          <a:p>
+            <a:pPr lvl="1"/>
+            <a:r>
+              <a:rPr lang="en-US" dirty="0" smtClean="0">
+                <a:latin typeface="+mj-lt"/>
+                <a:cs typeface="Courier New"/>
+              </a:rPr>
+              <a:t>Key is </a:t>
             </a:r>
             <a:r>
               <a:rPr lang="en-US" dirty="0" smtClean="0">
                 <a:latin typeface="Courier New"/>
                 <a:cs typeface="Courier New"/>
               </a:rPr>
-              <a:t>@?</a:t>
-            </a:r>
+              <a:t>firepros9150</a:t>
+            </a:r>
+            <a:endParaRPr lang="en-US" dirty="0" smtClean="0">
+              <a:latin typeface="Courier New"/>
+              <a:cs typeface="Courier New"/>
+            </a:endParaRPr>
           </a:p>
           <a:p>
             <a:r>

</xml_diff>

<commit_message>
Add instructions for zoo login
</commit_message>
<xml_diff>
--- a/slides/advanced_intro.pptx
+++ b/slides/advanced_intro.pptx
@@ -264,7 +264,7 @@
             <a:fld id="{92597E5C-85BB-4669-9209-B5E04E6ED101}" type="datetimeFigureOut">
               <a:rPr lang="en-GB" smtClean="0"/>
               <a:pPr/>
-              <a:t>11/05/15</a:t>
+              <a:t>13/04/16</a:t>
             </a:fld>
             <a:endParaRPr lang="en-GB"/>
           </a:p>
@@ -1128,7 +1128,7 @@
             <a:fld id="{19E03964-7D59-4BF8-AE10-3A215A42C3E4}" type="datetime1">
               <a:rPr lang="en-GB" smtClean="0"/>
               <a:pPr/>
-              <a:t>11/05/15</a:t>
+              <a:t>13/04/16</a:t>
             </a:fld>
             <a:endParaRPr lang="en-GB"/>
           </a:p>
@@ -1295,7 +1295,7 @@
             <a:fld id="{8E5ADEB7-8139-4AC1-94DC-FE9E54B1CCD2}" type="datetime1">
               <a:rPr lang="en-GB" smtClean="0"/>
               <a:pPr/>
-              <a:t>11/05/15</a:t>
+              <a:t>13/04/16</a:t>
             </a:fld>
             <a:endParaRPr lang="en-GB"/>
           </a:p>
@@ -1472,7 +1472,7 @@
             <a:fld id="{9C77A686-1785-49A1-B4C9-55A3C7EEADE4}" type="datetime1">
               <a:rPr lang="en-GB" smtClean="0"/>
               <a:pPr/>
-              <a:t>11/05/15</a:t>
+              <a:t>13/04/16</a:t>
             </a:fld>
             <a:endParaRPr lang="en-GB"/>
           </a:p>
@@ -1711,7 +1711,7 @@
             <a:fld id="{19E03964-7D59-4BF8-AE10-3A215A42C3E4}" type="datetime1">
               <a:rPr lang="en-GB" smtClean="0"/>
               <a:pPr/>
-              <a:t>11/05/15</a:t>
+              <a:t>13/04/16</a:t>
             </a:fld>
             <a:endParaRPr lang="en-GB"/>
           </a:p>
@@ -1878,7 +1878,7 @@
             <a:fld id="{D65327FA-D1E5-40CA-8941-3DD0B6730F8A}" type="datetime1">
               <a:rPr lang="en-GB" smtClean="0"/>
               <a:pPr/>
-              <a:t>11/05/15</a:t>
+              <a:t>13/04/16</a:t>
             </a:fld>
             <a:endParaRPr lang="en-GB"/>
           </a:p>
@@ -2121,7 +2121,7 @@
             <a:fld id="{DB33F153-90AC-449F-A303-26940247ABC8}" type="datetime1">
               <a:rPr lang="en-GB" smtClean="0"/>
               <a:pPr/>
-              <a:t>11/05/15</a:t>
+              <a:t>13/04/16</a:t>
             </a:fld>
             <a:endParaRPr lang="en-GB"/>
           </a:p>
@@ -2406,7 +2406,7 @@
             <a:fld id="{84E24492-3EA5-478D-9F72-7B8FF369DDEB}" type="datetime1">
               <a:rPr lang="en-GB" smtClean="0"/>
               <a:pPr/>
-              <a:t>11/05/15</a:t>
+              <a:t>13/04/16</a:t>
             </a:fld>
             <a:endParaRPr lang="en-GB"/>
           </a:p>
@@ -2825,7 +2825,7 @@
             <a:fld id="{43976A03-596E-4490-AE35-AFB744E08901}" type="datetime1">
               <a:rPr lang="en-GB" smtClean="0"/>
               <a:pPr/>
-              <a:t>11/05/15</a:t>
+              <a:t>13/04/16</a:t>
             </a:fld>
             <a:endParaRPr lang="en-GB"/>
           </a:p>
@@ -2940,7 +2940,7 @@
             <a:fld id="{4C8E3CB4-829C-4F19-9E86-B2AAEC36BD90}" type="datetime1">
               <a:rPr lang="en-GB" smtClean="0"/>
               <a:pPr/>
-              <a:t>11/05/15</a:t>
+              <a:t>13/04/16</a:t>
             </a:fld>
             <a:endParaRPr lang="en-GB"/>
           </a:p>
@@ -3032,7 +3032,7 @@
             <a:fld id="{D4A6FE01-96D8-461F-B1B2-1F0C16D98900}" type="datetime1">
               <a:rPr lang="en-GB" smtClean="0"/>
               <a:pPr/>
-              <a:t>11/05/15</a:t>
+              <a:t>13/04/16</a:t>
             </a:fld>
             <a:endParaRPr lang="en-GB"/>
           </a:p>
@@ -3306,7 +3306,7 @@
             <a:fld id="{B24CB088-CFF7-44C4-9CCE-18845754E6D4}" type="datetime1">
               <a:rPr lang="en-GB" smtClean="0"/>
               <a:pPr/>
-              <a:t>11/05/15</a:t>
+              <a:t>13/04/16</a:t>
             </a:fld>
             <a:endParaRPr lang="en-GB"/>
           </a:p>
@@ -3473,7 +3473,7 @@
             <a:fld id="{D65327FA-D1E5-40CA-8941-3DD0B6730F8A}" type="datetime1">
               <a:rPr lang="en-GB" smtClean="0"/>
               <a:pPr/>
-              <a:t>11/05/15</a:t>
+              <a:t>13/04/16</a:t>
             </a:fld>
             <a:endParaRPr lang="en-GB"/>
           </a:p>
@@ -3727,7 +3727,7 @@
             <a:fld id="{CD3A280C-4DEC-4EEC-BD59-A30886E06BA1}" type="datetime1">
               <a:rPr lang="en-GB" smtClean="0"/>
               <a:pPr/>
-              <a:t>11/05/15</a:t>
+              <a:t>13/04/16</a:t>
             </a:fld>
             <a:endParaRPr lang="en-GB"/>
           </a:p>
@@ -3894,7 +3894,7 @@
             <a:fld id="{8E5ADEB7-8139-4AC1-94DC-FE9E54B1CCD2}" type="datetime1">
               <a:rPr lang="en-GB" smtClean="0"/>
               <a:pPr/>
-              <a:t>11/05/15</a:t>
+              <a:t>13/04/16</a:t>
             </a:fld>
             <a:endParaRPr lang="en-GB"/>
           </a:p>
@@ -4071,7 +4071,7 @@
             <a:fld id="{9C77A686-1785-49A1-B4C9-55A3C7EEADE4}" type="datetime1">
               <a:rPr lang="en-GB" smtClean="0"/>
               <a:pPr/>
-              <a:t>11/05/15</a:t>
+              <a:t>13/04/16</a:t>
             </a:fld>
             <a:endParaRPr lang="en-GB"/>
           </a:p>
@@ -4621,7 +4621,7 @@
             <a:fld id="{DB33F153-90AC-449F-A303-26940247ABC8}" type="datetime1">
               <a:rPr lang="en-GB" smtClean="0"/>
               <a:pPr/>
-              <a:t>11/05/15</a:t>
+              <a:t>13/04/16</a:t>
             </a:fld>
             <a:endParaRPr lang="en-GB"/>
           </a:p>
@@ -4906,7 +4906,7 @@
             <a:fld id="{84E24492-3EA5-478D-9F72-7B8FF369DDEB}" type="datetime1">
               <a:rPr lang="en-GB" smtClean="0"/>
               <a:pPr/>
-              <a:t>11/05/15</a:t>
+              <a:t>13/04/16</a:t>
             </a:fld>
             <a:endParaRPr lang="en-GB"/>
           </a:p>
@@ -5325,7 +5325,7 @@
             <a:fld id="{43976A03-596E-4490-AE35-AFB744E08901}" type="datetime1">
               <a:rPr lang="en-GB" smtClean="0"/>
               <a:pPr/>
-              <a:t>11/05/15</a:t>
+              <a:t>13/04/16</a:t>
             </a:fld>
             <a:endParaRPr lang="en-GB"/>
           </a:p>
@@ -5440,7 +5440,7 @@
             <a:fld id="{4C8E3CB4-829C-4F19-9E86-B2AAEC36BD90}" type="datetime1">
               <a:rPr lang="en-GB" smtClean="0"/>
               <a:pPr/>
-              <a:t>11/05/15</a:t>
+              <a:t>13/04/16</a:t>
             </a:fld>
             <a:endParaRPr lang="en-GB"/>
           </a:p>
@@ -5532,7 +5532,7 @@
             <a:fld id="{D4A6FE01-96D8-461F-B1B2-1F0C16D98900}" type="datetime1">
               <a:rPr lang="en-GB" smtClean="0"/>
               <a:pPr/>
-              <a:t>11/05/15</a:t>
+              <a:t>13/04/16</a:t>
             </a:fld>
             <a:endParaRPr lang="en-GB"/>
           </a:p>
@@ -5806,7 +5806,7 @@
             <a:fld id="{B24CB088-CFF7-44C4-9CCE-18845754E6D4}" type="datetime1">
               <a:rPr lang="en-GB" smtClean="0"/>
               <a:pPr/>
-              <a:t>11/05/15</a:t>
+              <a:t>13/04/16</a:t>
             </a:fld>
             <a:endParaRPr lang="en-GB"/>
           </a:p>
@@ -6060,7 +6060,7 @@
             <a:fld id="{CD3A280C-4DEC-4EEC-BD59-A30886E06BA1}" type="datetime1">
               <a:rPr lang="en-GB" smtClean="0"/>
               <a:pPr/>
-              <a:t>11/05/15</a:t>
+              <a:t>13/04/16</a:t>
             </a:fld>
             <a:endParaRPr lang="en-GB"/>
           </a:p>
@@ -6270,7 +6270,7 @@
             <a:fld id="{E222BC38-3FAE-415B-AD1C-2D338E3D6B03}" type="datetime1">
               <a:rPr lang="en-GB" smtClean="0"/>
               <a:pPr/>
-              <a:t>11/05/15</a:t>
+              <a:t>13/04/16</a:t>
             </a:fld>
             <a:endParaRPr lang="en-GB"/>
           </a:p>
@@ -6778,7 +6778,7 @@
             <a:fld id="{E222BC38-3FAE-415B-AD1C-2D338E3D6B03}" type="datetime1">
               <a:rPr lang="en-GB" smtClean="0"/>
               <a:pPr/>
-              <a:t>11/05/15</a:t>
+              <a:t>13/04/16</a:t>
             </a:fld>
             <a:endParaRPr lang="en-GB"/>
           </a:p>
@@ -32733,99 +32733,21 @@
                 <a:latin typeface="Trebuchet MS"/>
                 <a:cs typeface="Trebuchet MS"/>
               </a:rPr>
-              <a:t>HP/AMD: </a:t>
-            </a:r>
-            <a:r>
-              <a:rPr lang="en-US" dirty="0" err="1" smtClean="0">
-                <a:latin typeface="Courier New"/>
-                <a:cs typeface="Courier New"/>
-              </a:rPr>
-              <a:t>ssh</a:t>
-            </a:r>
-            <a:r>
-              <a:rPr lang="en-US" dirty="0" smtClean="0">
-                <a:latin typeface="Courier New"/>
-                <a:cs typeface="Courier New"/>
-              </a:rPr>
-              <a:t> </a:t>
-            </a:r>
-            <a:r>
-              <a:rPr lang="en-US" i="1" dirty="0" smtClean="0">
-                <a:solidFill>
-                  <a:srgbClr val="0000FF"/>
-                </a:solidFill>
-                <a:latin typeface="Courier New"/>
-                <a:cs typeface="Courier New"/>
-                <a:hlinkClick r:id="rId2"/>
-              </a:rPr>
-              <a:t>user</a:t>
-            </a:r>
-            <a:r>
-              <a:rPr lang="en-US" dirty="0" smtClean="0">
-                <a:latin typeface="Courier New"/>
-                <a:cs typeface="Courier New"/>
-                <a:hlinkClick r:id="rId2"/>
-              </a:rPr>
-              <a:t>@192.168.2.2</a:t>
-            </a:r>
-            <a:endParaRPr lang="en-US" dirty="0" smtClean="0">
-              <a:latin typeface="Courier New"/>
-              <a:cs typeface="Courier New"/>
-            </a:endParaRPr>
-          </a:p>
-          <a:p>
-            <a:pPr lvl="1"/>
-            <a:r>
-              <a:rPr lang="en-US" dirty="0" smtClean="0">
-                <a:latin typeface="+mj-lt"/>
-                <a:cs typeface="Courier New"/>
-              </a:rPr>
-              <a:t>Connect via FirePro5 or FirePro24 </a:t>
-            </a:r>
-            <a:r>
-              <a:rPr lang="en-US" dirty="0" err="1" smtClean="0">
-                <a:latin typeface="+mj-lt"/>
-                <a:cs typeface="Courier New"/>
-              </a:rPr>
-              <a:t>WiFi</a:t>
-            </a:r>
-            <a:r>
-              <a:rPr lang="en-US" dirty="0" smtClean="0">
-                <a:latin typeface="+mj-lt"/>
-                <a:cs typeface="Courier New"/>
-              </a:rPr>
-              <a:t> network.</a:t>
-            </a:r>
-          </a:p>
-          <a:p>
-            <a:pPr lvl="1"/>
-            <a:r>
-              <a:rPr lang="en-US" dirty="0" smtClean="0">
-                <a:latin typeface="+mj-lt"/>
-                <a:cs typeface="Courier New"/>
-              </a:rPr>
-              <a:t>Key is </a:t>
-            </a:r>
-            <a:r>
-              <a:rPr lang="en-US" dirty="0" smtClean="0">
-                <a:latin typeface="Courier New"/>
-                <a:cs typeface="Courier New"/>
-              </a:rPr>
-              <a:t>firepros9150</a:t>
-            </a:r>
-            <a:endParaRPr lang="en-US" dirty="0" smtClean="0">
-              <a:latin typeface="Courier New"/>
-              <a:cs typeface="Courier New"/>
-            </a:endParaRPr>
-          </a:p>
-          <a:p>
+              <a:t>Bristol </a:t>
+            </a:r>
             <a:r>
               <a:rPr lang="en-US" dirty="0" smtClean="0">
                 <a:latin typeface="Trebuchet MS"/>
                 <a:cs typeface="Trebuchet MS"/>
               </a:rPr>
-              <a:t>Zoo: </a:t>
-            </a:r>
+              <a:t>Zoo:</a:t>
+            </a:r>
+            <a:br>
+              <a:rPr lang="en-US" dirty="0" smtClean="0">
+                <a:latin typeface="Trebuchet MS"/>
+                <a:cs typeface="Trebuchet MS"/>
+              </a:rPr>
+            </a:br>
             <a:r>
               <a:rPr lang="en-US" dirty="0" err="1" smtClean="0">
                 <a:latin typeface="Courier New"/>
@@ -32868,14 +32790,22 @@
           <a:p>
             <a:r>
               <a:rPr lang="en-US" dirty="0" smtClean="0"/>
-              <a:t>Username: </a:t>
+              <a:t>Username (</a:t>
+            </a:r>
+            <a:r>
+              <a:rPr lang="en-US" dirty="0" err="1" smtClean="0"/>
+              <a:t>e.g</a:t>
+            </a:r>
+            <a:r>
+              <a:rPr lang="en-US" dirty="0" smtClean="0"/>
+              <a:t>): </a:t>
             </a:r>
             <a:r>
               <a:rPr lang="en-US" dirty="0" smtClean="0">
                 <a:latin typeface="Courier New"/>
                 <a:cs typeface="Courier New"/>
               </a:rPr>
-              <a:t>iwocl15train</a:t>
+              <a:t>train</a:t>
             </a:r>
             <a:r>
               <a:rPr lang="en-US" i="1" dirty="0" smtClean="0">
@@ -32885,8 +32815,15 @@
                 <a:latin typeface="Courier New"/>
                 <a:cs typeface="Courier New"/>
               </a:rPr>
-              <a:t>i</a:t>
-            </a:r>
+              <a:t>01</a:t>
+            </a:r>
+            <a:endParaRPr lang="en-US" i="1" dirty="0" smtClean="0">
+              <a:solidFill>
+                <a:srgbClr val="0000FF"/>
+              </a:solidFill>
+              <a:latin typeface="Courier New"/>
+              <a:cs typeface="Courier New"/>
+            </a:endParaRPr>
           </a:p>
           <a:p>
             <a:r>
@@ -32900,17 +32837,7 @@
                 <a:latin typeface="Courier New"/>
                 <a:cs typeface="Courier New"/>
               </a:rPr>
-              <a:t>iwocl15train</a:t>
-            </a:r>
-            <a:r>
-              <a:rPr lang="en-US" i="1" dirty="0" smtClean="0">
-                <a:solidFill>
-                  <a:srgbClr val="0000FF"/>
-                </a:solidFill>
-                <a:latin typeface="Courier New"/>
-                <a:cs typeface="Courier New"/>
-              </a:rPr>
-              <a:t>i+50</a:t>
+              <a:t>workshop</a:t>
             </a:r>
             <a:endParaRPr lang="en-US" i="1" dirty="0">
               <a:solidFill>

</xml_diff>

<commit_message>
Add info about intel sdk on zoo to slides
</commit_message>
<xml_diff>
--- a/slides/advanced_intro.pptx
+++ b/slides/advanced_intro.pptx
@@ -32707,7 +32707,11 @@
           <a:p>
             <a:r>
               <a:rPr lang="en-US" dirty="0" smtClean="0"/>
-              <a:t>Remote machines</a:t>
+              <a:t>Remote </a:t>
+            </a:r>
+            <a:r>
+              <a:rPr lang="en-US" dirty="0" smtClean="0"/>
+              <a:t>machine</a:t>
             </a:r>
             <a:endParaRPr lang="en-US" dirty="0"/>
           </a:p>
@@ -32725,7 +32729,9 @@
         </p:nvSpPr>
         <p:spPr/>
         <p:txBody>
-          <a:bodyPr/>
+          <a:bodyPr>
+            <a:normAutofit fontScale="92500" lnSpcReduction="20000"/>
+          </a:bodyPr>
           <a:lstStyle/>
           <a:p>
             <a:r>
@@ -32733,14 +32739,7 @@
                 <a:latin typeface="Trebuchet MS"/>
                 <a:cs typeface="Trebuchet MS"/>
               </a:rPr>
-              <a:t>Bristol </a:t>
-            </a:r>
-            <a:r>
-              <a:rPr lang="en-US" dirty="0" smtClean="0">
-                <a:latin typeface="Trebuchet MS"/>
-                <a:cs typeface="Trebuchet MS"/>
-              </a:rPr>
-              <a:t>Zoo:</a:t>
+              <a:t>Bristol Zoo:</a:t>
             </a:r>
             <a:br>
               <a:rPr lang="en-US" dirty="0" smtClean="0">
@@ -32817,7 +32816,24 @@
               </a:rPr>
               <a:t>01</a:t>
             </a:r>
-            <a:endParaRPr lang="en-US" i="1" dirty="0" smtClean="0">
+          </a:p>
+          <a:p>
+            <a:r>
+              <a:rPr lang="en-US" dirty="0" smtClean="0">
+                <a:cs typeface="Courier New"/>
+              </a:rPr>
+              <a:t>Password: </a:t>
+            </a:r>
+            <a:r>
+              <a:rPr lang="en-US" dirty="0" smtClean="0">
+                <a:latin typeface="Courier New"/>
+                <a:cs typeface="Courier New"/>
+              </a:rPr>
+              <a:t>workshop</a:t>
+            </a:r>
+          </a:p>
+          <a:p>
+            <a:endParaRPr lang="en-US" b="1" dirty="0" smtClean="0">
               <a:solidFill>
                 <a:srgbClr val="0000FF"/>
               </a:solidFill>
@@ -32827,21 +32843,109 @@
           </a:p>
           <a:p>
             <a:r>
-              <a:rPr lang="en-US" dirty="0" smtClean="0">
+              <a:rPr lang="en-US" b="1" dirty="0" smtClean="0">
+                <a:solidFill>
+                  <a:srgbClr val="000000"/>
+                </a:solidFill>
                 <a:cs typeface="Courier New"/>
               </a:rPr>
-              <a:t>Password: </a:t>
-            </a:r>
-            <a:r>
-              <a:rPr lang="en-US" dirty="0" smtClean="0">
+              <a:t>SSH into one of the nodes to run</a:t>
+            </a:r>
+          </a:p>
+          <a:p>
+            <a:endParaRPr lang="en-US" b="1" dirty="0" smtClean="0">
+              <a:solidFill>
+                <a:srgbClr val="000000"/>
+              </a:solidFill>
+              <a:cs typeface="Courier New"/>
+            </a:endParaRPr>
+          </a:p>
+          <a:p>
+            <a:r>
+              <a:rPr lang="en-US" b="1" dirty="0" smtClean="0">
+                <a:solidFill>
+                  <a:srgbClr val="000000"/>
+                </a:solidFill>
+                <a:cs typeface="Courier New"/>
+              </a:rPr>
+              <a:t>Load the Intel </a:t>
+            </a:r>
+            <a:r>
+              <a:rPr lang="en-US" b="1" dirty="0" err="1" smtClean="0">
+                <a:solidFill>
+                  <a:srgbClr val="000000"/>
+                </a:solidFill>
+                <a:cs typeface="Courier New"/>
+              </a:rPr>
+              <a:t>OpenCL</a:t>
+            </a:r>
+            <a:r>
+              <a:rPr lang="en-US" b="1" dirty="0" smtClean="0">
+                <a:solidFill>
+                  <a:srgbClr val="000000"/>
+                </a:solidFill>
+                <a:cs typeface="Courier New"/>
+              </a:rPr>
+              <a:t> SDK (for CPUs) with</a:t>
+            </a:r>
+          </a:p>
+          <a:p>
+            <a:pPr marL="0" indent="0">
+              <a:buNone/>
+            </a:pPr>
+            <a:r>
+              <a:rPr lang="en-US" dirty="0"/>
+              <a:t> </a:t>
+            </a:r>
+            <a:r>
+              <a:rPr lang="en-US" dirty="0" smtClean="0"/>
+              <a:t>  </a:t>
+            </a:r>
+            <a:r>
+              <a:rPr lang="en-US" sz="2600" dirty="0" smtClean="0">
                 <a:latin typeface="Courier New"/>
                 <a:cs typeface="Courier New"/>
               </a:rPr>
-              <a:t>workshop</a:t>
-            </a:r>
-            <a:endParaRPr lang="en-US" i="1" dirty="0">
+              <a:t>module </a:t>
+            </a:r>
+            <a:r>
+              <a:rPr lang="en-US" sz="2600" dirty="0">
+                <a:latin typeface="Courier New"/>
+                <a:cs typeface="Courier New"/>
+              </a:rPr>
+              <a:t>load </a:t>
+            </a:r>
+            <a:r>
+              <a:rPr lang="en-US" sz="2600" dirty="0" err="1">
+                <a:latin typeface="Courier New"/>
+                <a:cs typeface="Courier New"/>
+              </a:rPr>
+              <a:t>sdks</a:t>
+            </a:r>
+            <a:r>
+              <a:rPr lang="en-US" sz="2600" dirty="0">
+                <a:latin typeface="Courier New"/>
+                <a:cs typeface="Courier New"/>
+              </a:rPr>
+              <a:t>/</a:t>
+            </a:r>
+            <a:r>
+              <a:rPr lang="en-US" sz="2600" dirty="0" err="1">
+                <a:latin typeface="Courier New"/>
+                <a:cs typeface="Courier New"/>
+              </a:rPr>
+              <a:t>intel-opencl</a:t>
+            </a:r>
+            <a:r>
+              <a:rPr lang="en-US" sz="2600" dirty="0">
+                <a:latin typeface="Courier New"/>
+                <a:cs typeface="Courier New"/>
+              </a:rPr>
+              <a:t>/4.6.0.92</a:t>
+            </a:r>
+            <a:endParaRPr lang="en-US" b="1" dirty="0">
               <a:solidFill>
-                <a:srgbClr val="0000FF"/>
+                <a:srgbClr val="000000"/>
               </a:solidFill>
               <a:latin typeface="Courier New"/>
               <a:cs typeface="Courier New"/>

</xml_diff>

<commit_message>
Updated zip file links
Fixed zip file link to use IWOCL_2016.zip name.

Other minor improvements
</commit_message>
<xml_diff>
--- a/slides/advanced_intro.pptx
+++ b/slides/advanced_intro.pptx
@@ -264,7 +264,7 @@
             <a:fld id="{92597E5C-85BB-4669-9209-B5E04E6ED101}" type="datetimeFigureOut">
               <a:rPr lang="en-GB" smtClean="0"/>
               <a:pPr/>
-              <a:t>13/04/16</a:t>
+              <a:t>14/04/16</a:t>
             </a:fld>
             <a:endParaRPr lang="en-GB"/>
           </a:p>
@@ -1128,7 +1128,7 @@
             <a:fld id="{19E03964-7D59-4BF8-AE10-3A215A42C3E4}" type="datetime1">
               <a:rPr lang="en-GB" smtClean="0"/>
               <a:pPr/>
-              <a:t>13/04/16</a:t>
+              <a:t>14/04/16</a:t>
             </a:fld>
             <a:endParaRPr lang="en-GB"/>
           </a:p>
@@ -1295,7 +1295,7 @@
             <a:fld id="{8E5ADEB7-8139-4AC1-94DC-FE9E54B1CCD2}" type="datetime1">
               <a:rPr lang="en-GB" smtClean="0"/>
               <a:pPr/>
-              <a:t>13/04/16</a:t>
+              <a:t>14/04/16</a:t>
             </a:fld>
             <a:endParaRPr lang="en-GB"/>
           </a:p>
@@ -1472,7 +1472,7 @@
             <a:fld id="{9C77A686-1785-49A1-B4C9-55A3C7EEADE4}" type="datetime1">
               <a:rPr lang="en-GB" smtClean="0"/>
               <a:pPr/>
-              <a:t>13/04/16</a:t>
+              <a:t>14/04/16</a:t>
             </a:fld>
             <a:endParaRPr lang="en-GB"/>
           </a:p>
@@ -1711,7 +1711,7 @@
             <a:fld id="{19E03964-7D59-4BF8-AE10-3A215A42C3E4}" type="datetime1">
               <a:rPr lang="en-GB" smtClean="0"/>
               <a:pPr/>
-              <a:t>13/04/16</a:t>
+              <a:t>14/04/16</a:t>
             </a:fld>
             <a:endParaRPr lang="en-GB"/>
           </a:p>
@@ -1878,7 +1878,7 @@
             <a:fld id="{D65327FA-D1E5-40CA-8941-3DD0B6730F8A}" type="datetime1">
               <a:rPr lang="en-GB" smtClean="0"/>
               <a:pPr/>
-              <a:t>13/04/16</a:t>
+              <a:t>14/04/16</a:t>
             </a:fld>
             <a:endParaRPr lang="en-GB"/>
           </a:p>
@@ -2121,7 +2121,7 @@
             <a:fld id="{DB33F153-90AC-449F-A303-26940247ABC8}" type="datetime1">
               <a:rPr lang="en-GB" smtClean="0"/>
               <a:pPr/>
-              <a:t>13/04/16</a:t>
+              <a:t>14/04/16</a:t>
             </a:fld>
             <a:endParaRPr lang="en-GB"/>
           </a:p>
@@ -2406,7 +2406,7 @@
             <a:fld id="{84E24492-3EA5-478D-9F72-7B8FF369DDEB}" type="datetime1">
               <a:rPr lang="en-GB" smtClean="0"/>
               <a:pPr/>
-              <a:t>13/04/16</a:t>
+              <a:t>14/04/16</a:t>
             </a:fld>
             <a:endParaRPr lang="en-GB"/>
           </a:p>
@@ -2825,7 +2825,7 @@
             <a:fld id="{43976A03-596E-4490-AE35-AFB744E08901}" type="datetime1">
               <a:rPr lang="en-GB" smtClean="0"/>
               <a:pPr/>
-              <a:t>13/04/16</a:t>
+              <a:t>14/04/16</a:t>
             </a:fld>
             <a:endParaRPr lang="en-GB"/>
           </a:p>
@@ -2940,7 +2940,7 @@
             <a:fld id="{4C8E3CB4-829C-4F19-9E86-B2AAEC36BD90}" type="datetime1">
               <a:rPr lang="en-GB" smtClean="0"/>
               <a:pPr/>
-              <a:t>13/04/16</a:t>
+              <a:t>14/04/16</a:t>
             </a:fld>
             <a:endParaRPr lang="en-GB"/>
           </a:p>
@@ -3032,7 +3032,7 @@
             <a:fld id="{D4A6FE01-96D8-461F-B1B2-1F0C16D98900}" type="datetime1">
               <a:rPr lang="en-GB" smtClean="0"/>
               <a:pPr/>
-              <a:t>13/04/16</a:t>
+              <a:t>14/04/16</a:t>
             </a:fld>
             <a:endParaRPr lang="en-GB"/>
           </a:p>
@@ -3306,7 +3306,7 @@
             <a:fld id="{B24CB088-CFF7-44C4-9CCE-18845754E6D4}" type="datetime1">
               <a:rPr lang="en-GB" smtClean="0"/>
               <a:pPr/>
-              <a:t>13/04/16</a:t>
+              <a:t>14/04/16</a:t>
             </a:fld>
             <a:endParaRPr lang="en-GB"/>
           </a:p>
@@ -3473,7 +3473,7 @@
             <a:fld id="{D65327FA-D1E5-40CA-8941-3DD0B6730F8A}" type="datetime1">
               <a:rPr lang="en-GB" smtClean="0"/>
               <a:pPr/>
-              <a:t>13/04/16</a:t>
+              <a:t>14/04/16</a:t>
             </a:fld>
             <a:endParaRPr lang="en-GB"/>
           </a:p>
@@ -3727,7 +3727,7 @@
             <a:fld id="{CD3A280C-4DEC-4EEC-BD59-A30886E06BA1}" type="datetime1">
               <a:rPr lang="en-GB" smtClean="0"/>
               <a:pPr/>
-              <a:t>13/04/16</a:t>
+              <a:t>14/04/16</a:t>
             </a:fld>
             <a:endParaRPr lang="en-GB"/>
           </a:p>
@@ -3894,7 +3894,7 @@
             <a:fld id="{8E5ADEB7-8139-4AC1-94DC-FE9E54B1CCD2}" type="datetime1">
               <a:rPr lang="en-GB" smtClean="0"/>
               <a:pPr/>
-              <a:t>13/04/16</a:t>
+              <a:t>14/04/16</a:t>
             </a:fld>
             <a:endParaRPr lang="en-GB"/>
           </a:p>
@@ -4071,7 +4071,7 @@
             <a:fld id="{9C77A686-1785-49A1-B4C9-55A3C7EEADE4}" type="datetime1">
               <a:rPr lang="en-GB" smtClean="0"/>
               <a:pPr/>
-              <a:t>13/04/16</a:t>
+              <a:t>14/04/16</a:t>
             </a:fld>
             <a:endParaRPr lang="en-GB"/>
           </a:p>
@@ -4621,7 +4621,7 @@
             <a:fld id="{DB33F153-90AC-449F-A303-26940247ABC8}" type="datetime1">
               <a:rPr lang="en-GB" smtClean="0"/>
               <a:pPr/>
-              <a:t>13/04/16</a:t>
+              <a:t>14/04/16</a:t>
             </a:fld>
             <a:endParaRPr lang="en-GB"/>
           </a:p>
@@ -4906,7 +4906,7 @@
             <a:fld id="{84E24492-3EA5-478D-9F72-7B8FF369DDEB}" type="datetime1">
               <a:rPr lang="en-GB" smtClean="0"/>
               <a:pPr/>
-              <a:t>13/04/16</a:t>
+              <a:t>14/04/16</a:t>
             </a:fld>
             <a:endParaRPr lang="en-GB"/>
           </a:p>
@@ -5325,7 +5325,7 @@
             <a:fld id="{43976A03-596E-4490-AE35-AFB744E08901}" type="datetime1">
               <a:rPr lang="en-GB" smtClean="0"/>
               <a:pPr/>
-              <a:t>13/04/16</a:t>
+              <a:t>14/04/16</a:t>
             </a:fld>
             <a:endParaRPr lang="en-GB"/>
           </a:p>
@@ -5440,7 +5440,7 @@
             <a:fld id="{4C8E3CB4-829C-4F19-9E86-B2AAEC36BD90}" type="datetime1">
               <a:rPr lang="en-GB" smtClean="0"/>
               <a:pPr/>
-              <a:t>13/04/16</a:t>
+              <a:t>14/04/16</a:t>
             </a:fld>
             <a:endParaRPr lang="en-GB"/>
           </a:p>
@@ -5532,7 +5532,7 @@
             <a:fld id="{D4A6FE01-96D8-461F-B1B2-1F0C16D98900}" type="datetime1">
               <a:rPr lang="en-GB" smtClean="0"/>
               <a:pPr/>
-              <a:t>13/04/16</a:t>
+              <a:t>14/04/16</a:t>
             </a:fld>
             <a:endParaRPr lang="en-GB"/>
           </a:p>
@@ -5806,7 +5806,7 @@
             <a:fld id="{B24CB088-CFF7-44C4-9CCE-18845754E6D4}" type="datetime1">
               <a:rPr lang="en-GB" smtClean="0"/>
               <a:pPr/>
-              <a:t>13/04/16</a:t>
+              <a:t>14/04/16</a:t>
             </a:fld>
             <a:endParaRPr lang="en-GB"/>
           </a:p>
@@ -6060,7 +6060,7 @@
             <a:fld id="{CD3A280C-4DEC-4EEC-BD59-A30886E06BA1}" type="datetime1">
               <a:rPr lang="en-GB" smtClean="0"/>
               <a:pPr/>
-              <a:t>13/04/16</a:t>
+              <a:t>14/04/16</a:t>
             </a:fld>
             <a:endParaRPr lang="en-GB"/>
           </a:p>
@@ -6270,7 +6270,7 @@
             <a:fld id="{E222BC38-3FAE-415B-AD1C-2D338E3D6B03}" type="datetime1">
               <a:rPr lang="en-GB" smtClean="0"/>
               <a:pPr/>
-              <a:t>13/04/16</a:t>
+              <a:t>14/04/16</a:t>
             </a:fld>
             <a:endParaRPr lang="en-GB"/>
           </a:p>
@@ -6778,7 +6778,7 @@
             <a:fld id="{E222BC38-3FAE-415B-AD1C-2D338E3D6B03}" type="datetime1">
               <a:rPr lang="en-GB" smtClean="0"/>
               <a:pPr/>
-              <a:t>13/04/16</a:t>
+              <a:t>14/04/16</a:t>
             </a:fld>
             <a:endParaRPr lang="en-GB"/>
           </a:p>
@@ -7256,7 +7256,7 @@
               <a:t>Tom </a:t>
             </a:r>
             <a:r>
-              <a:rPr lang="en-GB" dirty="0" err="1" smtClean="0">
+              <a:rPr lang="en-GB" dirty="0" smtClean="0">
                 <a:solidFill>
                   <a:schemeClr val="tx2"/>
                 </a:solidFill>
@@ -7264,22 +7264,6 @@
               <a:t>Deakin</a:t>
             </a:r>
             <a:endParaRPr lang="en-GB" dirty="0" smtClean="0">
-              <a:solidFill>
-                <a:schemeClr val="tx2"/>
-              </a:solidFill>
-            </a:endParaRPr>
-          </a:p>
-          <a:p>
-            <a:pPr algn="l"/>
-            <a:r>
-              <a:rPr lang="en-GB" dirty="0" smtClean="0">
-                <a:solidFill>
-                  <a:schemeClr val="tx2"/>
-                </a:solidFill>
-              </a:rPr>
-              <a:t>Mike O'Connor</a:t>
-            </a:r>
-            <a:endParaRPr lang="en-GB" dirty="0">
               <a:solidFill>
                 <a:schemeClr val="tx2"/>
               </a:solidFill>
@@ -30687,13 +30671,25 @@
               <a:rPr lang="en-GB" sz="2800" dirty="0">
                 <a:hlinkClick r:id="rId2"/>
               </a:rPr>
-              <a:t>/OpenCL</a:t>
+              <a:t>/</a:t>
             </a:r>
             <a:r>
               <a:rPr lang="en-GB" sz="2800" dirty="0" smtClean="0">
                 <a:hlinkClick r:id="rId2"/>
               </a:rPr>
+              <a:t>OpenCL</a:t>
+            </a:r>
+            <a:r>
+              <a:rPr lang="en-GB" sz="2800" dirty="0">
+                <a:hlinkClick r:id="rId2"/>
+              </a:rPr>
               <a:t>/</a:t>
+            </a:r>
+            <a:r>
+              <a:rPr lang="en-GB" sz="2800" dirty="0" smtClean="0">
+                <a:hlinkClick r:id="rId2"/>
+              </a:rPr>
+              <a:t>IWOCL_2016.zip</a:t>
             </a:r>
             <a:endParaRPr lang="en-GB" sz="2800" dirty="0" smtClean="0"/>
           </a:p>
@@ -30701,20 +30697,7 @@
             <a:pPr marL="0" indent="0" algn="ctr">
               <a:buNone/>
             </a:pPr>
-            <a:endParaRPr lang="en-GB" sz="2800" dirty="0"/>
-          </a:p>
-          <a:p>
-            <a:pPr marL="0" indent="0" algn="ctr">
-              <a:buNone/>
-            </a:pPr>
-            <a:r>
-              <a:rPr lang="en-GB" sz="2800" smtClean="0"/>
-              <a:t>IWOCL_2015</a:t>
-            </a:r>
-            <a:r>
-              <a:rPr lang="en-GB" sz="2800" dirty="0" smtClean="0"/>
-              <a:t>.zip</a:t>
-            </a:r>
+            <a:endParaRPr lang="en-GB" sz="2800" dirty="0" smtClean="0"/>
           </a:p>
         </p:txBody>
       </p:sp>
@@ -30832,7 +30815,7 @@
           </a:p>
           <a:p>
             <a:r>
-              <a:rPr lang="en-GB" dirty="0"/>
+              <a:rPr lang="en-GB" b="1" dirty="0"/>
               <a:t>Key features:</a:t>
             </a:r>
           </a:p>
@@ -30847,12 +30830,36 @@
               <a:t>the </a:t>
             </a:r>
             <a:r>
+              <a:rPr lang="en-GB" dirty="0">
+                <a:solidFill>
+                  <a:srgbClr val="008000"/>
+                </a:solidFill>
+              </a:rPr>
+              <a:t>platform</a:t>
+            </a:r>
+            <a:r>
               <a:rPr lang="en-GB" dirty="0"/>
-              <a:t>platform and command-</a:t>
+              <a:t> and </a:t>
+            </a:r>
+            <a:r>
+              <a:rPr lang="en-GB" dirty="0">
+                <a:solidFill>
+                  <a:srgbClr val="008000"/>
+                </a:solidFill>
+              </a:rPr>
+              <a:t>command-</a:t>
+            </a:r>
+            <a:r>
+              <a:rPr lang="en-GB" dirty="0" smtClean="0">
+                <a:solidFill>
+                  <a:srgbClr val="008000"/>
+                </a:solidFill>
+              </a:rPr>
+              <a:t>queue</a:t>
             </a:r>
             <a:r>
               <a:rPr lang="en-GB" dirty="0" smtClean="0"/>
-              <a:t>queue, </a:t>
+              <a:t>, </a:t>
             </a:r>
             <a:r>
               <a:rPr lang="en-GB" dirty="0"/>
@@ -32149,7 +32156,19 @@
               <a:rPr lang="en-GB" sz="1400" dirty="0">
                 <a:latin typeface="+mj-lt"/>
               </a:rPr>
-              <a:t>used when we do not specify </a:t>
+              <a:t>used when </a:t>
+            </a:r>
+            <a:r>
+              <a:rPr lang="en-GB" sz="1400">
+                <a:latin typeface="+mj-lt"/>
+              </a:rPr>
+              <a:t>we </a:t>
+            </a:r>
+            <a:r>
+              <a:rPr lang="en-GB" sz="1400" smtClean="0">
+                <a:latin typeface="+mj-lt"/>
+              </a:rPr>
+              <a:t>don't specify </a:t>
             </a:r>
             <a:r>
               <a:rPr lang="en-GB" sz="1400" dirty="0" smtClean="0">
@@ -32707,11 +32726,7 @@
           <a:p>
             <a:r>
               <a:rPr lang="en-US" dirty="0" smtClean="0"/>
-              <a:t>Remote </a:t>
-            </a:r>
-            <a:r>
-              <a:rPr lang="en-US" dirty="0" smtClean="0"/>
-              <a:t>machine</a:t>
+              <a:t>Remote machine</a:t>
             </a:r>
             <a:endParaRPr lang="en-US" dirty="0"/>
           </a:p>

</xml_diff>

<commit_message>
Updated OpenCL progress slide
Used latest version that goes up to v2.1
</commit_message>
<xml_diff>
--- a/slides/advanced_intro.pptx
+++ b/slides/advanced_intro.pptx
@@ -7253,21 +7253,8 @@
                   <a:schemeClr val="tx2"/>
                 </a:solidFill>
               </a:rPr>
-              <a:t>Tom </a:t>
-            </a:r>
-            <a:r>
-              <a:rPr lang="en-GB" dirty="0" smtClean="0">
-                <a:solidFill>
-                  <a:schemeClr val="tx2"/>
-                </a:solidFill>
-              </a:rPr>
-              <a:t>Deakin</a:t>
-            </a:r>
-            <a:endParaRPr lang="en-GB" dirty="0" smtClean="0">
-              <a:solidFill>
-                <a:schemeClr val="tx2"/>
-              </a:solidFill>
-            </a:endParaRPr>
+              <a:t>Tom Deakin</a:t>
+            </a:r>
           </a:p>
         </p:txBody>
       </p:sp>
@@ -9922,1825 +9909,30 @@
           </a:p>
         </p:txBody>
       </p:sp>
-      <p:sp>
-        <p:nvSpPr>
-          <p:cNvPr id="6" name="Explosion 1 5"/>
-          <p:cNvSpPr/>
+      <p:pic>
+        <p:nvPicPr>
+          <p:cNvPr id="4" name="Picture 3"/>
+          <p:cNvPicPr>
+            <a:picLocks noChangeAspect="1"/>
+          </p:cNvPicPr>
           <p:nvPr/>
-        </p:nvSpPr>
-        <p:spPr bwMode="auto">
+        </p:nvPicPr>
+        <p:blipFill>
+          <a:blip r:embed="rId3"/>
+          <a:stretch>
+            <a:fillRect/>
+          </a:stretch>
+        </p:blipFill>
+        <p:spPr>
           <a:xfrm>
-            <a:off x="6737017" y="2751667"/>
-            <a:ext cx="2346292" cy="2372154"/>
-          </a:xfrm>
-          <a:prstGeom prst="irregularSeal1">
-            <a:avLst/>
-          </a:prstGeom>
-          <a:solidFill>
-            <a:srgbClr val="FFFF00"/>
-          </a:solidFill>
-          <a:ln w="3175" cap="flat" cmpd="sng" algn="ctr">
-            <a:noFill/>
-            <a:prstDash val="solid"/>
-            <a:round/>
-            <a:headEnd type="oval" w="med" len="med"/>
-            <a:tailEnd type="none" w="med" len="med"/>
-          </a:ln>
-          <a:effectLst/>
-        </p:spPr>
-        <p:txBody>
-          <a:bodyPr vert="horz" wrap="square" lIns="91440" tIns="45720" rIns="91440" bIns="45720" numCol="1" rtlCol="0" anchor="ctr" anchorCtr="0" compatLnSpc="1">
-            <a:prstTxWarp prst="textNoShape">
-              <a:avLst/>
-            </a:prstTxWarp>
-            <a:noAutofit/>
-          </a:bodyPr>
-          <a:lstStyle/>
-          <a:p>
-            <a:pPr marL="0" marR="0" indent="0" algn="ctr" defTabSz="914400" rtl="0" eaLnBrk="1" fontAlgn="base" latinLnBrk="0" hangingPunct="1">
-              <a:lnSpc>
-                <a:spcPct val="99000"/>
-              </a:lnSpc>
-              <a:spcBef>
-                <a:spcPct val="0"/>
-              </a:spcBef>
-              <a:spcAft>
-                <a:spcPct val="0"/>
-              </a:spcAft>
-              <a:buClrTx/>
-              <a:buSzTx/>
-              <a:buFontTx/>
-              <a:buNone/>
-              <a:tabLst>
-                <a:tab pos="158750" algn="l"/>
-                <a:tab pos="1757363" algn="l"/>
-                <a:tab pos="3357563" algn="l"/>
-                <a:tab pos="4956175" algn="l"/>
-                <a:tab pos="6553200" algn="l"/>
-              </a:tabLst>
-            </a:pPr>
-            <a:endParaRPr kumimoji="0" lang="en-US" sz="1600" i="0" u="none" strike="noStrike" cap="none" normalizeH="0" baseline="0" dirty="0" smtClean="0">
-              <a:ln>
-                <a:noFill/>
-              </a:ln>
-              <a:solidFill>
-                <a:schemeClr val="tx1"/>
-              </a:solidFill>
-              <a:effectLst/>
-              <a:latin typeface="Trebuchet MS" panose="020B0603020202020204" pitchFamily="34" charset="0"/>
-              <a:ea typeface="Tahoma" pitchFamily="34" charset="0"/>
-              <a:cs typeface="Tahoma" pitchFamily="34" charset="0"/>
-              <a:sym typeface="Myriad Set Text" charset="0"/>
-            </a:endParaRPr>
-          </a:p>
-        </p:txBody>
-      </p:sp>
-      <p:sp>
-        <p:nvSpPr>
-          <p:cNvPr id="7" name="Line 4"/>
-          <p:cNvSpPr>
-            <a:spLocks noChangeShapeType="1"/>
-          </p:cNvSpPr>
-          <p:nvPr/>
-        </p:nvSpPr>
-        <p:spPr bwMode="auto">
-          <a:xfrm>
-            <a:off x="659677" y="5615019"/>
-            <a:ext cx="8213964" cy="0"/>
-          </a:xfrm>
-          <a:prstGeom prst="line">
-            <a:avLst/>
-          </a:prstGeom>
-          <a:noFill/>
-          <a:ln w="28575">
-            <a:solidFill>
-              <a:schemeClr val="tx1"/>
-            </a:solidFill>
-            <a:round/>
-            <a:headEnd/>
-            <a:tailEnd type="triangle" w="med" len="med"/>
-          </a:ln>
-        </p:spPr>
-        <p:txBody>
-          <a:bodyPr wrap="square">
-            <a:spAutoFit/>
-          </a:bodyPr>
-          <a:lstStyle/>
-          <a:p>
-            <a:pPr>
-              <a:defRPr/>
-            </a:pPr>
-            <a:endParaRPr lang="en-US" b="1">
-              <a:solidFill>
-                <a:schemeClr val="tx1"/>
-              </a:solidFill>
-              <a:latin typeface="Trebuchet MS" pitchFamily="34" charset="0"/>
-              <a:ea typeface="Tahoma" pitchFamily="34" charset="0"/>
-              <a:cs typeface="Tahoma" pitchFamily="34" charset="0"/>
-            </a:endParaRPr>
-          </a:p>
-        </p:txBody>
-      </p:sp>
-      <p:grpSp>
-        <p:nvGrpSpPr>
-          <p:cNvPr id="8" name="Group 7"/>
-          <p:cNvGrpSpPr/>
-          <p:nvPr/>
-        </p:nvGrpSpPr>
-        <p:grpSpPr>
-          <a:xfrm>
-            <a:off x="440568" y="5615019"/>
-            <a:ext cx="1107096" cy="726690"/>
-            <a:chOff x="2323407" y="5287980"/>
-            <a:chExt cx="1328514" cy="654021"/>
-          </a:xfrm>
-        </p:grpSpPr>
-        <p:sp>
-          <p:nvSpPr>
-            <p:cNvPr id="9" name="Text Box 9"/>
-            <p:cNvSpPr txBox="1">
-              <a:spLocks noChangeArrowheads="1"/>
-            </p:cNvSpPr>
-            <p:nvPr/>
-          </p:nvSpPr>
-          <p:spPr bwMode="auto">
-            <a:xfrm>
-              <a:off x="2323407" y="5557007"/>
-              <a:ext cx="1328514" cy="384994"/>
-            </a:xfrm>
-            <a:prstGeom prst="rect">
-              <a:avLst/>
-            </a:prstGeom>
-            <a:noFill/>
-            <a:ln w="3175" algn="ctr">
-              <a:noFill/>
-              <a:miter lim="800000"/>
-              <a:headEnd/>
-              <a:tailEnd/>
-            </a:ln>
-          </p:spPr>
-          <p:txBody>
-            <a:bodyPr wrap="square" lIns="91398" tIns="45701" rIns="91398" bIns="45701">
-              <a:spAutoFit/>
-            </a:bodyPr>
-            <a:lstStyle/>
-            <a:p>
-              <a:pPr algn="ctr">
-                <a:lnSpc>
-                  <a:spcPct val="90000"/>
-                </a:lnSpc>
-                <a:defRPr/>
-              </a:pPr>
-              <a:r>
-                <a:rPr lang="en-US" sz="1200" b="1" dirty="0" smtClean="0">
-                  <a:solidFill>
-                    <a:schemeClr val="tx1"/>
-                  </a:solidFill>
-                  <a:latin typeface="Trebuchet MS" pitchFamily="34" charset="0"/>
-                  <a:ea typeface="Tahoma" pitchFamily="34" charset="0"/>
-                  <a:cs typeface="Tahoma" pitchFamily="34" charset="0"/>
-                </a:rPr>
-                <a:t>OpenCL 1.0</a:t>
-              </a:r>
-              <a:br>
-                <a:rPr lang="en-US" sz="1200" b="1" dirty="0" smtClean="0">
-                  <a:solidFill>
-                    <a:schemeClr val="tx1"/>
-                  </a:solidFill>
-                  <a:latin typeface="Trebuchet MS" pitchFamily="34" charset="0"/>
-                  <a:ea typeface="Tahoma" pitchFamily="34" charset="0"/>
-                  <a:cs typeface="Tahoma" pitchFamily="34" charset="0"/>
-                </a:rPr>
-              </a:br>
-              <a:r>
-                <a:rPr lang="en-US" sz="1200" b="1" dirty="0" smtClean="0">
-                  <a:solidFill>
-                    <a:schemeClr val="tx1"/>
-                  </a:solidFill>
-                  <a:latin typeface="Trebuchet MS" pitchFamily="34" charset="0"/>
-                  <a:ea typeface="Tahoma" pitchFamily="34" charset="0"/>
-                  <a:cs typeface="Tahoma" pitchFamily="34" charset="0"/>
-                </a:rPr>
-                <a:t>Specification</a:t>
-              </a:r>
-              <a:endParaRPr lang="en-US" sz="1200" b="1" dirty="0">
-                <a:solidFill>
-                  <a:schemeClr val="tx1"/>
-                </a:solidFill>
-                <a:latin typeface="Trebuchet MS" pitchFamily="34" charset="0"/>
-                <a:ea typeface="Tahoma" pitchFamily="34" charset="0"/>
-                <a:cs typeface="Tahoma" pitchFamily="34" charset="0"/>
-              </a:endParaRPr>
-            </a:p>
-          </p:txBody>
-        </p:sp>
-        <p:sp>
-          <p:nvSpPr>
-            <p:cNvPr id="10" name="Text Box 21"/>
-            <p:cNvSpPr txBox="1">
-              <a:spLocks noChangeArrowheads="1"/>
-            </p:cNvSpPr>
-            <p:nvPr/>
-          </p:nvSpPr>
-          <p:spPr bwMode="auto">
-            <a:xfrm>
-              <a:off x="2505419" y="5287980"/>
-              <a:ext cx="1025037" cy="332365"/>
-            </a:xfrm>
-            <a:prstGeom prst="rect">
-              <a:avLst/>
-            </a:prstGeom>
-            <a:noFill/>
-            <a:ln w="3175" algn="ctr">
-              <a:noFill/>
-              <a:miter lim="800000"/>
-              <a:headEnd/>
-              <a:tailEnd/>
-            </a:ln>
-          </p:spPr>
-          <p:txBody>
-            <a:bodyPr wrap="none" lIns="91398" tIns="45701" rIns="91398" bIns="45701">
-              <a:spAutoFit/>
-            </a:bodyPr>
-            <a:lstStyle/>
-            <a:p>
-              <a:pPr>
-                <a:defRPr/>
-              </a:pPr>
-              <a:r>
-                <a:rPr lang="en-US" b="1" dirty="0">
-                  <a:solidFill>
-                    <a:srgbClr val="C00000"/>
-                  </a:solidFill>
-                  <a:latin typeface="Trebuchet MS" pitchFamily="34" charset="0"/>
-                  <a:ea typeface="Tahoma" pitchFamily="34" charset="0"/>
-                  <a:cs typeface="Tahoma" pitchFamily="34" charset="0"/>
-                </a:rPr>
-                <a:t>Dec08</a:t>
-              </a:r>
-            </a:p>
-          </p:txBody>
-        </p:sp>
-      </p:grpSp>
-      <p:grpSp>
-        <p:nvGrpSpPr>
-          <p:cNvPr id="11" name="Group 10"/>
-          <p:cNvGrpSpPr/>
-          <p:nvPr/>
-        </p:nvGrpSpPr>
-        <p:grpSpPr>
-          <a:xfrm>
-            <a:off x="1982893" y="5615019"/>
-            <a:ext cx="1148946" cy="726690"/>
-            <a:chOff x="4399737" y="5287980"/>
-            <a:chExt cx="1378735" cy="654021"/>
-          </a:xfrm>
-        </p:grpSpPr>
-        <p:sp>
-          <p:nvSpPr>
-            <p:cNvPr id="12" name="Text Box 22"/>
-            <p:cNvSpPr txBox="1">
-              <a:spLocks noChangeArrowheads="1"/>
-            </p:cNvSpPr>
-            <p:nvPr/>
-          </p:nvSpPr>
-          <p:spPr bwMode="auto">
-            <a:xfrm>
-              <a:off x="4574690" y="5287980"/>
-              <a:ext cx="1020844" cy="332365"/>
-            </a:xfrm>
-            <a:prstGeom prst="rect">
-              <a:avLst/>
-            </a:prstGeom>
-            <a:noFill/>
-            <a:ln w="3175" algn="ctr">
-              <a:noFill/>
-              <a:miter lim="800000"/>
-              <a:headEnd/>
-              <a:tailEnd/>
-            </a:ln>
-          </p:spPr>
-          <p:txBody>
-            <a:bodyPr wrap="none" lIns="91398" tIns="45701" rIns="91398" bIns="45701">
-              <a:spAutoFit/>
-            </a:bodyPr>
-            <a:lstStyle/>
-            <a:p>
-              <a:pPr>
-                <a:defRPr/>
-              </a:pPr>
-              <a:r>
-                <a:rPr lang="en-US" b="1" dirty="0" smtClean="0">
-                  <a:solidFill>
-                    <a:srgbClr val="C00000"/>
-                  </a:solidFill>
-                  <a:latin typeface="Trebuchet MS" pitchFamily="34" charset="0"/>
-                  <a:ea typeface="Tahoma" pitchFamily="34" charset="0"/>
-                  <a:cs typeface="Tahoma" pitchFamily="34" charset="0"/>
-                </a:rPr>
-                <a:t>Jun10</a:t>
-              </a:r>
-              <a:endParaRPr lang="en-US" b="1" dirty="0">
-                <a:solidFill>
-                  <a:srgbClr val="C00000"/>
-                </a:solidFill>
-                <a:latin typeface="Trebuchet MS" pitchFamily="34" charset="0"/>
-                <a:ea typeface="Tahoma" pitchFamily="34" charset="0"/>
-                <a:cs typeface="Tahoma" pitchFamily="34" charset="0"/>
-              </a:endParaRPr>
-            </a:p>
-          </p:txBody>
-        </p:sp>
-        <p:sp>
-          <p:nvSpPr>
-            <p:cNvPr id="13" name="Text Box 9"/>
-            <p:cNvSpPr txBox="1">
-              <a:spLocks noChangeArrowheads="1"/>
-            </p:cNvSpPr>
-            <p:nvPr/>
-          </p:nvSpPr>
-          <p:spPr bwMode="auto">
-            <a:xfrm>
-              <a:off x="4399737" y="5557007"/>
-              <a:ext cx="1378735" cy="384994"/>
-            </a:xfrm>
-            <a:prstGeom prst="rect">
-              <a:avLst/>
-            </a:prstGeom>
-            <a:noFill/>
-            <a:ln w="3175" algn="ctr">
-              <a:noFill/>
-              <a:miter lim="800000"/>
-              <a:headEnd/>
-              <a:tailEnd/>
-            </a:ln>
-          </p:spPr>
-          <p:txBody>
-            <a:bodyPr wrap="square" lIns="91398" tIns="45701" rIns="91398" bIns="45701">
-              <a:spAutoFit/>
-            </a:bodyPr>
-            <a:lstStyle/>
-            <a:p>
-              <a:pPr algn="ctr">
-                <a:lnSpc>
-                  <a:spcPct val="90000"/>
-                </a:lnSpc>
-                <a:defRPr/>
-              </a:pPr>
-              <a:r>
-                <a:rPr lang="en-US" sz="1200" b="1" dirty="0" smtClean="0">
-                  <a:solidFill>
-                    <a:schemeClr val="tx1"/>
-                  </a:solidFill>
-                  <a:latin typeface="Trebuchet MS" pitchFamily="34" charset="0"/>
-                  <a:ea typeface="Tahoma" pitchFamily="34" charset="0"/>
-                  <a:cs typeface="Tahoma" pitchFamily="34" charset="0"/>
-                </a:rPr>
-                <a:t>OpenCL 1.1</a:t>
-              </a:r>
-              <a:br>
-                <a:rPr lang="en-US" sz="1200" b="1" dirty="0" smtClean="0">
-                  <a:solidFill>
-                    <a:schemeClr val="tx1"/>
-                  </a:solidFill>
-                  <a:latin typeface="Trebuchet MS" pitchFamily="34" charset="0"/>
-                  <a:ea typeface="Tahoma" pitchFamily="34" charset="0"/>
-                  <a:cs typeface="Tahoma" pitchFamily="34" charset="0"/>
-                </a:rPr>
-              </a:br>
-              <a:r>
-                <a:rPr lang="en-US" sz="1200" b="1" dirty="0" smtClean="0">
-                  <a:solidFill>
-                    <a:schemeClr val="tx1"/>
-                  </a:solidFill>
-                  <a:latin typeface="Trebuchet MS" pitchFamily="34" charset="0"/>
-                  <a:ea typeface="Tahoma" pitchFamily="34" charset="0"/>
-                  <a:cs typeface="Tahoma" pitchFamily="34" charset="0"/>
-                </a:rPr>
-                <a:t>Specification</a:t>
-              </a:r>
-              <a:endParaRPr lang="en-US" sz="1200" b="1" dirty="0">
-                <a:solidFill>
-                  <a:schemeClr val="tx1"/>
-                </a:solidFill>
-                <a:latin typeface="Trebuchet MS" pitchFamily="34" charset="0"/>
-                <a:ea typeface="Tahoma" pitchFamily="34" charset="0"/>
-                <a:cs typeface="Tahoma" pitchFamily="34" charset="0"/>
-              </a:endParaRPr>
-            </a:p>
-          </p:txBody>
-        </p:sp>
-      </p:grpSp>
-      <p:grpSp>
-        <p:nvGrpSpPr>
-          <p:cNvPr id="14" name="Group 13"/>
-          <p:cNvGrpSpPr/>
-          <p:nvPr/>
-        </p:nvGrpSpPr>
-        <p:grpSpPr>
-          <a:xfrm>
-            <a:off x="3834380" y="5615019"/>
-            <a:ext cx="1169667" cy="726690"/>
-            <a:chOff x="6476999" y="5287980"/>
-            <a:chExt cx="1403601" cy="654021"/>
-          </a:xfrm>
-        </p:grpSpPr>
-        <p:sp>
-          <p:nvSpPr>
-            <p:cNvPr id="15" name="Text Box 22"/>
-            <p:cNvSpPr txBox="1">
-              <a:spLocks noChangeArrowheads="1"/>
-            </p:cNvSpPr>
-            <p:nvPr/>
-          </p:nvSpPr>
-          <p:spPr bwMode="auto">
-            <a:xfrm>
-              <a:off x="6673709" y="5287980"/>
-              <a:ext cx="1033829" cy="332365"/>
-            </a:xfrm>
-            <a:prstGeom prst="rect">
-              <a:avLst/>
-            </a:prstGeom>
-            <a:noFill/>
-            <a:ln w="3175" algn="ctr">
-              <a:noFill/>
-              <a:miter lim="800000"/>
-              <a:headEnd/>
-              <a:tailEnd/>
-            </a:ln>
-          </p:spPr>
-          <p:txBody>
-            <a:bodyPr wrap="none" lIns="91398" tIns="45701" rIns="91398" bIns="45701">
-              <a:spAutoFit/>
-            </a:bodyPr>
-            <a:lstStyle/>
-            <a:p>
-              <a:pPr>
-                <a:defRPr/>
-              </a:pPr>
-              <a:r>
-                <a:rPr lang="en-US" b="1" dirty="0" smtClean="0">
-                  <a:solidFill>
-                    <a:srgbClr val="C00000"/>
-                  </a:solidFill>
-                  <a:latin typeface="Trebuchet MS" pitchFamily="34" charset="0"/>
-                  <a:ea typeface="Tahoma" pitchFamily="34" charset="0"/>
-                  <a:cs typeface="Tahoma" pitchFamily="34" charset="0"/>
-                </a:rPr>
-                <a:t>Nov11</a:t>
-              </a:r>
-              <a:endParaRPr lang="en-US" b="1" dirty="0">
-                <a:solidFill>
-                  <a:srgbClr val="C00000"/>
-                </a:solidFill>
-                <a:latin typeface="Trebuchet MS" pitchFamily="34" charset="0"/>
-                <a:ea typeface="Tahoma" pitchFamily="34" charset="0"/>
-                <a:cs typeface="Tahoma" pitchFamily="34" charset="0"/>
-              </a:endParaRPr>
-            </a:p>
-          </p:txBody>
-        </p:sp>
-        <p:sp>
-          <p:nvSpPr>
-            <p:cNvPr id="16" name="Text Box 9"/>
-            <p:cNvSpPr txBox="1">
-              <a:spLocks noChangeArrowheads="1"/>
-            </p:cNvSpPr>
-            <p:nvPr/>
-          </p:nvSpPr>
-          <p:spPr bwMode="auto">
-            <a:xfrm>
-              <a:off x="6476999" y="5557007"/>
-              <a:ext cx="1403601" cy="384994"/>
-            </a:xfrm>
-            <a:prstGeom prst="rect">
-              <a:avLst/>
-            </a:prstGeom>
-            <a:noFill/>
-            <a:ln w="3175" algn="ctr">
-              <a:noFill/>
-              <a:miter lim="800000"/>
-              <a:headEnd/>
-              <a:tailEnd/>
-            </a:ln>
-          </p:spPr>
-          <p:txBody>
-            <a:bodyPr wrap="square" lIns="91398" tIns="45701" rIns="91398" bIns="45701">
-              <a:spAutoFit/>
-            </a:bodyPr>
-            <a:lstStyle>
-              <a:defPPr>
-                <a:defRPr lang="en-US"/>
-              </a:defPPr>
-              <a:lvl1pPr algn="ctr">
-                <a:lnSpc>
-                  <a:spcPct val="80000"/>
-                </a:lnSpc>
-                <a:defRPr sz="1200" b="1">
-                  <a:solidFill>
-                    <a:schemeClr val="tx1"/>
-                  </a:solidFill>
-                  <a:latin typeface="Tahoma" pitchFamily="34" charset="0"/>
-                  <a:ea typeface="Tahoma" pitchFamily="34" charset="0"/>
-                  <a:cs typeface="Tahoma" pitchFamily="34" charset="0"/>
-                </a:defRPr>
-              </a:lvl1pPr>
-            </a:lstStyle>
-            <a:p>
-              <a:pPr>
-                <a:lnSpc>
-                  <a:spcPct val="90000"/>
-                </a:lnSpc>
-              </a:pPr>
-              <a:r>
-                <a:rPr lang="en-US" dirty="0">
-                  <a:latin typeface="Trebuchet MS" pitchFamily="34" charset="0"/>
-                </a:rPr>
-                <a:t>OpenCL 1.2 </a:t>
-              </a:r>
-              <a:br>
-                <a:rPr lang="en-US" dirty="0">
-                  <a:latin typeface="Trebuchet MS" pitchFamily="34" charset="0"/>
-                </a:rPr>
-              </a:br>
-              <a:r>
-                <a:rPr lang="en-US" dirty="0" smtClean="0">
-                  <a:latin typeface="Trebuchet MS" pitchFamily="34" charset="0"/>
-                </a:rPr>
-                <a:t>Specification</a:t>
-              </a:r>
-              <a:endParaRPr lang="en-US" dirty="0">
-                <a:latin typeface="Trebuchet MS" pitchFamily="34" charset="0"/>
-              </a:endParaRPr>
-            </a:p>
-          </p:txBody>
-        </p:sp>
-      </p:grpSp>
-      <p:grpSp>
-        <p:nvGrpSpPr>
-          <p:cNvPr id="17" name="Group 16"/>
-          <p:cNvGrpSpPr/>
-          <p:nvPr/>
-        </p:nvGrpSpPr>
-        <p:grpSpPr>
-          <a:xfrm>
-            <a:off x="5651501" y="5615019"/>
-            <a:ext cx="1152748" cy="726690"/>
-            <a:chOff x="7072757" y="4970329"/>
-            <a:chExt cx="1383297" cy="654021"/>
-          </a:xfrm>
-        </p:grpSpPr>
-        <p:sp>
-          <p:nvSpPr>
-            <p:cNvPr id="18" name="Text Box 9"/>
-            <p:cNvSpPr txBox="1">
-              <a:spLocks noChangeArrowheads="1"/>
-            </p:cNvSpPr>
-            <p:nvPr/>
-          </p:nvSpPr>
-          <p:spPr bwMode="auto">
-            <a:xfrm>
-              <a:off x="7072757" y="5239356"/>
-              <a:ext cx="1383297" cy="384994"/>
-            </a:xfrm>
-            <a:prstGeom prst="rect">
-              <a:avLst/>
-            </a:prstGeom>
-            <a:noFill/>
-            <a:ln w="3175" algn="ctr">
-              <a:noFill/>
-              <a:miter lim="800000"/>
-              <a:headEnd/>
-              <a:tailEnd/>
-            </a:ln>
-          </p:spPr>
-          <p:txBody>
-            <a:bodyPr wrap="square" lIns="91398" tIns="45701" rIns="91398" bIns="45701">
-              <a:spAutoFit/>
-            </a:bodyPr>
-            <a:lstStyle>
-              <a:defPPr>
-                <a:defRPr lang="en-US"/>
-              </a:defPPr>
-              <a:lvl1pPr algn="ctr">
-                <a:lnSpc>
-                  <a:spcPct val="80000"/>
-                </a:lnSpc>
-                <a:defRPr sz="1200" b="1">
-                  <a:solidFill>
-                    <a:schemeClr val="tx1"/>
-                  </a:solidFill>
-                  <a:latin typeface="Tahoma" pitchFamily="34" charset="0"/>
-                  <a:ea typeface="Tahoma" pitchFamily="34" charset="0"/>
-                  <a:cs typeface="Tahoma" pitchFamily="34" charset="0"/>
-                </a:defRPr>
-              </a:lvl1pPr>
-            </a:lstStyle>
-            <a:p>
-              <a:pPr>
-                <a:lnSpc>
-                  <a:spcPct val="90000"/>
-                </a:lnSpc>
-              </a:pPr>
-              <a:r>
-                <a:rPr lang="en-US" dirty="0">
-                  <a:latin typeface="Trebuchet MS" pitchFamily="34" charset="0"/>
-                </a:rPr>
-                <a:t>OpenCL </a:t>
-              </a:r>
-              <a:r>
-                <a:rPr lang="en-US" dirty="0" smtClean="0">
-                  <a:latin typeface="Trebuchet MS" pitchFamily="34" charset="0"/>
-                </a:rPr>
-                <a:t>2.0 </a:t>
-              </a:r>
-              <a:r>
-                <a:rPr lang="en-US" dirty="0">
-                  <a:latin typeface="Trebuchet MS" pitchFamily="34" charset="0"/>
-                </a:rPr>
-                <a:t/>
-              </a:r>
-              <a:br>
-                <a:rPr lang="en-US" dirty="0">
-                  <a:latin typeface="Trebuchet MS" pitchFamily="34" charset="0"/>
-                </a:rPr>
-              </a:br>
-              <a:r>
-                <a:rPr lang="en-US" dirty="0" smtClean="0">
-                  <a:latin typeface="Trebuchet MS" pitchFamily="34" charset="0"/>
-                </a:rPr>
-                <a:t>Specification</a:t>
-              </a:r>
-              <a:endParaRPr lang="en-US" dirty="0">
-                <a:latin typeface="Trebuchet MS" pitchFamily="34" charset="0"/>
-              </a:endParaRPr>
-            </a:p>
-          </p:txBody>
-        </p:sp>
-        <p:sp>
-          <p:nvSpPr>
-            <p:cNvPr id="19" name="Text Box 22"/>
-            <p:cNvSpPr txBox="1">
-              <a:spLocks noChangeArrowheads="1"/>
-            </p:cNvSpPr>
-            <p:nvPr/>
-          </p:nvSpPr>
-          <p:spPr bwMode="auto">
-            <a:xfrm>
-              <a:off x="7301357" y="4970329"/>
-              <a:ext cx="1033828" cy="332365"/>
-            </a:xfrm>
-            <a:prstGeom prst="rect">
-              <a:avLst/>
-            </a:prstGeom>
-            <a:noFill/>
-            <a:ln w="3175" algn="ctr">
-              <a:noFill/>
-              <a:miter lim="800000"/>
-              <a:headEnd/>
-              <a:tailEnd/>
-            </a:ln>
-          </p:spPr>
-          <p:txBody>
-            <a:bodyPr wrap="none" lIns="91398" tIns="45701" rIns="91398" bIns="45701">
-              <a:spAutoFit/>
-            </a:bodyPr>
-            <a:lstStyle/>
-            <a:p>
-              <a:pPr>
-                <a:defRPr/>
-              </a:pPr>
-              <a:r>
-                <a:rPr lang="en-US" b="1" dirty="0" smtClean="0">
-                  <a:solidFill>
-                    <a:srgbClr val="C00000"/>
-                  </a:solidFill>
-                  <a:latin typeface="Trebuchet MS" pitchFamily="34" charset="0"/>
-                  <a:ea typeface="Tahoma" pitchFamily="34" charset="0"/>
-                  <a:cs typeface="Tahoma" pitchFamily="34" charset="0"/>
-                </a:rPr>
-                <a:t>Nov13</a:t>
-              </a:r>
-              <a:endParaRPr lang="en-US" b="1" dirty="0">
-                <a:solidFill>
-                  <a:srgbClr val="C00000"/>
-                </a:solidFill>
-                <a:latin typeface="Trebuchet MS" pitchFamily="34" charset="0"/>
-                <a:ea typeface="Tahoma" pitchFamily="34" charset="0"/>
-                <a:cs typeface="Tahoma" pitchFamily="34" charset="0"/>
-              </a:endParaRPr>
-            </a:p>
-          </p:txBody>
-        </p:sp>
-      </p:grpSp>
-      <p:sp>
-        <p:nvSpPr>
-          <p:cNvPr id="20" name="TextBox 19"/>
-          <p:cNvSpPr txBox="1"/>
-          <p:nvPr/>
-        </p:nvSpPr>
-        <p:spPr bwMode="auto">
-          <a:xfrm>
-            <a:off x="3347864" y="4360334"/>
-            <a:ext cx="1942456" cy="923330"/>
+            <a:off x="127000" y="3506936"/>
+            <a:ext cx="8890000" cy="2946400"/>
           </a:xfrm>
           <a:prstGeom prst="rect">
             <a:avLst/>
           </a:prstGeom>
-          <a:noFill/>
-          <a:ln w="3175" algn="ctr">
-            <a:noFill/>
-            <a:miter lim="800000"/>
-            <a:headEnd/>
-            <a:tailEnd/>
-          </a:ln>
-          <a:effectLst/>
         </p:spPr>
-        <p:txBody>
-          <a:bodyPr wrap="square" rtlCol="0">
-            <a:spAutoFit/>
-          </a:bodyPr>
-          <a:lstStyle/>
-          <a:p>
-            <a:pPr algn="ctr"/>
-            <a:r>
-              <a:rPr lang="en-US" sz="900" b="1" dirty="0">
-                <a:solidFill>
-                  <a:schemeClr val="tx2"/>
-                </a:solidFill>
-                <a:latin typeface="Trebuchet MS" pitchFamily="34" charset="0"/>
-                <a:cs typeface="Tahoma" pitchFamily="34" charset="0"/>
-              </a:rPr>
-              <a:t>Device </a:t>
-            </a:r>
-            <a:r>
-              <a:rPr lang="en-US" sz="900" b="1" dirty="0" smtClean="0">
-                <a:solidFill>
-                  <a:schemeClr val="tx2"/>
-                </a:solidFill>
-                <a:latin typeface="Trebuchet MS" pitchFamily="34" charset="0"/>
-                <a:cs typeface="Tahoma" pitchFamily="34" charset="0"/>
-              </a:rPr>
-              <a:t>partitioning</a:t>
-            </a:r>
-            <a:endParaRPr lang="en-US" sz="900" b="1" dirty="0">
-              <a:solidFill>
-                <a:schemeClr val="tx2"/>
-              </a:solidFill>
-              <a:latin typeface="Trebuchet MS" pitchFamily="34" charset="0"/>
-              <a:cs typeface="Tahoma" pitchFamily="34" charset="0"/>
-            </a:endParaRPr>
-          </a:p>
-          <a:p>
-            <a:pPr algn="ctr"/>
-            <a:r>
-              <a:rPr lang="en-US" sz="900" b="1" dirty="0" smtClean="0">
-                <a:solidFill>
-                  <a:schemeClr val="tx2"/>
-                </a:solidFill>
-                <a:latin typeface="Trebuchet MS" pitchFamily="34" charset="0"/>
-                <a:cs typeface="Tahoma" pitchFamily="34" charset="0"/>
-              </a:rPr>
-              <a:t>Separate </a:t>
-            </a:r>
-            <a:r>
-              <a:rPr lang="en-US" sz="900" b="1" dirty="0">
-                <a:solidFill>
-                  <a:schemeClr val="tx2"/>
-                </a:solidFill>
-                <a:latin typeface="Trebuchet MS" pitchFamily="34" charset="0"/>
-                <a:cs typeface="Tahoma" pitchFamily="34" charset="0"/>
-              </a:rPr>
-              <a:t>compilation and </a:t>
-            </a:r>
-            <a:r>
-              <a:rPr lang="en-US" sz="900" b="1" dirty="0" smtClean="0">
-                <a:solidFill>
-                  <a:schemeClr val="tx2"/>
-                </a:solidFill>
-                <a:latin typeface="Trebuchet MS" pitchFamily="34" charset="0"/>
-                <a:cs typeface="Tahoma" pitchFamily="34" charset="0"/>
-              </a:rPr>
-              <a:t>linking</a:t>
-            </a:r>
-            <a:endParaRPr lang="en-US" sz="900" b="1" dirty="0">
-              <a:solidFill>
-                <a:schemeClr val="tx2"/>
-              </a:solidFill>
-              <a:latin typeface="Trebuchet MS" pitchFamily="34" charset="0"/>
-              <a:cs typeface="Tahoma" pitchFamily="34" charset="0"/>
-            </a:endParaRPr>
-          </a:p>
-          <a:p>
-            <a:pPr algn="ctr"/>
-            <a:r>
-              <a:rPr lang="en-US" sz="900" b="1" dirty="0" smtClean="0">
-                <a:solidFill>
-                  <a:schemeClr val="tx2"/>
-                </a:solidFill>
-                <a:latin typeface="Trebuchet MS" pitchFamily="34" charset="0"/>
-                <a:cs typeface="Tahoma" pitchFamily="34" charset="0"/>
-              </a:rPr>
-              <a:t>Enhanced </a:t>
-            </a:r>
-            <a:r>
-              <a:rPr lang="en-US" sz="900" b="1" dirty="0">
-                <a:solidFill>
-                  <a:schemeClr val="tx2"/>
-                </a:solidFill>
-                <a:latin typeface="Trebuchet MS" pitchFamily="34" charset="0"/>
-                <a:cs typeface="Tahoma" pitchFamily="34" charset="0"/>
-              </a:rPr>
-              <a:t>image </a:t>
-            </a:r>
-            <a:r>
-              <a:rPr lang="en-US" sz="900" b="1" dirty="0" smtClean="0">
-                <a:solidFill>
-                  <a:schemeClr val="tx2"/>
-                </a:solidFill>
-                <a:latin typeface="Trebuchet MS" pitchFamily="34" charset="0"/>
-                <a:cs typeface="Tahoma" pitchFamily="34" charset="0"/>
-              </a:rPr>
-              <a:t>support</a:t>
-            </a:r>
-            <a:endParaRPr lang="en-US" sz="900" b="1" dirty="0">
-              <a:solidFill>
-                <a:schemeClr val="tx2"/>
-              </a:solidFill>
-              <a:latin typeface="Trebuchet MS" pitchFamily="34" charset="0"/>
-              <a:cs typeface="Tahoma" pitchFamily="34" charset="0"/>
-            </a:endParaRPr>
-          </a:p>
-          <a:p>
-            <a:pPr algn="ctr"/>
-            <a:r>
-              <a:rPr lang="en-US" sz="900" b="1" dirty="0" smtClean="0">
-                <a:solidFill>
-                  <a:schemeClr val="tx2"/>
-                </a:solidFill>
-                <a:latin typeface="Trebuchet MS" pitchFamily="34" charset="0"/>
-                <a:cs typeface="Tahoma" pitchFamily="34" charset="0"/>
-              </a:rPr>
-              <a:t>Built-in </a:t>
-            </a:r>
-            <a:r>
-              <a:rPr lang="en-US" sz="900" b="1" dirty="0">
-                <a:solidFill>
-                  <a:schemeClr val="tx2"/>
-                </a:solidFill>
-                <a:latin typeface="Trebuchet MS" pitchFamily="34" charset="0"/>
-                <a:cs typeface="Tahoma" pitchFamily="34" charset="0"/>
-              </a:rPr>
-              <a:t>kernels </a:t>
-            </a:r>
-            <a:r>
-              <a:rPr lang="en-US" sz="900" b="1" dirty="0" smtClean="0">
-                <a:solidFill>
-                  <a:schemeClr val="tx2"/>
-                </a:solidFill>
-                <a:latin typeface="Trebuchet MS" pitchFamily="34" charset="0"/>
-                <a:cs typeface="Tahoma" pitchFamily="34" charset="0"/>
-              </a:rPr>
-              <a:t>/ custom devices</a:t>
-            </a:r>
-            <a:endParaRPr lang="en-US" sz="900" b="1" dirty="0">
-              <a:solidFill>
-                <a:schemeClr val="tx2"/>
-              </a:solidFill>
-              <a:latin typeface="Trebuchet MS" pitchFamily="34" charset="0"/>
-              <a:cs typeface="Tahoma" pitchFamily="34" charset="0"/>
-            </a:endParaRPr>
-          </a:p>
-          <a:p>
-            <a:pPr algn="ctr"/>
-            <a:r>
-              <a:rPr lang="en-US" sz="900" b="1" dirty="0" smtClean="0">
-                <a:solidFill>
-                  <a:schemeClr val="tx2"/>
-                </a:solidFill>
-                <a:latin typeface="Trebuchet MS" pitchFamily="34" charset="0"/>
-                <a:cs typeface="Tahoma" pitchFamily="34" charset="0"/>
-              </a:rPr>
-              <a:t>Enhanced DX and OpenGL Interop</a:t>
-            </a:r>
-            <a:endParaRPr lang="en-US" sz="900" b="1" dirty="0">
-              <a:solidFill>
-                <a:schemeClr val="tx2"/>
-              </a:solidFill>
-              <a:latin typeface="Trebuchet MS" pitchFamily="34" charset="0"/>
-              <a:cs typeface="Tahoma" pitchFamily="34" charset="0"/>
-            </a:endParaRPr>
-          </a:p>
-        </p:txBody>
-      </p:sp>
-      <p:sp>
-        <p:nvSpPr>
-          <p:cNvPr id="21" name="TextBox 20"/>
-          <p:cNvSpPr txBox="1"/>
-          <p:nvPr/>
-        </p:nvSpPr>
-        <p:spPr bwMode="auto">
-          <a:xfrm>
-            <a:off x="5292080" y="3954983"/>
-            <a:ext cx="1517532" cy="1061829"/>
-          </a:xfrm>
-          <a:prstGeom prst="rect">
-            <a:avLst/>
-          </a:prstGeom>
-          <a:noFill/>
-          <a:ln w="3175" algn="ctr">
-            <a:noFill/>
-            <a:miter lim="800000"/>
-            <a:headEnd/>
-            <a:tailEnd/>
-          </a:ln>
-          <a:effectLst/>
-        </p:spPr>
-        <p:txBody>
-          <a:bodyPr wrap="none" rtlCol="0">
-            <a:spAutoFit/>
-          </a:bodyPr>
-          <a:lstStyle/>
-          <a:p>
-            <a:pPr algn="ctr"/>
-            <a:r>
-              <a:rPr lang="en-US" sz="900" b="1" dirty="0">
-                <a:solidFill>
-                  <a:schemeClr val="tx2"/>
-                </a:solidFill>
-                <a:latin typeface="Trebuchet MS" pitchFamily="34" charset="0"/>
-                <a:cs typeface="Tahoma" pitchFamily="34" charset="0"/>
-              </a:rPr>
-              <a:t>Shared Virtual Memory</a:t>
-            </a:r>
-          </a:p>
-          <a:p>
-            <a:pPr algn="ctr"/>
-            <a:r>
-              <a:rPr lang="en-US" sz="900" b="1" dirty="0" smtClean="0">
-                <a:solidFill>
-                  <a:schemeClr val="tx2"/>
-                </a:solidFill>
-                <a:latin typeface="Trebuchet MS" pitchFamily="34" charset="0"/>
-                <a:cs typeface="Tahoma" pitchFamily="34" charset="0"/>
-              </a:rPr>
-              <a:t>On-device dispatch</a:t>
-            </a:r>
-            <a:endParaRPr lang="en-US" sz="900" b="1" dirty="0">
-              <a:solidFill>
-                <a:schemeClr val="tx2"/>
-              </a:solidFill>
-              <a:latin typeface="Trebuchet MS" pitchFamily="34" charset="0"/>
-              <a:cs typeface="Tahoma" pitchFamily="34" charset="0"/>
-            </a:endParaRPr>
-          </a:p>
-          <a:p>
-            <a:pPr algn="ctr"/>
-            <a:r>
-              <a:rPr lang="en-US" sz="900" b="1" dirty="0">
-                <a:solidFill>
-                  <a:schemeClr val="tx2"/>
-                </a:solidFill>
-                <a:latin typeface="Trebuchet MS" pitchFamily="34" charset="0"/>
-                <a:cs typeface="Tahoma" pitchFamily="34" charset="0"/>
-              </a:rPr>
-              <a:t>Generic Address Space</a:t>
-            </a:r>
-          </a:p>
-          <a:p>
-            <a:pPr algn="ctr"/>
-            <a:r>
-              <a:rPr lang="en-US" sz="900" b="1" dirty="0">
-                <a:solidFill>
-                  <a:schemeClr val="tx2"/>
-                </a:solidFill>
-                <a:latin typeface="Trebuchet MS" pitchFamily="34" charset="0"/>
-                <a:cs typeface="Tahoma" pitchFamily="34" charset="0"/>
-              </a:rPr>
-              <a:t>Enhanced Image Support</a:t>
-            </a:r>
-          </a:p>
-          <a:p>
-            <a:pPr algn="ctr"/>
-            <a:r>
-              <a:rPr lang="en-US" sz="900" b="1" dirty="0">
-                <a:solidFill>
-                  <a:schemeClr val="tx2"/>
-                </a:solidFill>
-                <a:latin typeface="Trebuchet MS" pitchFamily="34" charset="0"/>
-                <a:cs typeface="Tahoma" pitchFamily="34" charset="0"/>
-              </a:rPr>
-              <a:t>C11 Atomics</a:t>
-            </a:r>
-          </a:p>
-          <a:p>
-            <a:pPr algn="ctr"/>
-            <a:r>
-              <a:rPr lang="en-US" sz="900" b="1" dirty="0">
-                <a:solidFill>
-                  <a:schemeClr val="tx2"/>
-                </a:solidFill>
-                <a:latin typeface="Trebuchet MS" pitchFamily="34" charset="0"/>
-                <a:cs typeface="Tahoma" pitchFamily="34" charset="0"/>
-              </a:rPr>
-              <a:t>Pipes</a:t>
-            </a:r>
-          </a:p>
-          <a:p>
-            <a:pPr algn="ctr"/>
-            <a:r>
-              <a:rPr lang="en-US" sz="900" b="1" dirty="0" smtClean="0">
-                <a:solidFill>
-                  <a:schemeClr val="tx2"/>
-                </a:solidFill>
-                <a:latin typeface="Trebuchet MS" pitchFamily="34" charset="0"/>
-                <a:cs typeface="Tahoma" pitchFamily="34" charset="0"/>
-              </a:rPr>
-              <a:t>Android ICD</a:t>
-            </a:r>
-            <a:endParaRPr lang="en-US" sz="900" b="1" dirty="0">
-              <a:solidFill>
-                <a:schemeClr val="tx2"/>
-              </a:solidFill>
-              <a:latin typeface="Trebuchet MS" pitchFamily="34" charset="0"/>
-              <a:cs typeface="Tahoma" pitchFamily="34" charset="0"/>
-            </a:endParaRPr>
-          </a:p>
-        </p:txBody>
-      </p:sp>
-      <p:sp>
-        <p:nvSpPr>
-          <p:cNvPr id="22" name="TextBox 21"/>
-          <p:cNvSpPr txBox="1"/>
-          <p:nvPr/>
-        </p:nvSpPr>
-        <p:spPr bwMode="auto">
-          <a:xfrm>
-            <a:off x="1187624" y="4415297"/>
-            <a:ext cx="2200899" cy="1061829"/>
-          </a:xfrm>
-          <a:prstGeom prst="rect">
-            <a:avLst/>
-          </a:prstGeom>
-          <a:noFill/>
-          <a:ln w="3175" algn="ctr">
-            <a:noFill/>
-            <a:miter lim="800000"/>
-            <a:headEnd/>
-            <a:tailEnd/>
-          </a:ln>
-          <a:effectLst/>
-        </p:spPr>
-        <p:txBody>
-          <a:bodyPr wrap="none" rtlCol="0">
-            <a:spAutoFit/>
-          </a:bodyPr>
-          <a:lstStyle/>
-          <a:p>
-            <a:pPr algn="ctr"/>
-            <a:r>
-              <a:rPr lang="en-US" sz="900" b="1" dirty="0">
-                <a:solidFill>
-                  <a:schemeClr val="tx2"/>
-                </a:solidFill>
-                <a:latin typeface="Trebuchet MS" pitchFamily="34" charset="0"/>
-                <a:cs typeface="Tahoma" pitchFamily="34" charset="0"/>
-              </a:rPr>
-              <a:t>3-component vectors</a:t>
-            </a:r>
-          </a:p>
-          <a:p>
-            <a:pPr algn="ctr"/>
-            <a:r>
-              <a:rPr lang="en-US" sz="900" b="1" dirty="0">
-                <a:solidFill>
-                  <a:schemeClr val="tx2"/>
-                </a:solidFill>
-                <a:latin typeface="Trebuchet MS" pitchFamily="34" charset="0"/>
-                <a:cs typeface="Tahoma" pitchFamily="34" charset="0"/>
-              </a:rPr>
-              <a:t>Additional image formats</a:t>
-            </a:r>
-          </a:p>
-          <a:p>
-            <a:pPr algn="ctr"/>
-            <a:r>
-              <a:rPr lang="en-US" sz="900" b="1" dirty="0">
-                <a:solidFill>
-                  <a:schemeClr val="tx2"/>
-                </a:solidFill>
-                <a:latin typeface="Trebuchet MS" pitchFamily="34" charset="0"/>
-                <a:cs typeface="Tahoma" pitchFamily="34" charset="0"/>
-              </a:rPr>
-              <a:t>Multiple hosts and devices</a:t>
-            </a:r>
-          </a:p>
-          <a:p>
-            <a:pPr algn="ctr"/>
-            <a:r>
-              <a:rPr lang="en-US" sz="900" b="1" dirty="0">
-                <a:solidFill>
-                  <a:schemeClr val="tx2"/>
-                </a:solidFill>
-                <a:latin typeface="Trebuchet MS" pitchFamily="34" charset="0"/>
-                <a:cs typeface="Tahoma" pitchFamily="34" charset="0"/>
-              </a:rPr>
-              <a:t>Buffer region operations</a:t>
-            </a:r>
-          </a:p>
-          <a:p>
-            <a:pPr algn="ctr"/>
-            <a:r>
-              <a:rPr lang="en-US" sz="900" b="1" dirty="0">
-                <a:solidFill>
-                  <a:schemeClr val="tx2"/>
-                </a:solidFill>
-                <a:latin typeface="Trebuchet MS" pitchFamily="34" charset="0"/>
-                <a:cs typeface="Tahoma" pitchFamily="34" charset="0"/>
-              </a:rPr>
-              <a:t>Enhanced </a:t>
-            </a:r>
-            <a:r>
-              <a:rPr lang="en-US" sz="900" b="1" dirty="0" smtClean="0">
-                <a:solidFill>
-                  <a:schemeClr val="tx2"/>
-                </a:solidFill>
-                <a:latin typeface="Trebuchet MS" pitchFamily="34" charset="0"/>
-                <a:cs typeface="Tahoma" pitchFamily="34" charset="0"/>
-              </a:rPr>
-              <a:t>event-driven </a:t>
-            </a:r>
-            <a:r>
-              <a:rPr lang="en-US" sz="900" b="1" dirty="0">
-                <a:solidFill>
-                  <a:schemeClr val="tx2"/>
-                </a:solidFill>
-                <a:latin typeface="Trebuchet MS" pitchFamily="34" charset="0"/>
-                <a:cs typeface="Tahoma" pitchFamily="34" charset="0"/>
-              </a:rPr>
-              <a:t>execution</a:t>
-            </a:r>
-          </a:p>
-          <a:p>
-            <a:pPr algn="ctr"/>
-            <a:r>
-              <a:rPr lang="en-US" sz="900" b="1" dirty="0">
-                <a:solidFill>
-                  <a:schemeClr val="tx2"/>
-                </a:solidFill>
-                <a:latin typeface="Trebuchet MS" pitchFamily="34" charset="0"/>
-                <a:cs typeface="Tahoma" pitchFamily="34" charset="0"/>
-              </a:rPr>
-              <a:t>Additional OpenCL C built-ins</a:t>
-            </a:r>
-          </a:p>
-          <a:p>
-            <a:pPr algn="ctr"/>
-            <a:r>
-              <a:rPr lang="en-US" sz="900" b="1" dirty="0">
-                <a:solidFill>
-                  <a:schemeClr val="tx2"/>
-                </a:solidFill>
-                <a:latin typeface="Trebuchet MS" pitchFamily="34" charset="0"/>
-                <a:cs typeface="Tahoma" pitchFamily="34" charset="0"/>
-              </a:rPr>
-              <a:t>Improved OpenGL </a:t>
-            </a:r>
-            <a:r>
-              <a:rPr lang="en-US" sz="900" b="1" dirty="0" smtClean="0">
-                <a:solidFill>
-                  <a:schemeClr val="tx2"/>
-                </a:solidFill>
-                <a:latin typeface="Trebuchet MS" pitchFamily="34" charset="0"/>
-                <a:cs typeface="Tahoma" pitchFamily="34" charset="0"/>
-              </a:rPr>
-              <a:t>data/event </a:t>
-            </a:r>
-            <a:r>
-              <a:rPr lang="en-US" sz="900" b="1" dirty="0">
-                <a:solidFill>
-                  <a:schemeClr val="tx2"/>
-                </a:solidFill>
-                <a:latin typeface="Trebuchet MS" pitchFamily="34" charset="0"/>
-                <a:cs typeface="Tahoma" pitchFamily="34" charset="0"/>
-              </a:rPr>
-              <a:t>interop</a:t>
-            </a:r>
-          </a:p>
-        </p:txBody>
-      </p:sp>
-      <p:sp>
-        <p:nvSpPr>
-          <p:cNvPr id="23" name="TextBox 22"/>
-          <p:cNvSpPr txBox="1"/>
-          <p:nvPr/>
-        </p:nvSpPr>
-        <p:spPr bwMode="auto">
-          <a:xfrm>
-            <a:off x="1342341" y="5699566"/>
-            <a:ext cx="751209" cy="230832"/>
-          </a:xfrm>
-          <a:prstGeom prst="rect">
-            <a:avLst/>
-          </a:prstGeom>
-          <a:noFill/>
-          <a:ln w="3175" algn="ctr">
-            <a:noFill/>
-            <a:miter lim="800000"/>
-            <a:headEnd/>
-            <a:tailEnd/>
-          </a:ln>
-          <a:effectLst/>
-        </p:spPr>
-        <p:txBody>
-          <a:bodyPr wrap="none" rtlCol="0">
-            <a:spAutoFit/>
-          </a:bodyPr>
-          <a:lstStyle/>
-          <a:p>
-            <a:pPr algn="ctr"/>
-            <a:r>
-              <a:rPr lang="en-US" sz="900" b="1" dirty="0" smtClean="0">
-                <a:solidFill>
-                  <a:schemeClr val="tx2"/>
-                </a:solidFill>
-                <a:latin typeface="Trebuchet MS" pitchFamily="34" charset="0"/>
-                <a:cs typeface="Tahoma" pitchFamily="34" charset="0"/>
-              </a:rPr>
-              <a:t>18 months</a:t>
-            </a:r>
-            <a:endParaRPr lang="en-US" sz="900" b="1" dirty="0">
-              <a:solidFill>
-                <a:schemeClr val="tx2"/>
-              </a:solidFill>
-              <a:latin typeface="Trebuchet MS" pitchFamily="34" charset="0"/>
-              <a:cs typeface="Tahoma" pitchFamily="34" charset="0"/>
-            </a:endParaRPr>
-          </a:p>
-        </p:txBody>
-      </p:sp>
-      <p:cxnSp>
-        <p:nvCxnSpPr>
-          <p:cNvPr id="24" name="Straight Arrow Connector 23"/>
-          <p:cNvCxnSpPr/>
-          <p:nvPr/>
-        </p:nvCxnSpPr>
-        <p:spPr bwMode="auto">
-          <a:xfrm>
-            <a:off x="1317408" y="5925706"/>
-            <a:ext cx="714593" cy="0"/>
-          </a:xfrm>
-          <a:prstGeom prst="straightConnector1">
-            <a:avLst/>
-          </a:prstGeom>
-          <a:solidFill>
-            <a:srgbClr val="E66714"/>
-          </a:solidFill>
-          <a:ln w="0" cap="flat" cmpd="sng" algn="ctr">
-            <a:solidFill>
-              <a:schemeClr val="tx1"/>
-            </a:solidFill>
-            <a:prstDash val="solid"/>
-            <a:round/>
-            <a:headEnd type="triangle" w="med" len="med"/>
-            <a:tailEnd type="triangle"/>
-          </a:ln>
-          <a:effectLst/>
-        </p:spPr>
-      </p:cxnSp>
-      <p:sp>
-        <p:nvSpPr>
-          <p:cNvPr id="25" name="TextBox 24"/>
-          <p:cNvSpPr txBox="1"/>
-          <p:nvPr/>
-        </p:nvSpPr>
-        <p:spPr bwMode="auto">
-          <a:xfrm>
-            <a:off x="3009434" y="5699566"/>
-            <a:ext cx="751209" cy="230832"/>
-          </a:xfrm>
-          <a:prstGeom prst="rect">
-            <a:avLst/>
-          </a:prstGeom>
-          <a:noFill/>
-          <a:ln w="3175" algn="ctr">
-            <a:noFill/>
-            <a:miter lim="800000"/>
-            <a:headEnd/>
-            <a:tailEnd/>
-          </a:ln>
-          <a:effectLst/>
-        </p:spPr>
-        <p:txBody>
-          <a:bodyPr wrap="none" rtlCol="0">
-            <a:spAutoFit/>
-          </a:bodyPr>
-          <a:lstStyle/>
-          <a:p>
-            <a:pPr algn="ctr"/>
-            <a:r>
-              <a:rPr lang="en-US" sz="900" b="1" dirty="0" smtClean="0">
-                <a:solidFill>
-                  <a:schemeClr val="tx2"/>
-                </a:solidFill>
-                <a:latin typeface="Trebuchet MS" pitchFamily="34" charset="0"/>
-                <a:cs typeface="Tahoma" pitchFamily="34" charset="0"/>
-              </a:rPr>
-              <a:t>18 months</a:t>
-            </a:r>
-            <a:endParaRPr lang="en-US" sz="900" b="1" dirty="0">
-              <a:solidFill>
-                <a:schemeClr val="tx2"/>
-              </a:solidFill>
-              <a:latin typeface="Trebuchet MS" pitchFamily="34" charset="0"/>
-              <a:cs typeface="Tahoma" pitchFamily="34" charset="0"/>
-            </a:endParaRPr>
-          </a:p>
-        </p:txBody>
-      </p:sp>
-      <p:cxnSp>
-        <p:nvCxnSpPr>
-          <p:cNvPr id="26" name="Straight Arrow Connector 25"/>
-          <p:cNvCxnSpPr/>
-          <p:nvPr/>
-        </p:nvCxnSpPr>
-        <p:spPr bwMode="auto">
-          <a:xfrm>
-            <a:off x="2984501" y="5933348"/>
-            <a:ext cx="823214" cy="0"/>
-          </a:xfrm>
-          <a:prstGeom prst="straightConnector1">
-            <a:avLst/>
-          </a:prstGeom>
-          <a:solidFill>
-            <a:srgbClr val="E66714"/>
-          </a:solidFill>
-          <a:ln w="0" cap="flat" cmpd="sng" algn="ctr">
-            <a:solidFill>
-              <a:schemeClr val="tx1"/>
-            </a:solidFill>
-            <a:prstDash val="solid"/>
-            <a:round/>
-            <a:headEnd type="triangle" w="med" len="med"/>
-            <a:tailEnd type="triangle"/>
-          </a:ln>
-          <a:effectLst/>
-        </p:spPr>
-      </p:cxnSp>
-      <p:sp>
-        <p:nvSpPr>
-          <p:cNvPr id="27" name="TextBox 26"/>
-          <p:cNvSpPr txBox="1"/>
-          <p:nvPr/>
-        </p:nvSpPr>
-        <p:spPr bwMode="auto">
-          <a:xfrm>
-            <a:off x="4904069" y="5699566"/>
-            <a:ext cx="751209" cy="230832"/>
-          </a:xfrm>
-          <a:prstGeom prst="rect">
-            <a:avLst/>
-          </a:prstGeom>
-          <a:noFill/>
-          <a:ln w="3175" algn="ctr">
-            <a:noFill/>
-            <a:miter lim="800000"/>
-            <a:headEnd/>
-            <a:tailEnd/>
-          </a:ln>
-          <a:effectLst/>
-        </p:spPr>
-        <p:txBody>
-          <a:bodyPr wrap="none" rtlCol="0">
-            <a:spAutoFit/>
-          </a:bodyPr>
-          <a:lstStyle/>
-          <a:p>
-            <a:pPr algn="ctr"/>
-            <a:r>
-              <a:rPr lang="en-US" sz="900" b="1" dirty="0" smtClean="0">
-                <a:solidFill>
-                  <a:schemeClr val="tx2"/>
-                </a:solidFill>
-                <a:latin typeface="Trebuchet MS" pitchFamily="34" charset="0"/>
-                <a:cs typeface="Tahoma" pitchFamily="34" charset="0"/>
-              </a:rPr>
-              <a:t>24 months</a:t>
-            </a:r>
-            <a:endParaRPr lang="en-US" sz="900" b="1" dirty="0">
-              <a:solidFill>
-                <a:schemeClr val="tx2"/>
-              </a:solidFill>
-              <a:latin typeface="Trebuchet MS" pitchFamily="34" charset="0"/>
-              <a:cs typeface="Tahoma" pitchFamily="34" charset="0"/>
-            </a:endParaRPr>
-          </a:p>
-        </p:txBody>
-      </p:sp>
-      <p:cxnSp>
-        <p:nvCxnSpPr>
-          <p:cNvPr id="28" name="Straight Arrow Connector 27"/>
-          <p:cNvCxnSpPr/>
-          <p:nvPr/>
-        </p:nvCxnSpPr>
-        <p:spPr bwMode="auto">
-          <a:xfrm>
-            <a:off x="4715297" y="5928259"/>
-            <a:ext cx="1124277" cy="0"/>
-          </a:xfrm>
-          <a:prstGeom prst="straightConnector1">
-            <a:avLst/>
-          </a:prstGeom>
-          <a:solidFill>
-            <a:srgbClr val="E66714"/>
-          </a:solidFill>
-          <a:ln w="0" cap="flat" cmpd="sng" algn="ctr">
-            <a:solidFill>
-              <a:schemeClr val="tx1"/>
-            </a:solidFill>
-            <a:prstDash val="solid"/>
-            <a:round/>
-            <a:headEnd type="triangle" w="med" len="med"/>
-            <a:tailEnd type="triangle"/>
-          </a:ln>
-          <a:effectLst/>
-        </p:spPr>
-      </p:cxnSp>
-      <p:grpSp>
-        <p:nvGrpSpPr>
-          <p:cNvPr id="29" name="Group 28"/>
-          <p:cNvGrpSpPr/>
-          <p:nvPr/>
-        </p:nvGrpSpPr>
-        <p:grpSpPr>
-          <a:xfrm>
-            <a:off x="7445576" y="5615017"/>
-            <a:ext cx="1158872" cy="871730"/>
-            <a:chOff x="7072757" y="4970329"/>
-            <a:chExt cx="1390646" cy="784557"/>
-          </a:xfrm>
-        </p:grpSpPr>
-        <p:sp>
-          <p:nvSpPr>
-            <p:cNvPr id="30" name="Text Box 9"/>
-            <p:cNvSpPr txBox="1">
-              <a:spLocks noChangeArrowheads="1"/>
-            </p:cNvSpPr>
-            <p:nvPr/>
-          </p:nvSpPr>
-          <p:spPr bwMode="auto">
-            <a:xfrm>
-              <a:off x="7072757" y="5239356"/>
-              <a:ext cx="1390646" cy="515530"/>
-            </a:xfrm>
-            <a:prstGeom prst="rect">
-              <a:avLst/>
-            </a:prstGeom>
-            <a:noFill/>
-            <a:ln w="3175" algn="ctr">
-              <a:noFill/>
-              <a:miter lim="800000"/>
-              <a:headEnd/>
-              <a:tailEnd/>
-            </a:ln>
-          </p:spPr>
-          <p:txBody>
-            <a:bodyPr wrap="square" lIns="91398" tIns="45701" rIns="91398" bIns="45701">
-              <a:spAutoFit/>
-            </a:bodyPr>
-            <a:lstStyle>
-              <a:defPPr>
-                <a:defRPr lang="en-US"/>
-              </a:defPPr>
-              <a:lvl1pPr algn="ctr">
-                <a:lnSpc>
-                  <a:spcPct val="80000"/>
-                </a:lnSpc>
-                <a:defRPr sz="1200" b="1">
-                  <a:solidFill>
-                    <a:schemeClr val="tx1"/>
-                  </a:solidFill>
-                  <a:latin typeface="Tahoma" pitchFamily="34" charset="0"/>
-                  <a:ea typeface="Tahoma" pitchFamily="34" charset="0"/>
-                  <a:cs typeface="Tahoma" pitchFamily="34" charset="0"/>
-                </a:defRPr>
-              </a:lvl1pPr>
-            </a:lstStyle>
-            <a:p>
-              <a:pPr>
-                <a:lnSpc>
-                  <a:spcPct val="90000"/>
-                </a:lnSpc>
-              </a:pPr>
-              <a:r>
-                <a:rPr lang="en-US" dirty="0">
-                  <a:latin typeface="Trebuchet MS" pitchFamily="34" charset="0"/>
-                </a:rPr>
-                <a:t>OpenCL </a:t>
-              </a:r>
-              <a:r>
-                <a:rPr lang="en-US" dirty="0" smtClean="0">
-                  <a:latin typeface="Trebuchet MS" pitchFamily="34" charset="0"/>
-                </a:rPr>
-                <a:t>2.1 </a:t>
-              </a:r>
-              <a:r>
-                <a:rPr lang="en-US" dirty="0">
-                  <a:latin typeface="Trebuchet MS" pitchFamily="34" charset="0"/>
-                </a:rPr>
-                <a:t/>
-              </a:r>
-              <a:br>
-                <a:rPr lang="en-US" dirty="0">
-                  <a:latin typeface="Trebuchet MS" pitchFamily="34" charset="0"/>
-                </a:rPr>
-              </a:br>
-              <a:r>
-                <a:rPr lang="en-US" dirty="0" smtClean="0">
-                  <a:latin typeface="Trebuchet MS" pitchFamily="34" charset="0"/>
-                </a:rPr>
-                <a:t>Specification</a:t>
-              </a:r>
-              <a:br>
-                <a:rPr lang="en-US" dirty="0" smtClean="0">
-                  <a:latin typeface="Trebuchet MS" pitchFamily="34" charset="0"/>
-                </a:rPr>
-              </a:br>
-              <a:r>
-                <a:rPr lang="en-US" sz="1050" dirty="0" smtClean="0">
-                  <a:latin typeface="Trebuchet MS" pitchFamily="34" charset="0"/>
-                </a:rPr>
-                <a:t>(Provisional)</a:t>
-              </a:r>
-              <a:endParaRPr lang="en-US" sz="1050" dirty="0">
-                <a:latin typeface="Trebuchet MS" pitchFamily="34" charset="0"/>
-              </a:endParaRPr>
-            </a:p>
-          </p:txBody>
-        </p:sp>
-        <p:sp>
-          <p:nvSpPr>
-            <p:cNvPr id="31" name="Text Box 22"/>
-            <p:cNvSpPr txBox="1">
-              <a:spLocks noChangeArrowheads="1"/>
-            </p:cNvSpPr>
-            <p:nvPr/>
-          </p:nvSpPr>
-          <p:spPr bwMode="auto">
-            <a:xfrm>
-              <a:off x="7301357" y="4970329"/>
-              <a:ext cx="1018410" cy="332365"/>
-            </a:xfrm>
-            <a:prstGeom prst="rect">
-              <a:avLst/>
-            </a:prstGeom>
-            <a:noFill/>
-            <a:ln w="3175" algn="ctr">
-              <a:noFill/>
-              <a:miter lim="800000"/>
-              <a:headEnd/>
-              <a:tailEnd/>
-            </a:ln>
-          </p:spPr>
-          <p:txBody>
-            <a:bodyPr wrap="none" lIns="91398" tIns="45701" rIns="91398" bIns="45701">
-              <a:spAutoFit/>
-            </a:bodyPr>
-            <a:lstStyle/>
-            <a:p>
-              <a:pPr>
-                <a:defRPr/>
-              </a:pPr>
-              <a:r>
-                <a:rPr lang="en-US" b="1" dirty="0" smtClean="0">
-                  <a:solidFill>
-                    <a:srgbClr val="C00000"/>
-                  </a:solidFill>
-                  <a:latin typeface="Trebuchet MS" pitchFamily="34" charset="0"/>
-                  <a:ea typeface="Tahoma" pitchFamily="34" charset="0"/>
-                  <a:cs typeface="Tahoma" pitchFamily="34" charset="0"/>
-                </a:rPr>
-                <a:t>Mar15</a:t>
-              </a:r>
-              <a:endParaRPr lang="en-US" b="1" dirty="0">
-                <a:solidFill>
-                  <a:srgbClr val="C00000"/>
-                </a:solidFill>
-                <a:latin typeface="Trebuchet MS" pitchFamily="34" charset="0"/>
-                <a:ea typeface="Tahoma" pitchFamily="34" charset="0"/>
-                <a:cs typeface="Tahoma" pitchFamily="34" charset="0"/>
-              </a:endParaRPr>
-            </a:p>
-          </p:txBody>
-        </p:sp>
-      </p:grpSp>
-      <p:sp>
-        <p:nvSpPr>
-          <p:cNvPr id="32" name="TextBox 31"/>
-          <p:cNvSpPr txBox="1"/>
-          <p:nvPr/>
-        </p:nvSpPr>
-        <p:spPr bwMode="auto">
-          <a:xfrm>
-            <a:off x="6813880" y="5699566"/>
-            <a:ext cx="751209" cy="230832"/>
-          </a:xfrm>
-          <a:prstGeom prst="rect">
-            <a:avLst/>
-          </a:prstGeom>
-          <a:noFill/>
-          <a:ln w="3175" algn="ctr">
-            <a:noFill/>
-            <a:miter lim="800000"/>
-            <a:headEnd/>
-            <a:tailEnd/>
-          </a:ln>
-          <a:effectLst/>
-        </p:spPr>
-        <p:txBody>
-          <a:bodyPr wrap="none" rtlCol="0">
-            <a:spAutoFit/>
-          </a:bodyPr>
-          <a:lstStyle/>
-          <a:p>
-            <a:pPr algn="ctr"/>
-            <a:r>
-              <a:rPr lang="en-US" sz="900" b="1" dirty="0" smtClean="0">
-                <a:solidFill>
-                  <a:schemeClr val="tx2"/>
-                </a:solidFill>
-                <a:latin typeface="Trebuchet MS" pitchFamily="34" charset="0"/>
-                <a:cs typeface="Tahoma" pitchFamily="34" charset="0"/>
-              </a:rPr>
-              <a:t>16 months</a:t>
-            </a:r>
-            <a:endParaRPr lang="en-US" sz="900" b="1" dirty="0">
-              <a:solidFill>
-                <a:schemeClr val="tx2"/>
-              </a:solidFill>
-              <a:latin typeface="Trebuchet MS" pitchFamily="34" charset="0"/>
-              <a:cs typeface="Tahoma" pitchFamily="34" charset="0"/>
-            </a:endParaRPr>
-          </a:p>
-        </p:txBody>
-      </p:sp>
-      <p:cxnSp>
-        <p:nvCxnSpPr>
-          <p:cNvPr id="33" name="Straight Arrow Connector 32"/>
-          <p:cNvCxnSpPr/>
-          <p:nvPr/>
-        </p:nvCxnSpPr>
-        <p:spPr bwMode="auto">
-          <a:xfrm>
-            <a:off x="6687810" y="5933348"/>
-            <a:ext cx="891918" cy="0"/>
-          </a:xfrm>
-          <a:prstGeom prst="straightConnector1">
-            <a:avLst/>
-          </a:prstGeom>
-          <a:solidFill>
-            <a:srgbClr val="E66714"/>
-          </a:solidFill>
-          <a:ln w="0" cap="flat" cmpd="sng" algn="ctr">
-            <a:solidFill>
-              <a:schemeClr val="tx1"/>
-            </a:solidFill>
-            <a:prstDash val="solid"/>
-            <a:round/>
-            <a:headEnd type="triangle" w="med" len="med"/>
-            <a:tailEnd type="triangle"/>
-          </a:ln>
-          <a:effectLst/>
-        </p:spPr>
-      </p:cxnSp>
-      <p:sp>
-        <p:nvSpPr>
-          <p:cNvPr id="34" name="TextBox 33"/>
-          <p:cNvSpPr txBox="1"/>
-          <p:nvPr/>
-        </p:nvSpPr>
-        <p:spPr bwMode="auto">
-          <a:xfrm>
-            <a:off x="6584872" y="3293031"/>
-            <a:ext cx="2607354" cy="1200329"/>
-          </a:xfrm>
-          <a:prstGeom prst="rect">
-            <a:avLst/>
-          </a:prstGeom>
-          <a:noFill/>
-          <a:ln w="3175" algn="ctr">
-            <a:noFill/>
-            <a:miter lim="800000"/>
-            <a:headEnd/>
-            <a:tailEnd/>
-          </a:ln>
-          <a:effectLst/>
-        </p:spPr>
-        <p:txBody>
-          <a:bodyPr wrap="none" rtlCol="0">
-            <a:spAutoFit/>
-          </a:bodyPr>
-          <a:lstStyle/>
-          <a:p>
-            <a:pPr algn="ctr"/>
-            <a:r>
-              <a:rPr lang="en-US" sz="1200" b="1" dirty="0" smtClean="0">
-                <a:solidFill>
-                  <a:schemeClr val="tx2"/>
-                </a:solidFill>
-                <a:latin typeface="Trebuchet MS" pitchFamily="34" charset="0"/>
-                <a:cs typeface="Tahoma" pitchFamily="34" charset="0"/>
-              </a:rPr>
-              <a:t>OpenCL C++ Shading language</a:t>
-            </a:r>
-          </a:p>
-          <a:p>
-            <a:pPr algn="ctr"/>
-            <a:r>
-              <a:rPr lang="en-US" sz="1200" b="1" dirty="0" smtClean="0">
-                <a:solidFill>
-                  <a:schemeClr val="tx2"/>
-                </a:solidFill>
-                <a:latin typeface="Trebuchet MS" pitchFamily="34" charset="0"/>
-                <a:cs typeface="Tahoma" pitchFamily="34" charset="0"/>
-              </a:rPr>
-              <a:t>SPIR-V in Core</a:t>
-            </a:r>
-          </a:p>
-          <a:p>
-            <a:pPr algn="ctr"/>
-            <a:r>
-              <a:rPr lang="en-US" sz="1200" b="1" dirty="0" smtClean="0">
-                <a:solidFill>
-                  <a:schemeClr val="tx2"/>
-                </a:solidFill>
-                <a:latin typeface="Trebuchet MS" pitchFamily="34" charset="0"/>
-                <a:cs typeface="Tahoma" pitchFamily="34" charset="0"/>
-              </a:rPr>
-              <a:t>Subgroups into core</a:t>
-            </a:r>
-          </a:p>
-          <a:p>
-            <a:pPr algn="ctr"/>
-            <a:r>
-              <a:rPr lang="en-US" sz="1200" b="1" dirty="0" smtClean="0">
-                <a:solidFill>
-                  <a:schemeClr val="tx2"/>
-                </a:solidFill>
-                <a:latin typeface="Trebuchet MS" pitchFamily="34" charset="0"/>
-                <a:cs typeface="Tahoma" pitchFamily="34" charset="0"/>
-              </a:rPr>
-              <a:t>Subgroup </a:t>
-            </a:r>
-            <a:r>
-              <a:rPr lang="en-US" sz="1200" b="1" dirty="0">
-                <a:solidFill>
-                  <a:schemeClr val="tx2"/>
-                </a:solidFill>
-                <a:latin typeface="Trebuchet MS" pitchFamily="34" charset="0"/>
-                <a:cs typeface="Tahoma" pitchFamily="34" charset="0"/>
-              </a:rPr>
-              <a:t>query operations</a:t>
-            </a:r>
-          </a:p>
-          <a:p>
-            <a:pPr algn="ctr"/>
-            <a:r>
-              <a:rPr lang="en-US" sz="1200" b="1" dirty="0" smtClean="0">
-                <a:solidFill>
-                  <a:schemeClr val="tx2"/>
-                </a:solidFill>
-                <a:latin typeface="Trebuchet MS" pitchFamily="34" charset="0"/>
-                <a:cs typeface="Tahoma" pitchFamily="34" charset="0"/>
-              </a:rPr>
-              <a:t>clCloneKernel</a:t>
-            </a:r>
-          </a:p>
-          <a:p>
-            <a:pPr algn="ctr"/>
-            <a:r>
-              <a:rPr lang="en-US" sz="1200" b="1" dirty="0" smtClean="0">
-                <a:solidFill>
-                  <a:schemeClr val="tx2"/>
-                </a:solidFill>
-                <a:latin typeface="Trebuchet MS" pitchFamily="34" charset="0"/>
-                <a:cs typeface="Tahoma" pitchFamily="34" charset="0"/>
-              </a:rPr>
-              <a:t>Low-latency </a:t>
-            </a:r>
-            <a:r>
-              <a:rPr lang="en-US" sz="1200" b="1" dirty="0">
-                <a:solidFill>
-                  <a:schemeClr val="tx2"/>
-                </a:solidFill>
-                <a:latin typeface="Trebuchet MS" pitchFamily="34" charset="0"/>
-                <a:cs typeface="Tahoma" pitchFamily="34" charset="0"/>
-              </a:rPr>
-              <a:t>device timer queries </a:t>
-            </a:r>
-          </a:p>
-        </p:txBody>
-      </p:sp>
+      </p:pic>
     </p:spTree>
     <p:extLst>
       <p:ext uri="{BB962C8B-B14F-4D97-AF65-F5344CB8AC3E}">
@@ -11757,91 +9949,9 @@
   <p:timing>
     <p:tnLst>
       <p:par>
-        <p:cTn xmlns:p14="http://schemas.microsoft.com/office/powerpoint/2010/main" id="1" dur="indefinite" restart="never" nodeType="tmRoot">
-          <p:childTnLst>
-            <p:seq concurrent="1" nextAc="seek">
-              <p:cTn id="2" dur="indefinite" nodeType="mainSeq">
-                <p:childTnLst>
-                  <p:par>
-                    <p:cTn id="3" fill="hold">
-                      <p:stCondLst>
-                        <p:cond delay="indefinite"/>
-                        <p:cond evt="onBegin" delay="0">
-                          <p:tn val="2"/>
-                        </p:cond>
-                      </p:stCondLst>
-                      <p:childTnLst>
-                        <p:par>
-                          <p:cTn id="4" fill="hold">
-                            <p:stCondLst>
-                              <p:cond delay="0"/>
-                            </p:stCondLst>
-                            <p:childTnLst>
-                              <p:par>
-                                <p:cTn id="5" presetID="10" presetClass="entr" presetSubtype="0" fill="hold" grpId="0" nodeType="withEffect">
-                                  <p:stCondLst>
-                                    <p:cond delay="0"/>
-                                  </p:stCondLst>
-                                  <p:childTnLst>
-                                    <p:set>
-                                      <p:cBhvr>
-                                        <p:cTn id="6" dur="1" fill="hold">
-                                          <p:stCondLst>
-                                            <p:cond delay="0"/>
-                                          </p:stCondLst>
-                                        </p:cTn>
-                                        <p:tgtEl>
-                                          <p:spTgt spid="6"/>
-                                        </p:tgtEl>
-                                        <p:attrNameLst>
-                                          <p:attrName>style.visibility</p:attrName>
-                                        </p:attrNameLst>
-                                      </p:cBhvr>
-                                      <p:to>
-                                        <p:strVal val="visible"/>
-                                      </p:to>
-                                    </p:set>
-                                    <p:animEffect transition="in" filter="fade">
-                                      <p:cBhvr>
-                                        <p:cTn id="7" dur="500"/>
-                                        <p:tgtEl>
-                                          <p:spTgt spid="6"/>
-                                        </p:tgtEl>
-                                      </p:cBhvr>
-                                    </p:animEffect>
-                                  </p:childTnLst>
-                                </p:cTn>
-                              </p:par>
-                            </p:childTnLst>
-                          </p:cTn>
-                        </p:par>
-                      </p:childTnLst>
-                    </p:cTn>
-                  </p:par>
-                </p:childTnLst>
-              </p:cTn>
-              <p:prevCondLst>
-                <p:cond evt="onPrev" delay="0">
-                  <p:tgtEl>
-                    <p:sldTgt/>
-                  </p:tgtEl>
-                </p:cond>
-              </p:prevCondLst>
-              <p:nextCondLst>
-                <p:cond evt="onNext" delay="0">
-                  <p:tgtEl>
-                    <p:sldTgt/>
-                  </p:tgtEl>
-                </p:cond>
-              </p:nextCondLst>
-            </p:seq>
-          </p:childTnLst>
-        </p:cTn>
+        <p:cTn xmlns:p14="http://schemas.microsoft.com/office/powerpoint/2010/main" id="1" dur="indefinite" restart="never" nodeType="tmRoot"/>
       </p:par>
     </p:tnLst>
-    <p:bldLst>
-      <p:bldP spid="6" grpId="0" animBg="1"/>
-    </p:bldLst>
   </p:timing>
 </p:sld>
 </file>

</xml_diff>

<commit_message>
Add list of zoo nodes to intro slide
</commit_message>
<xml_diff>
--- a/slides/advanced_intro.pptx
+++ b/slides/advanced_intro.pptx
@@ -30852,10 +30852,15 @@
             <p:ph idx="1"/>
           </p:nvPr>
         </p:nvSpPr>
-        <p:spPr/>
+        <p:spPr>
+          <a:xfrm>
+            <a:off x="457200" y="1600200"/>
+            <a:ext cx="8229600" cy="4925144"/>
+          </a:xfrm>
+        </p:spPr>
         <p:txBody>
           <a:bodyPr>
-            <a:normAutofit fontScale="92500" lnSpcReduction="20000"/>
+            <a:normAutofit fontScale="70000" lnSpcReduction="20000"/>
           </a:bodyPr>
           <a:lstStyle/>
           <a:p>
@@ -30974,8 +30979,125 @@
                 </a:solidFill>
                 <a:cs typeface="Courier New"/>
               </a:rPr>
-              <a:t>SSH into one of the nodes to run</a:t>
-            </a:r>
+              <a:t>SSH into one of the nodes to </a:t>
+            </a:r>
+            <a:r>
+              <a:rPr lang="en-US" b="1" dirty="0" smtClean="0">
+                <a:solidFill>
+                  <a:srgbClr val="000000"/>
+                </a:solidFill>
+                <a:cs typeface="Courier New"/>
+              </a:rPr>
+              <a:t>run</a:t>
+            </a:r>
+          </a:p>
+          <a:p>
+            <a:pPr lvl="1"/>
+            <a:r>
+              <a:rPr lang="en-US" dirty="0" err="1" smtClean="0">
+                <a:solidFill>
+                  <a:srgbClr val="000000"/>
+                </a:solidFill>
+                <a:cs typeface="Courier New"/>
+              </a:rPr>
+              <a:t>yawai</a:t>
+            </a:r>
+            <a:r>
+              <a:rPr lang="en-US" dirty="0" smtClean="0">
+                <a:solidFill>
+                  <a:srgbClr val="000000"/>
+                </a:solidFill>
+                <a:cs typeface="Courier New"/>
+              </a:rPr>
+              <a:t>: NVIDIA K40c, K20c</a:t>
+            </a:r>
+          </a:p>
+          <a:p>
+            <a:pPr lvl="1"/>
+            <a:r>
+              <a:rPr lang="en-US" dirty="0" err="1" smtClean="0">
+                <a:solidFill>
+                  <a:srgbClr val="000000"/>
+                </a:solidFill>
+                <a:cs typeface="Courier New"/>
+              </a:rPr>
+              <a:t>rekt</a:t>
+            </a:r>
+            <a:r>
+              <a:rPr lang="en-US" dirty="0" smtClean="0">
+                <a:solidFill>
+                  <a:srgbClr val="000000"/>
+                </a:solidFill>
+                <a:cs typeface="Courier New"/>
+              </a:rPr>
+              <a:t>: S9150, AMD A10-7850K APU</a:t>
+            </a:r>
+          </a:p>
+          <a:p>
+            <a:pPr lvl="1"/>
+            <a:r>
+              <a:rPr lang="en-US" dirty="0" err="1">
+                <a:solidFill>
+                  <a:srgbClr val="000000"/>
+                </a:solidFill>
+                <a:cs typeface="Courier New"/>
+              </a:rPr>
+              <a:t>o</a:t>
+            </a:r>
+            <a:r>
+              <a:rPr lang="en-US" dirty="0" err="1" smtClean="0">
+                <a:solidFill>
+                  <a:srgbClr val="000000"/>
+                </a:solidFill>
+                <a:cs typeface="Courier New"/>
+              </a:rPr>
+              <a:t>hmai</a:t>
+            </a:r>
+            <a:r>
+              <a:rPr lang="en-US" dirty="0" smtClean="0">
+                <a:solidFill>
+                  <a:srgbClr val="000000"/>
+                </a:solidFill>
+                <a:cs typeface="Courier New"/>
+              </a:rPr>
+              <a:t>: NVIDIA GTX980, GTX580</a:t>
+            </a:r>
+          </a:p>
+          <a:p>
+            <a:pPr lvl="1"/>
+            <a:r>
+              <a:rPr lang="en-US" dirty="0" err="1">
+                <a:solidFill>
+                  <a:srgbClr val="000000"/>
+                </a:solidFill>
+                <a:cs typeface="Courier New"/>
+              </a:rPr>
+              <a:t>a</a:t>
+            </a:r>
+            <a:r>
+              <a:rPr lang="en-US" dirty="0" err="1" smtClean="0">
+                <a:solidFill>
+                  <a:srgbClr val="000000"/>
+                </a:solidFill>
+                <a:cs typeface="Courier New"/>
+              </a:rPr>
+              <a:t>wyiss</a:t>
+            </a:r>
+            <a:r>
+              <a:rPr lang="en-US" dirty="0" smtClean="0">
+                <a:solidFill>
+                  <a:srgbClr val="000000"/>
+                </a:solidFill>
+                <a:cs typeface="Courier New"/>
+              </a:rPr>
+              <a:t>: AMD R9295X2, S10000</a:t>
+            </a:r>
+            <a:endParaRPr lang="en-US" dirty="0" smtClean="0">
+              <a:solidFill>
+                <a:srgbClr val="000000"/>
+              </a:solidFill>
+              <a:cs typeface="Courier New"/>
+            </a:endParaRPr>
           </a:p>
           <a:p>
             <a:endParaRPr lang="en-US" b="1" dirty="0" smtClean="0">

</xml_diff>

<commit_message>
Minor update to C++ example at end of intro slides
</commit_message>
<xml_diff>
--- a/slides/advanced_intro.pptx
+++ b/slides/advanced_intro.pptx
@@ -264,7 +264,7 @@
             <a:fld id="{92597E5C-85BB-4669-9209-B5E04E6ED101}" type="datetimeFigureOut">
               <a:rPr lang="en-GB" smtClean="0"/>
               <a:pPr/>
-              <a:t>14/04/16</a:t>
+              <a:t>19/04/16</a:t>
             </a:fld>
             <a:endParaRPr lang="en-GB"/>
           </a:p>
@@ -1128,7 +1128,7 @@
             <a:fld id="{19E03964-7D59-4BF8-AE10-3A215A42C3E4}" type="datetime1">
               <a:rPr lang="en-GB" smtClean="0"/>
               <a:pPr/>
-              <a:t>14/04/16</a:t>
+              <a:t>19/04/16</a:t>
             </a:fld>
             <a:endParaRPr lang="en-GB"/>
           </a:p>
@@ -1295,7 +1295,7 @@
             <a:fld id="{8E5ADEB7-8139-4AC1-94DC-FE9E54B1CCD2}" type="datetime1">
               <a:rPr lang="en-GB" smtClean="0"/>
               <a:pPr/>
-              <a:t>14/04/16</a:t>
+              <a:t>19/04/16</a:t>
             </a:fld>
             <a:endParaRPr lang="en-GB"/>
           </a:p>
@@ -1472,7 +1472,7 @@
             <a:fld id="{9C77A686-1785-49A1-B4C9-55A3C7EEADE4}" type="datetime1">
               <a:rPr lang="en-GB" smtClean="0"/>
               <a:pPr/>
-              <a:t>14/04/16</a:t>
+              <a:t>19/04/16</a:t>
             </a:fld>
             <a:endParaRPr lang="en-GB"/>
           </a:p>
@@ -1711,7 +1711,7 @@
             <a:fld id="{19E03964-7D59-4BF8-AE10-3A215A42C3E4}" type="datetime1">
               <a:rPr lang="en-GB" smtClean="0"/>
               <a:pPr/>
-              <a:t>14/04/16</a:t>
+              <a:t>19/04/16</a:t>
             </a:fld>
             <a:endParaRPr lang="en-GB"/>
           </a:p>
@@ -1878,7 +1878,7 @@
             <a:fld id="{D65327FA-D1E5-40CA-8941-3DD0B6730F8A}" type="datetime1">
               <a:rPr lang="en-GB" smtClean="0"/>
               <a:pPr/>
-              <a:t>14/04/16</a:t>
+              <a:t>19/04/16</a:t>
             </a:fld>
             <a:endParaRPr lang="en-GB"/>
           </a:p>
@@ -2121,7 +2121,7 @@
             <a:fld id="{DB33F153-90AC-449F-A303-26940247ABC8}" type="datetime1">
               <a:rPr lang="en-GB" smtClean="0"/>
               <a:pPr/>
-              <a:t>14/04/16</a:t>
+              <a:t>19/04/16</a:t>
             </a:fld>
             <a:endParaRPr lang="en-GB"/>
           </a:p>
@@ -2406,7 +2406,7 @@
             <a:fld id="{84E24492-3EA5-478D-9F72-7B8FF369DDEB}" type="datetime1">
               <a:rPr lang="en-GB" smtClean="0"/>
               <a:pPr/>
-              <a:t>14/04/16</a:t>
+              <a:t>19/04/16</a:t>
             </a:fld>
             <a:endParaRPr lang="en-GB"/>
           </a:p>
@@ -2825,7 +2825,7 @@
             <a:fld id="{43976A03-596E-4490-AE35-AFB744E08901}" type="datetime1">
               <a:rPr lang="en-GB" smtClean="0"/>
               <a:pPr/>
-              <a:t>14/04/16</a:t>
+              <a:t>19/04/16</a:t>
             </a:fld>
             <a:endParaRPr lang="en-GB"/>
           </a:p>
@@ -2940,7 +2940,7 @@
             <a:fld id="{4C8E3CB4-829C-4F19-9E86-B2AAEC36BD90}" type="datetime1">
               <a:rPr lang="en-GB" smtClean="0"/>
               <a:pPr/>
-              <a:t>14/04/16</a:t>
+              <a:t>19/04/16</a:t>
             </a:fld>
             <a:endParaRPr lang="en-GB"/>
           </a:p>
@@ -3032,7 +3032,7 @@
             <a:fld id="{D4A6FE01-96D8-461F-B1B2-1F0C16D98900}" type="datetime1">
               <a:rPr lang="en-GB" smtClean="0"/>
               <a:pPr/>
-              <a:t>14/04/16</a:t>
+              <a:t>19/04/16</a:t>
             </a:fld>
             <a:endParaRPr lang="en-GB"/>
           </a:p>
@@ -3306,7 +3306,7 @@
             <a:fld id="{B24CB088-CFF7-44C4-9CCE-18845754E6D4}" type="datetime1">
               <a:rPr lang="en-GB" smtClean="0"/>
               <a:pPr/>
-              <a:t>14/04/16</a:t>
+              <a:t>19/04/16</a:t>
             </a:fld>
             <a:endParaRPr lang="en-GB"/>
           </a:p>
@@ -3473,7 +3473,7 @@
             <a:fld id="{D65327FA-D1E5-40CA-8941-3DD0B6730F8A}" type="datetime1">
               <a:rPr lang="en-GB" smtClean="0"/>
               <a:pPr/>
-              <a:t>14/04/16</a:t>
+              <a:t>19/04/16</a:t>
             </a:fld>
             <a:endParaRPr lang="en-GB"/>
           </a:p>
@@ -3727,7 +3727,7 @@
             <a:fld id="{CD3A280C-4DEC-4EEC-BD59-A30886E06BA1}" type="datetime1">
               <a:rPr lang="en-GB" smtClean="0"/>
               <a:pPr/>
-              <a:t>14/04/16</a:t>
+              <a:t>19/04/16</a:t>
             </a:fld>
             <a:endParaRPr lang="en-GB"/>
           </a:p>
@@ -3894,7 +3894,7 @@
             <a:fld id="{8E5ADEB7-8139-4AC1-94DC-FE9E54B1CCD2}" type="datetime1">
               <a:rPr lang="en-GB" smtClean="0"/>
               <a:pPr/>
-              <a:t>14/04/16</a:t>
+              <a:t>19/04/16</a:t>
             </a:fld>
             <a:endParaRPr lang="en-GB"/>
           </a:p>
@@ -4071,7 +4071,7 @@
             <a:fld id="{9C77A686-1785-49A1-B4C9-55A3C7EEADE4}" type="datetime1">
               <a:rPr lang="en-GB" smtClean="0"/>
               <a:pPr/>
-              <a:t>14/04/16</a:t>
+              <a:t>19/04/16</a:t>
             </a:fld>
             <a:endParaRPr lang="en-GB"/>
           </a:p>
@@ -4621,7 +4621,7 @@
             <a:fld id="{DB33F153-90AC-449F-A303-26940247ABC8}" type="datetime1">
               <a:rPr lang="en-GB" smtClean="0"/>
               <a:pPr/>
-              <a:t>14/04/16</a:t>
+              <a:t>19/04/16</a:t>
             </a:fld>
             <a:endParaRPr lang="en-GB"/>
           </a:p>
@@ -4906,7 +4906,7 @@
             <a:fld id="{84E24492-3EA5-478D-9F72-7B8FF369DDEB}" type="datetime1">
               <a:rPr lang="en-GB" smtClean="0"/>
               <a:pPr/>
-              <a:t>14/04/16</a:t>
+              <a:t>19/04/16</a:t>
             </a:fld>
             <a:endParaRPr lang="en-GB"/>
           </a:p>
@@ -5325,7 +5325,7 @@
             <a:fld id="{43976A03-596E-4490-AE35-AFB744E08901}" type="datetime1">
               <a:rPr lang="en-GB" smtClean="0"/>
               <a:pPr/>
-              <a:t>14/04/16</a:t>
+              <a:t>19/04/16</a:t>
             </a:fld>
             <a:endParaRPr lang="en-GB"/>
           </a:p>
@@ -5440,7 +5440,7 @@
             <a:fld id="{4C8E3CB4-829C-4F19-9E86-B2AAEC36BD90}" type="datetime1">
               <a:rPr lang="en-GB" smtClean="0"/>
               <a:pPr/>
-              <a:t>14/04/16</a:t>
+              <a:t>19/04/16</a:t>
             </a:fld>
             <a:endParaRPr lang="en-GB"/>
           </a:p>
@@ -5532,7 +5532,7 @@
             <a:fld id="{D4A6FE01-96D8-461F-B1B2-1F0C16D98900}" type="datetime1">
               <a:rPr lang="en-GB" smtClean="0"/>
               <a:pPr/>
-              <a:t>14/04/16</a:t>
+              <a:t>19/04/16</a:t>
             </a:fld>
             <a:endParaRPr lang="en-GB"/>
           </a:p>
@@ -5806,7 +5806,7 @@
             <a:fld id="{B24CB088-CFF7-44C4-9CCE-18845754E6D4}" type="datetime1">
               <a:rPr lang="en-GB" smtClean="0"/>
               <a:pPr/>
-              <a:t>14/04/16</a:t>
+              <a:t>19/04/16</a:t>
             </a:fld>
             <a:endParaRPr lang="en-GB"/>
           </a:p>
@@ -6060,7 +6060,7 @@
             <a:fld id="{CD3A280C-4DEC-4EEC-BD59-A30886E06BA1}" type="datetime1">
               <a:rPr lang="en-GB" smtClean="0"/>
               <a:pPr/>
-              <a:t>14/04/16</a:t>
+              <a:t>19/04/16</a:t>
             </a:fld>
             <a:endParaRPr lang="en-GB"/>
           </a:p>
@@ -6270,7 +6270,7 @@
             <a:fld id="{E222BC38-3FAE-415B-AD1C-2D338E3D6B03}" type="datetime1">
               <a:rPr lang="en-GB" smtClean="0"/>
               <a:pPr/>
-              <a:t>14/04/16</a:t>
+              <a:t>19/04/16</a:t>
             </a:fld>
             <a:endParaRPr lang="en-GB"/>
           </a:p>
@@ -6778,7 +6778,7 @@
             <a:fld id="{E222BC38-3FAE-415B-AD1C-2D338E3D6B03}" type="datetime1">
               <a:rPr lang="en-GB" smtClean="0"/>
               <a:pPr/>
-              <a:t>14/04/16</a:t>
+              <a:t>19/04/16</a:t>
             </a:fld>
             <a:endParaRPr lang="en-GB"/>
           </a:p>
@@ -29937,7 +29937,7 @@
               <a:rPr lang="en-GB" sz="1200" b="1" dirty="0" smtClean="0">
                 <a:latin typeface="Courier New Bold"/>
               </a:rPr>
-              <a:t>                              </a:t>
+              <a:t>            </a:t>
             </a:r>
             <a:r>
               <a:rPr lang="en-GB" sz="1200" b="1" dirty="0" err="1" smtClean="0">
@@ -30161,7 +30161,7 @@
               <a:rPr lang="en-GB" sz="1200" b="1" dirty="0" err="1" smtClean="0">
                 <a:latin typeface="Courier New Bold"/>
               </a:rPr>
-              <a:t>hc.</a:t>
+              <a:t>h_c.</a:t>
             </a:r>
             <a:r>
               <a:rPr lang="en-GB" sz="1200" b="1" dirty="0" err="1" smtClean="0">
@@ -30184,7 +30184,7 @@
               <a:rPr lang="en-GB" sz="1200" b="1" dirty="0" err="1" smtClean="0">
                 <a:latin typeface="Courier New Bold"/>
               </a:rPr>
-              <a:t>hc.</a:t>
+              <a:t>h_c.</a:t>
             </a:r>
             <a:r>
               <a:rPr lang="en-GB" sz="1200" b="1" dirty="0" err="1" smtClean="0">
@@ -30979,16 +30979,7 @@
                 </a:solidFill>
                 <a:cs typeface="Courier New"/>
               </a:rPr>
-              <a:t>SSH into one of the nodes to </a:t>
-            </a:r>
-            <a:r>
-              <a:rPr lang="en-US" b="1" dirty="0" smtClean="0">
-                <a:solidFill>
-                  <a:srgbClr val="000000"/>
-                </a:solidFill>
-                <a:cs typeface="Courier New"/>
-              </a:rPr>
-              <a:t>run</a:t>
+              <a:t>SSH into one of the nodes to run</a:t>
             </a:r>
           </a:p>
           <a:p>
@@ -31092,12 +31083,6 @@
               </a:rPr>
               <a:t>: AMD R9295X2, S10000</a:t>
             </a:r>
-            <a:endParaRPr lang="en-US" dirty="0" smtClean="0">
-              <a:solidFill>
-                <a:srgbClr val="000000"/>
-              </a:solidFill>
-              <a:cs typeface="Courier New"/>
-            </a:endParaRPr>
           </a:p>
           <a:p>
             <a:endParaRPr lang="en-US" b="1" dirty="0" smtClean="0">

</xml_diff>

<commit_message>
Update Zoo information slide in intro
</commit_message>
<xml_diff>
--- a/slides/advanced_intro.pptx
+++ b/slides/advanced_intro.pptx
@@ -264,7 +264,7 @@
             <a:fld id="{92597E5C-85BB-4669-9209-B5E04E6ED101}" type="datetimeFigureOut">
               <a:rPr lang="en-GB" smtClean="0"/>
               <a:pPr/>
-              <a:t>19/04/16</a:t>
+              <a:t>11/05/17</a:t>
             </a:fld>
             <a:endParaRPr lang="en-GB"/>
           </a:p>
@@ -1128,7 +1128,7 @@
             <a:fld id="{19E03964-7D59-4BF8-AE10-3A215A42C3E4}" type="datetime1">
               <a:rPr lang="en-GB" smtClean="0"/>
               <a:pPr/>
-              <a:t>19/04/16</a:t>
+              <a:t>11/05/17</a:t>
             </a:fld>
             <a:endParaRPr lang="en-GB"/>
           </a:p>
@@ -1295,7 +1295,7 @@
             <a:fld id="{8E5ADEB7-8139-4AC1-94DC-FE9E54B1CCD2}" type="datetime1">
               <a:rPr lang="en-GB" smtClean="0"/>
               <a:pPr/>
-              <a:t>19/04/16</a:t>
+              <a:t>11/05/17</a:t>
             </a:fld>
             <a:endParaRPr lang="en-GB"/>
           </a:p>
@@ -1472,7 +1472,7 @@
             <a:fld id="{9C77A686-1785-49A1-B4C9-55A3C7EEADE4}" type="datetime1">
               <a:rPr lang="en-GB" smtClean="0"/>
               <a:pPr/>
-              <a:t>19/04/16</a:t>
+              <a:t>11/05/17</a:t>
             </a:fld>
             <a:endParaRPr lang="en-GB"/>
           </a:p>
@@ -1711,7 +1711,7 @@
             <a:fld id="{19E03964-7D59-4BF8-AE10-3A215A42C3E4}" type="datetime1">
               <a:rPr lang="en-GB" smtClean="0"/>
               <a:pPr/>
-              <a:t>19/04/16</a:t>
+              <a:t>11/05/17</a:t>
             </a:fld>
             <a:endParaRPr lang="en-GB"/>
           </a:p>
@@ -1878,7 +1878,7 @@
             <a:fld id="{D65327FA-D1E5-40CA-8941-3DD0B6730F8A}" type="datetime1">
               <a:rPr lang="en-GB" smtClean="0"/>
               <a:pPr/>
-              <a:t>19/04/16</a:t>
+              <a:t>11/05/17</a:t>
             </a:fld>
             <a:endParaRPr lang="en-GB"/>
           </a:p>
@@ -2121,7 +2121,7 @@
             <a:fld id="{DB33F153-90AC-449F-A303-26940247ABC8}" type="datetime1">
               <a:rPr lang="en-GB" smtClean="0"/>
               <a:pPr/>
-              <a:t>19/04/16</a:t>
+              <a:t>11/05/17</a:t>
             </a:fld>
             <a:endParaRPr lang="en-GB"/>
           </a:p>
@@ -2406,7 +2406,7 @@
             <a:fld id="{84E24492-3EA5-478D-9F72-7B8FF369DDEB}" type="datetime1">
               <a:rPr lang="en-GB" smtClean="0"/>
               <a:pPr/>
-              <a:t>19/04/16</a:t>
+              <a:t>11/05/17</a:t>
             </a:fld>
             <a:endParaRPr lang="en-GB"/>
           </a:p>
@@ -2825,7 +2825,7 @@
             <a:fld id="{43976A03-596E-4490-AE35-AFB744E08901}" type="datetime1">
               <a:rPr lang="en-GB" smtClean="0"/>
               <a:pPr/>
-              <a:t>19/04/16</a:t>
+              <a:t>11/05/17</a:t>
             </a:fld>
             <a:endParaRPr lang="en-GB"/>
           </a:p>
@@ -2940,7 +2940,7 @@
             <a:fld id="{4C8E3CB4-829C-4F19-9E86-B2AAEC36BD90}" type="datetime1">
               <a:rPr lang="en-GB" smtClean="0"/>
               <a:pPr/>
-              <a:t>19/04/16</a:t>
+              <a:t>11/05/17</a:t>
             </a:fld>
             <a:endParaRPr lang="en-GB"/>
           </a:p>
@@ -3032,7 +3032,7 @@
             <a:fld id="{D4A6FE01-96D8-461F-B1B2-1F0C16D98900}" type="datetime1">
               <a:rPr lang="en-GB" smtClean="0"/>
               <a:pPr/>
-              <a:t>19/04/16</a:t>
+              <a:t>11/05/17</a:t>
             </a:fld>
             <a:endParaRPr lang="en-GB"/>
           </a:p>
@@ -3306,7 +3306,7 @@
             <a:fld id="{B24CB088-CFF7-44C4-9CCE-18845754E6D4}" type="datetime1">
               <a:rPr lang="en-GB" smtClean="0"/>
               <a:pPr/>
-              <a:t>19/04/16</a:t>
+              <a:t>11/05/17</a:t>
             </a:fld>
             <a:endParaRPr lang="en-GB"/>
           </a:p>
@@ -3473,7 +3473,7 @@
             <a:fld id="{D65327FA-D1E5-40CA-8941-3DD0B6730F8A}" type="datetime1">
               <a:rPr lang="en-GB" smtClean="0"/>
               <a:pPr/>
-              <a:t>19/04/16</a:t>
+              <a:t>11/05/17</a:t>
             </a:fld>
             <a:endParaRPr lang="en-GB"/>
           </a:p>
@@ -3727,7 +3727,7 @@
             <a:fld id="{CD3A280C-4DEC-4EEC-BD59-A30886E06BA1}" type="datetime1">
               <a:rPr lang="en-GB" smtClean="0"/>
               <a:pPr/>
-              <a:t>19/04/16</a:t>
+              <a:t>11/05/17</a:t>
             </a:fld>
             <a:endParaRPr lang="en-GB"/>
           </a:p>
@@ -3894,7 +3894,7 @@
             <a:fld id="{8E5ADEB7-8139-4AC1-94DC-FE9E54B1CCD2}" type="datetime1">
               <a:rPr lang="en-GB" smtClean="0"/>
               <a:pPr/>
-              <a:t>19/04/16</a:t>
+              <a:t>11/05/17</a:t>
             </a:fld>
             <a:endParaRPr lang="en-GB"/>
           </a:p>
@@ -4071,7 +4071,7 @@
             <a:fld id="{9C77A686-1785-49A1-B4C9-55A3C7EEADE4}" type="datetime1">
               <a:rPr lang="en-GB" smtClean="0"/>
               <a:pPr/>
-              <a:t>19/04/16</a:t>
+              <a:t>11/05/17</a:t>
             </a:fld>
             <a:endParaRPr lang="en-GB"/>
           </a:p>
@@ -4621,7 +4621,7 @@
             <a:fld id="{DB33F153-90AC-449F-A303-26940247ABC8}" type="datetime1">
               <a:rPr lang="en-GB" smtClean="0"/>
               <a:pPr/>
-              <a:t>19/04/16</a:t>
+              <a:t>11/05/17</a:t>
             </a:fld>
             <a:endParaRPr lang="en-GB"/>
           </a:p>
@@ -4906,7 +4906,7 @@
             <a:fld id="{84E24492-3EA5-478D-9F72-7B8FF369DDEB}" type="datetime1">
               <a:rPr lang="en-GB" smtClean="0"/>
               <a:pPr/>
-              <a:t>19/04/16</a:t>
+              <a:t>11/05/17</a:t>
             </a:fld>
             <a:endParaRPr lang="en-GB"/>
           </a:p>
@@ -5325,7 +5325,7 @@
             <a:fld id="{43976A03-596E-4490-AE35-AFB744E08901}" type="datetime1">
               <a:rPr lang="en-GB" smtClean="0"/>
               <a:pPr/>
-              <a:t>19/04/16</a:t>
+              <a:t>11/05/17</a:t>
             </a:fld>
             <a:endParaRPr lang="en-GB"/>
           </a:p>
@@ -5440,7 +5440,7 @@
             <a:fld id="{4C8E3CB4-829C-4F19-9E86-B2AAEC36BD90}" type="datetime1">
               <a:rPr lang="en-GB" smtClean="0"/>
               <a:pPr/>
-              <a:t>19/04/16</a:t>
+              <a:t>11/05/17</a:t>
             </a:fld>
             <a:endParaRPr lang="en-GB"/>
           </a:p>
@@ -5532,7 +5532,7 @@
             <a:fld id="{D4A6FE01-96D8-461F-B1B2-1F0C16D98900}" type="datetime1">
               <a:rPr lang="en-GB" smtClean="0"/>
               <a:pPr/>
-              <a:t>19/04/16</a:t>
+              <a:t>11/05/17</a:t>
             </a:fld>
             <a:endParaRPr lang="en-GB"/>
           </a:p>
@@ -5806,7 +5806,7 @@
             <a:fld id="{B24CB088-CFF7-44C4-9CCE-18845754E6D4}" type="datetime1">
               <a:rPr lang="en-GB" smtClean="0"/>
               <a:pPr/>
-              <a:t>19/04/16</a:t>
+              <a:t>11/05/17</a:t>
             </a:fld>
             <a:endParaRPr lang="en-GB"/>
           </a:p>
@@ -6060,7 +6060,7 @@
             <a:fld id="{CD3A280C-4DEC-4EEC-BD59-A30886E06BA1}" type="datetime1">
               <a:rPr lang="en-GB" smtClean="0"/>
               <a:pPr/>
-              <a:t>19/04/16</a:t>
+              <a:t>11/05/17</a:t>
             </a:fld>
             <a:endParaRPr lang="en-GB"/>
           </a:p>
@@ -6270,7 +6270,7 @@
             <a:fld id="{E222BC38-3FAE-415B-AD1C-2D338E3D6B03}" type="datetime1">
               <a:rPr lang="en-GB" smtClean="0"/>
               <a:pPr/>
-              <a:t>19/04/16</a:t>
+              <a:t>11/05/17</a:t>
             </a:fld>
             <a:endParaRPr lang="en-GB"/>
           </a:p>
@@ -6778,7 +6778,7 @@
             <a:fld id="{E222BC38-3FAE-415B-AD1C-2D338E3D6B03}" type="datetime1">
               <a:rPr lang="en-GB" smtClean="0"/>
               <a:pPr/>
-              <a:t>19/04/16</a:t>
+              <a:t>11/05/17</a:t>
             </a:fld>
             <a:endParaRPr lang="en-GB"/>
           </a:p>
@@ -30611,7 +30611,7 @@
         </p:spPr>
         <p:txBody>
           <a:bodyPr>
-            <a:normAutofit fontScale="70000" lnSpcReduction="20000"/>
+            <a:normAutofit fontScale="85000" lnSpcReduction="20000"/>
           </a:bodyPr>
           <a:lstStyle/>
           <a:p>
@@ -30624,106 +30624,56 @@
           <a:p>
             <a:pPr lvl="1"/>
             <a:r>
+              <a:rPr lang="en-US" dirty="0" smtClean="0"/>
+              <a:t>OpenCL </a:t>
+            </a:r>
+            <a:r>
+              <a:rPr lang="en-US" dirty="0" smtClean="0"/>
+              <a:t>driver is built </a:t>
+            </a:r>
+            <a:r>
+              <a:rPr lang="en-US" dirty="0" smtClean="0"/>
+              <a:t>in</a:t>
+            </a:r>
+          </a:p>
+          <a:p>
+            <a:pPr lvl="1"/>
+            <a:r>
+              <a:rPr lang="en-US" dirty="0" smtClean="0"/>
+              <a:t>SDL2 (optional)</a:t>
+            </a:r>
+            <a:endParaRPr lang="en-US" dirty="0"/>
+          </a:p>
+          <a:p>
+            <a:endParaRPr lang="en-US" dirty="0"/>
+          </a:p>
+          <a:p>
+            <a:r>
+              <a:rPr lang="en-US" dirty="0" smtClean="0"/>
+              <a:t>Linux</a:t>
+            </a:r>
+            <a:endParaRPr lang="en-US" dirty="0" smtClean="0"/>
+          </a:p>
+          <a:p>
+            <a:pPr lvl="1"/>
+            <a:r>
+              <a:rPr lang="en-US" dirty="0" smtClean="0"/>
+              <a:t>Any </a:t>
+            </a:r>
+            <a:r>
               <a:rPr lang="en-US" dirty="0"/>
-              <a:t>l</a:t>
-            </a:r>
-            <a:r>
-              <a:rPr lang="en-US" dirty="0" smtClean="0"/>
-              <a:t>ibsdl2</a:t>
-            </a:r>
-          </a:p>
-          <a:p>
-            <a:pPr lvl="1"/>
-            <a:r>
-              <a:rPr lang="en-US" dirty="0" err="1" smtClean="0"/>
-              <a:t>OpenCL</a:t>
-            </a:r>
-            <a:r>
-              <a:rPr lang="en-US" dirty="0" smtClean="0"/>
-              <a:t> driver is built in</a:t>
-            </a:r>
-            <a:endParaRPr lang="en-US" dirty="0"/>
-          </a:p>
-          <a:p>
-            <a:endParaRPr lang="en-US" dirty="0"/>
-          </a:p>
-          <a:p>
-            <a:r>
-              <a:rPr lang="en-US" dirty="0" smtClean="0"/>
-              <a:t>Ubuntu 14.10+ / Linux</a:t>
-            </a:r>
-          </a:p>
-          <a:p>
-            <a:pPr lvl="1"/>
-            <a:r>
-              <a:rPr lang="en-US" dirty="0" smtClean="0"/>
-              <a:t>We installed these packages through apt-get</a:t>
-            </a:r>
-            <a:endParaRPr lang="en-US" dirty="0"/>
-          </a:p>
-          <a:p>
-            <a:pPr lvl="2"/>
-            <a:r>
-              <a:rPr lang="en-US" dirty="0" smtClean="0"/>
-              <a:t>mesa</a:t>
-            </a:r>
-            <a:r>
-              <a:rPr lang="en-US" dirty="0"/>
-              <a:t>-common-</a:t>
-            </a:r>
-            <a:r>
-              <a:rPr lang="en-US" dirty="0" err="1" smtClean="0"/>
-              <a:t>dev</a:t>
-            </a:r>
-            <a:endParaRPr lang="en-US" dirty="0" smtClean="0"/>
-          </a:p>
-          <a:p>
-            <a:pPr lvl="2"/>
-            <a:r>
-              <a:rPr lang="en-US" dirty="0" smtClean="0"/>
-              <a:t>libsdl2</a:t>
-            </a:r>
-            <a:r>
-              <a:rPr lang="en-US" dirty="0"/>
-              <a:t>-</a:t>
-            </a:r>
-            <a:r>
-              <a:rPr lang="en-US" dirty="0" smtClean="0"/>
-              <a:t>dev</a:t>
-            </a:r>
-          </a:p>
-          <a:p>
-            <a:pPr lvl="2"/>
-            <a:r>
-              <a:rPr lang="en-US" dirty="0" smtClean="0"/>
-              <a:t>libgl1</a:t>
-            </a:r>
-            <a:r>
-              <a:rPr lang="en-US" dirty="0"/>
-              <a:t>-mesa-</a:t>
-            </a:r>
-            <a:r>
-              <a:rPr lang="en-US" dirty="0" smtClean="0"/>
-              <a:t>glx</a:t>
-            </a:r>
-          </a:p>
-          <a:p>
-            <a:pPr lvl="1"/>
-            <a:r>
-              <a:rPr lang="en-US" dirty="0"/>
-              <a:t>Any </a:t>
-            </a:r>
-            <a:r>
-              <a:rPr lang="en-US" dirty="0" err="1"/>
-              <a:t>OpenCL</a:t>
-            </a:r>
-            <a:r>
-              <a:rPr lang="en-US" dirty="0"/>
-              <a:t> driver (e.g. NVIDIA, AMD or Intel</a:t>
+              <a:t>OpenCL driver (e.g. NVIDIA, AMD or Intel</a:t>
             </a:r>
             <a:r>
               <a:rPr lang="en-US" dirty="0" smtClean="0"/>
               <a:t>)</a:t>
+            </a:r>
+          </a:p>
+          <a:p>
+            <a:pPr lvl="1"/>
+            <a:r>
+              <a:rPr lang="en-US" dirty="0" smtClean="0"/>
+              <a:t>SDL2 (optional)</a:t>
             </a:r>
             <a:endParaRPr lang="en-US" dirty="0"/>
           </a:p>
@@ -30959,8 +30909,12 @@
                 <a:latin typeface="Courier New"/>
                 <a:cs typeface="Courier New"/>
               </a:rPr>
-              <a:t>workshop</a:t>
-            </a:r>
+              <a:t>iwocl2017</a:t>
+            </a:r>
+            <a:endParaRPr lang="en-US" dirty="0" smtClean="0">
+              <a:latin typeface="Courier New"/>
+              <a:cs typeface="Courier New"/>
+            </a:endParaRPr>
           </a:p>
           <a:p>
             <a:endParaRPr lang="en-US" b="1" dirty="0" smtClean="0">
@@ -30985,34 +30939,13 @@
           <a:p>
             <a:pPr lvl="1"/>
             <a:r>
-              <a:rPr lang="en-US" dirty="0" err="1" smtClean="0">
-                <a:solidFill>
-                  <a:srgbClr val="000000"/>
-                </a:solidFill>
-                <a:cs typeface="Courier New"/>
-              </a:rPr>
-              <a:t>yawai</a:t>
-            </a:r>
-            <a:r>
               <a:rPr lang="en-US" dirty="0" smtClean="0">
                 <a:solidFill>
                   <a:srgbClr val="000000"/>
                 </a:solidFill>
                 <a:cs typeface="Courier New"/>
               </a:rPr>
-              <a:t>: NVIDIA K40c, K20c</a:t>
-            </a:r>
-          </a:p>
-          <a:p>
-            <a:pPr lvl="1"/>
-            <a:r>
-              <a:rPr lang="en-US" dirty="0" err="1" smtClean="0">
-                <a:solidFill>
-                  <a:srgbClr val="000000"/>
-                </a:solidFill>
-                <a:cs typeface="Courier New"/>
-              </a:rPr>
-              <a:t>rekt</a:t>
+              <a:t>node20: </a:t>
             </a:r>
             <a:r>
               <a:rPr lang="en-US" dirty="0" smtClean="0">
@@ -31021,28 +30954,7 @@
                 </a:solidFill>
                 <a:cs typeface="Courier New"/>
               </a:rPr>
-              <a:t>: S9150, AMD A10-7850K APU</a:t>
-            </a:r>
-          </a:p>
-          <a:p>
-            <a:pPr lvl="1"/>
-            <a:r>
-              <a:rPr lang="en-US" dirty="0" err="1">
-                <a:solidFill>
-                  <a:srgbClr val="000000"/>
-                </a:solidFill>
-                <a:cs typeface="Courier New"/>
-              </a:rPr>
-              <a:t>o</a:t>
-            </a:r>
-            <a:r>
-              <a:rPr lang="en-US" dirty="0" err="1" smtClean="0">
-                <a:solidFill>
-                  <a:srgbClr val="000000"/>
-                </a:solidFill>
-                <a:cs typeface="Courier New"/>
-              </a:rPr>
-              <a:t>hmai</a:t>
+              <a:t>NVIDIA </a:t>
             </a:r>
             <a:r>
               <a:rPr lang="en-US" dirty="0" smtClean="0">
@@ -31051,28 +30963,7 @@
                 </a:solidFill>
                 <a:cs typeface="Courier New"/>
               </a:rPr>
-              <a:t>: NVIDIA GTX980, GTX580</a:t>
-            </a:r>
-          </a:p>
-          <a:p>
-            <a:pPr lvl="1"/>
-            <a:r>
-              <a:rPr lang="en-US" dirty="0" err="1">
-                <a:solidFill>
-                  <a:srgbClr val="000000"/>
-                </a:solidFill>
-                <a:cs typeface="Courier New"/>
-              </a:rPr>
-              <a:t>a</a:t>
-            </a:r>
-            <a:r>
-              <a:rPr lang="en-US" dirty="0" err="1" smtClean="0">
-                <a:solidFill>
-                  <a:srgbClr val="000000"/>
-                </a:solidFill>
-                <a:cs typeface="Courier New"/>
-              </a:rPr>
-              <a:t>wyiss</a:t>
+              <a:t>Tesla K40c</a:t>
             </a:r>
             <a:r>
               <a:rPr lang="en-US" dirty="0" smtClean="0">
@@ -31081,8 +30972,101 @@
                 </a:solidFill>
                 <a:cs typeface="Courier New"/>
               </a:rPr>
-              <a:t>: AMD R9295X2, S10000</a:t>
-            </a:r>
+              <a:t>, </a:t>
+            </a:r>
+            <a:r>
+              <a:rPr lang="en-US" dirty="0" smtClean="0">
+                <a:solidFill>
+                  <a:srgbClr val="000000"/>
+                </a:solidFill>
+                <a:cs typeface="Courier New"/>
+              </a:rPr>
+              <a:t>Tesla K20c</a:t>
+            </a:r>
+            <a:endParaRPr lang="en-US" dirty="0" smtClean="0">
+              <a:solidFill>
+                <a:srgbClr val="000000"/>
+              </a:solidFill>
+              <a:cs typeface="Courier New"/>
+            </a:endParaRPr>
+          </a:p>
+          <a:p>
+            <a:pPr lvl="1"/>
+            <a:r>
+              <a:rPr lang="en-US" dirty="0" smtClean="0">
+                <a:solidFill>
+                  <a:srgbClr val="000000"/>
+                </a:solidFill>
+                <a:cs typeface="Courier New"/>
+              </a:rPr>
+              <a:t>node22: NVIDIA GTX 980 Ti, GTX 780 Ti</a:t>
+            </a:r>
+          </a:p>
+          <a:p>
+            <a:pPr lvl="1"/>
+            <a:r>
+              <a:rPr lang="en-US" dirty="0" smtClean="0">
+                <a:solidFill>
+                  <a:srgbClr val="000000"/>
+                </a:solidFill>
+                <a:cs typeface="Courier New"/>
+              </a:rPr>
+              <a:t>node23: NVIDIA Titan X, GTX 1080 Ti</a:t>
+            </a:r>
+          </a:p>
+          <a:p>
+            <a:pPr lvl="1"/>
+            <a:r>
+              <a:rPr lang="en-US" dirty="0" smtClean="0">
+                <a:solidFill>
+                  <a:srgbClr val="000000"/>
+                </a:solidFill>
+                <a:cs typeface="Courier New"/>
+              </a:rPr>
+              <a:t>node31: AMD Fury X, R9 290 X</a:t>
+            </a:r>
+            <a:endParaRPr lang="en-US" dirty="0" smtClean="0">
+              <a:solidFill>
+                <a:srgbClr val="000000"/>
+              </a:solidFill>
+              <a:cs typeface="Courier New"/>
+            </a:endParaRPr>
+          </a:p>
+          <a:p>
+            <a:pPr lvl="1"/>
+            <a:r>
+              <a:rPr lang="en-US" dirty="0" smtClean="0">
+                <a:solidFill>
+                  <a:srgbClr val="000000"/>
+                </a:solidFill>
+                <a:cs typeface="Courier New"/>
+              </a:rPr>
+              <a:t>node32: </a:t>
+            </a:r>
+            <a:r>
+              <a:rPr lang="en-US" dirty="0" smtClean="0">
+                <a:solidFill>
+                  <a:srgbClr val="000000"/>
+                </a:solidFill>
+                <a:cs typeface="Courier New"/>
+              </a:rPr>
+              <a:t>AMD </a:t>
+            </a:r>
+            <a:r>
+              <a:rPr lang="en-US" dirty="0" smtClean="0">
+                <a:solidFill>
+                  <a:srgbClr val="000000"/>
+                </a:solidFill>
+                <a:cs typeface="Courier New"/>
+              </a:rPr>
+              <a:t>RX 480</a:t>
+            </a:r>
+            <a:endParaRPr lang="en-US" dirty="0" smtClean="0">
+              <a:solidFill>
+                <a:srgbClr val="000000"/>
+              </a:solidFill>
+              <a:cs typeface="Courier New"/>
+            </a:endParaRPr>
           </a:p>
           <a:p>
             <a:endParaRPr lang="en-US" b="1" dirty="0" smtClean="0">
@@ -31100,16 +31084,7 @@
                 </a:solidFill>
                 <a:cs typeface="Courier New"/>
               </a:rPr>
-              <a:t>Load the Intel </a:t>
-            </a:r>
-            <a:r>
-              <a:rPr lang="en-US" b="1" dirty="0" err="1" smtClean="0">
-                <a:solidFill>
-                  <a:srgbClr val="000000"/>
-                </a:solidFill>
-                <a:cs typeface="Courier New"/>
-              </a:rPr>
-              <a:t>OpenCL</a:t>
+              <a:t>Load the Intel OpenCL </a:t>
             </a:r>
             <a:r>
               <a:rPr lang="en-US" b="1" dirty="0" smtClean="0">
@@ -31118,8 +31093,23 @@
                 </a:solidFill>
                 <a:cs typeface="Courier New"/>
               </a:rPr>
-              <a:t> SDK (for CPUs) with</a:t>
-            </a:r>
+              <a:t>CPU </a:t>
+            </a:r>
+            <a:r>
+              <a:rPr lang="en-US" b="1" dirty="0" smtClean="0">
+                <a:solidFill>
+                  <a:srgbClr val="000000"/>
+                </a:solidFill>
+                <a:cs typeface="Courier New"/>
+              </a:rPr>
+              <a:t>runtime with</a:t>
+            </a:r>
+            <a:endParaRPr lang="en-US" b="1" dirty="0" smtClean="0">
+              <a:solidFill>
+                <a:srgbClr val="000000"/>
+              </a:solidFill>
+              <a:cs typeface="Courier New"/>
+            </a:endParaRPr>
           </a:p>
           <a:p>
             <a:pPr marL="0" indent="0">
@@ -31132,6 +31122,10 @@
             <a:r>
               <a:rPr lang="en-US" dirty="0" smtClean="0"/>
               <a:t>  </a:t>
+            </a:r>
+            <a:r>
+              <a:rPr lang="en-US" dirty="0" smtClean="0"/>
+              <a:t>     </a:t>
             </a:r>
             <a:r>
               <a:rPr lang="en-US" sz="2600" dirty="0" smtClean="0">
@@ -31148,32 +31142,32 @@
               <a:t>load </a:t>
             </a:r>
             <a:r>
-              <a:rPr lang="en-US" sz="2600" dirty="0" err="1">
+              <a:rPr lang="en-US" sz="2600" dirty="0" err="1" smtClean="0">
                 <a:latin typeface="Courier New"/>
                 <a:cs typeface="Courier New"/>
               </a:rPr>
-              <a:t>sdks</a:t>
-            </a:r>
-            <a:r>
-              <a:rPr lang="en-US" sz="2600" dirty="0">
+              <a:t>intel</a:t>
+            </a:r>
+            <a:r>
+              <a:rPr lang="en-US" sz="2600" dirty="0" smtClean="0">
                 <a:latin typeface="Courier New"/>
                 <a:cs typeface="Courier New"/>
               </a:rPr>
               <a:t>/</a:t>
             </a:r>
             <a:r>
-              <a:rPr lang="en-US" sz="2600" dirty="0" err="1">
+              <a:rPr lang="en-US" sz="2600" dirty="0" err="1" smtClean="0">
                 <a:latin typeface="Courier New"/>
                 <a:cs typeface="Courier New"/>
               </a:rPr>
-              <a:t>intel-opencl</a:t>
-            </a:r>
-            <a:r>
-              <a:rPr lang="en-US" sz="2600" dirty="0">
+              <a:t>opencl</a:t>
+            </a:r>
+            <a:r>
+              <a:rPr lang="en-US" sz="2600" dirty="0" smtClean="0">
                 <a:latin typeface="Courier New"/>
                 <a:cs typeface="Courier New"/>
               </a:rPr>
-              <a:t>/4.6.0.92</a:t>
+              <a:t>/16.1.1</a:t>
             </a:r>
             <a:endParaRPr lang="en-US" b="1" dirty="0">
               <a:solidFill>

</xml_diff>

<commit_message>
Replace make_kernel with KernelFunctor in intro slides
</commit_message>
<xml_diff>
--- a/slides/advanced_intro.pptx
+++ b/slides/advanced_intro.pptx
@@ -264,7 +264,7 @@
             <a:fld id="{92597E5C-85BB-4669-9209-B5E04E6ED101}" type="datetimeFigureOut">
               <a:rPr lang="en-GB" smtClean="0"/>
               <a:pPr/>
-              <a:t>11/05/17</a:t>
+              <a:t>12/05/17</a:t>
             </a:fld>
             <a:endParaRPr lang="en-GB"/>
           </a:p>
@@ -1128,7 +1128,7 @@
             <a:fld id="{19E03964-7D59-4BF8-AE10-3A215A42C3E4}" type="datetime1">
               <a:rPr lang="en-GB" smtClean="0"/>
               <a:pPr/>
-              <a:t>11/05/17</a:t>
+              <a:t>12/05/17</a:t>
             </a:fld>
             <a:endParaRPr lang="en-GB"/>
           </a:p>
@@ -1295,7 +1295,7 @@
             <a:fld id="{8E5ADEB7-8139-4AC1-94DC-FE9E54B1CCD2}" type="datetime1">
               <a:rPr lang="en-GB" smtClean="0"/>
               <a:pPr/>
-              <a:t>11/05/17</a:t>
+              <a:t>12/05/17</a:t>
             </a:fld>
             <a:endParaRPr lang="en-GB"/>
           </a:p>
@@ -1472,7 +1472,7 @@
             <a:fld id="{9C77A686-1785-49A1-B4C9-55A3C7EEADE4}" type="datetime1">
               <a:rPr lang="en-GB" smtClean="0"/>
               <a:pPr/>
-              <a:t>11/05/17</a:t>
+              <a:t>12/05/17</a:t>
             </a:fld>
             <a:endParaRPr lang="en-GB"/>
           </a:p>
@@ -1711,7 +1711,7 @@
             <a:fld id="{19E03964-7D59-4BF8-AE10-3A215A42C3E4}" type="datetime1">
               <a:rPr lang="en-GB" smtClean="0"/>
               <a:pPr/>
-              <a:t>11/05/17</a:t>
+              <a:t>12/05/17</a:t>
             </a:fld>
             <a:endParaRPr lang="en-GB"/>
           </a:p>
@@ -1878,7 +1878,7 @@
             <a:fld id="{D65327FA-D1E5-40CA-8941-3DD0B6730F8A}" type="datetime1">
               <a:rPr lang="en-GB" smtClean="0"/>
               <a:pPr/>
-              <a:t>11/05/17</a:t>
+              <a:t>12/05/17</a:t>
             </a:fld>
             <a:endParaRPr lang="en-GB"/>
           </a:p>
@@ -2121,7 +2121,7 @@
             <a:fld id="{DB33F153-90AC-449F-A303-26940247ABC8}" type="datetime1">
               <a:rPr lang="en-GB" smtClean="0"/>
               <a:pPr/>
-              <a:t>11/05/17</a:t>
+              <a:t>12/05/17</a:t>
             </a:fld>
             <a:endParaRPr lang="en-GB"/>
           </a:p>
@@ -2406,7 +2406,7 @@
             <a:fld id="{84E24492-3EA5-478D-9F72-7B8FF369DDEB}" type="datetime1">
               <a:rPr lang="en-GB" smtClean="0"/>
               <a:pPr/>
-              <a:t>11/05/17</a:t>
+              <a:t>12/05/17</a:t>
             </a:fld>
             <a:endParaRPr lang="en-GB"/>
           </a:p>
@@ -2825,7 +2825,7 @@
             <a:fld id="{43976A03-596E-4490-AE35-AFB744E08901}" type="datetime1">
               <a:rPr lang="en-GB" smtClean="0"/>
               <a:pPr/>
-              <a:t>11/05/17</a:t>
+              <a:t>12/05/17</a:t>
             </a:fld>
             <a:endParaRPr lang="en-GB"/>
           </a:p>
@@ -2940,7 +2940,7 @@
             <a:fld id="{4C8E3CB4-829C-4F19-9E86-B2AAEC36BD90}" type="datetime1">
               <a:rPr lang="en-GB" smtClean="0"/>
               <a:pPr/>
-              <a:t>11/05/17</a:t>
+              <a:t>12/05/17</a:t>
             </a:fld>
             <a:endParaRPr lang="en-GB"/>
           </a:p>
@@ -3032,7 +3032,7 @@
             <a:fld id="{D4A6FE01-96D8-461F-B1B2-1F0C16D98900}" type="datetime1">
               <a:rPr lang="en-GB" smtClean="0"/>
               <a:pPr/>
-              <a:t>11/05/17</a:t>
+              <a:t>12/05/17</a:t>
             </a:fld>
             <a:endParaRPr lang="en-GB"/>
           </a:p>
@@ -3306,7 +3306,7 @@
             <a:fld id="{B24CB088-CFF7-44C4-9CCE-18845754E6D4}" type="datetime1">
               <a:rPr lang="en-GB" smtClean="0"/>
               <a:pPr/>
-              <a:t>11/05/17</a:t>
+              <a:t>12/05/17</a:t>
             </a:fld>
             <a:endParaRPr lang="en-GB"/>
           </a:p>
@@ -3473,7 +3473,7 @@
             <a:fld id="{D65327FA-D1E5-40CA-8941-3DD0B6730F8A}" type="datetime1">
               <a:rPr lang="en-GB" smtClean="0"/>
               <a:pPr/>
-              <a:t>11/05/17</a:t>
+              <a:t>12/05/17</a:t>
             </a:fld>
             <a:endParaRPr lang="en-GB"/>
           </a:p>
@@ -3727,7 +3727,7 @@
             <a:fld id="{CD3A280C-4DEC-4EEC-BD59-A30886E06BA1}" type="datetime1">
               <a:rPr lang="en-GB" smtClean="0"/>
               <a:pPr/>
-              <a:t>11/05/17</a:t>
+              <a:t>12/05/17</a:t>
             </a:fld>
             <a:endParaRPr lang="en-GB"/>
           </a:p>
@@ -3894,7 +3894,7 @@
             <a:fld id="{8E5ADEB7-8139-4AC1-94DC-FE9E54B1CCD2}" type="datetime1">
               <a:rPr lang="en-GB" smtClean="0"/>
               <a:pPr/>
-              <a:t>11/05/17</a:t>
+              <a:t>12/05/17</a:t>
             </a:fld>
             <a:endParaRPr lang="en-GB"/>
           </a:p>
@@ -4071,7 +4071,7 @@
             <a:fld id="{9C77A686-1785-49A1-B4C9-55A3C7EEADE4}" type="datetime1">
               <a:rPr lang="en-GB" smtClean="0"/>
               <a:pPr/>
-              <a:t>11/05/17</a:t>
+              <a:t>12/05/17</a:t>
             </a:fld>
             <a:endParaRPr lang="en-GB"/>
           </a:p>
@@ -4621,7 +4621,7 @@
             <a:fld id="{DB33F153-90AC-449F-A303-26940247ABC8}" type="datetime1">
               <a:rPr lang="en-GB" smtClean="0"/>
               <a:pPr/>
-              <a:t>11/05/17</a:t>
+              <a:t>12/05/17</a:t>
             </a:fld>
             <a:endParaRPr lang="en-GB"/>
           </a:p>
@@ -4906,7 +4906,7 @@
             <a:fld id="{84E24492-3EA5-478D-9F72-7B8FF369DDEB}" type="datetime1">
               <a:rPr lang="en-GB" smtClean="0"/>
               <a:pPr/>
-              <a:t>11/05/17</a:t>
+              <a:t>12/05/17</a:t>
             </a:fld>
             <a:endParaRPr lang="en-GB"/>
           </a:p>
@@ -5325,7 +5325,7 @@
             <a:fld id="{43976A03-596E-4490-AE35-AFB744E08901}" type="datetime1">
               <a:rPr lang="en-GB" smtClean="0"/>
               <a:pPr/>
-              <a:t>11/05/17</a:t>
+              <a:t>12/05/17</a:t>
             </a:fld>
             <a:endParaRPr lang="en-GB"/>
           </a:p>
@@ -5440,7 +5440,7 @@
             <a:fld id="{4C8E3CB4-829C-4F19-9E86-B2AAEC36BD90}" type="datetime1">
               <a:rPr lang="en-GB" smtClean="0"/>
               <a:pPr/>
-              <a:t>11/05/17</a:t>
+              <a:t>12/05/17</a:t>
             </a:fld>
             <a:endParaRPr lang="en-GB"/>
           </a:p>
@@ -5532,7 +5532,7 @@
             <a:fld id="{D4A6FE01-96D8-461F-B1B2-1F0C16D98900}" type="datetime1">
               <a:rPr lang="en-GB" smtClean="0"/>
               <a:pPr/>
-              <a:t>11/05/17</a:t>
+              <a:t>12/05/17</a:t>
             </a:fld>
             <a:endParaRPr lang="en-GB"/>
           </a:p>
@@ -5806,7 +5806,7 @@
             <a:fld id="{B24CB088-CFF7-44C4-9CCE-18845754E6D4}" type="datetime1">
               <a:rPr lang="en-GB" smtClean="0"/>
               <a:pPr/>
-              <a:t>11/05/17</a:t>
+              <a:t>12/05/17</a:t>
             </a:fld>
             <a:endParaRPr lang="en-GB"/>
           </a:p>
@@ -6060,7 +6060,7 @@
             <a:fld id="{CD3A280C-4DEC-4EEC-BD59-A30886E06BA1}" type="datetime1">
               <a:rPr lang="en-GB" smtClean="0"/>
               <a:pPr/>
-              <a:t>11/05/17</a:t>
+              <a:t>12/05/17</a:t>
             </a:fld>
             <a:endParaRPr lang="en-GB"/>
           </a:p>
@@ -6270,7 +6270,7 @@
             <a:fld id="{E222BC38-3FAE-415B-AD1C-2D338E3D6B03}" type="datetime1">
               <a:rPr lang="en-GB" smtClean="0"/>
               <a:pPr/>
-              <a:t>11/05/17</a:t>
+              <a:t>12/05/17</a:t>
             </a:fld>
             <a:endParaRPr lang="en-GB"/>
           </a:p>
@@ -6778,7 +6778,7 @@
             <a:fld id="{E222BC38-3FAE-415B-AD1C-2D338E3D6B03}" type="datetime1">
               <a:rPr lang="en-GB" smtClean="0"/>
               <a:pPr/>
-              <a:t>11/05/17</a:t>
+              <a:t>12/05/17</a:t>
             </a:fld>
             <a:endParaRPr lang="en-GB"/>
           </a:p>
@@ -28900,12 +28900,20 @@
               <a:t>Khronos has defined a common C++ header file containing a high level interface to OpenCL, </a:t>
             </a:r>
             <a:r>
+              <a:rPr lang="en-GB" dirty="0" smtClean="0">
+                <a:solidFill>
+                  <a:schemeClr val="accent6"/>
+                </a:solidFill>
+              </a:rPr>
+              <a:t>cl2.</a:t>
+            </a:r>
+            <a:r>
               <a:rPr lang="en-GB" dirty="0">
                 <a:solidFill>
                   <a:schemeClr val="accent6"/>
                 </a:solidFill>
               </a:rPr>
-              <a:t>cl.hpp</a:t>
+              <a:t>hpp</a:t>
             </a:r>
           </a:p>
           <a:p>
@@ -29568,13 +29576,19 @@
                 </a:solidFill>
                 <a:latin typeface="Courier New Bold"/>
               </a:rPr>
-              <a:t>make_kernel</a:t>
+              <a:t>KernelFunctor</a:t>
             </a:r>
             <a:r>
               <a:rPr lang="en-GB" sz="1200" b="1" dirty="0" smtClean="0">
                 <a:latin typeface="Courier New Bold"/>
               </a:rPr>
-              <a:t>&lt;Buffer, Buffer, Buffer&gt;</a:t>
+              <a:t>&lt;</a:t>
+            </a:r>
+            <a:r>
+              <a:rPr lang="en-GB" sz="1200" b="1" dirty="0" smtClean="0">
+                <a:latin typeface="Courier New Bold"/>
+              </a:rPr>
+              <a:t>Buffer, Buffer, Buffer&gt;</a:t>
             </a:r>
           </a:p>
           <a:p>
@@ -30625,15 +30639,7 @@
             <a:pPr lvl="1"/>
             <a:r>
               <a:rPr lang="en-US" dirty="0" smtClean="0"/>
-              <a:t>OpenCL </a:t>
-            </a:r>
-            <a:r>
-              <a:rPr lang="en-US" dirty="0" smtClean="0"/>
-              <a:t>driver is built </a:t>
-            </a:r>
-            <a:r>
-              <a:rPr lang="en-US" dirty="0" smtClean="0"/>
-              <a:t>in</a:t>
+              <a:t>OpenCL driver is built in</a:t>
             </a:r>
           </a:p>
           <a:p>
@@ -30652,7 +30658,6 @@
               <a:rPr lang="en-US" dirty="0" smtClean="0"/>
               <a:t>Linux</a:t>
             </a:r>
-            <a:endParaRPr lang="en-US" dirty="0" smtClean="0"/>
           </a:p>
           <a:p>
             <a:pPr lvl="1"/>
@@ -30911,10 +30916,6 @@
               </a:rPr>
               <a:t>iwocl2017</a:t>
             </a:r>
-            <a:endParaRPr lang="en-US" dirty="0" smtClean="0">
-              <a:latin typeface="Courier New"/>
-              <a:cs typeface="Courier New"/>
-            </a:endParaRPr>
           </a:p>
           <a:p>
             <a:endParaRPr lang="en-US" b="1" dirty="0" smtClean="0">
@@ -30945,50 +30946,8 @@
                 </a:solidFill>
                 <a:cs typeface="Courier New"/>
               </a:rPr>
-              <a:t>node20: </a:t>
-            </a:r>
-            <a:r>
-              <a:rPr lang="en-US" dirty="0" smtClean="0">
-                <a:solidFill>
-                  <a:srgbClr val="000000"/>
-                </a:solidFill>
-                <a:cs typeface="Courier New"/>
-              </a:rPr>
-              <a:t>NVIDIA </a:t>
-            </a:r>
-            <a:r>
-              <a:rPr lang="en-US" dirty="0" smtClean="0">
-                <a:solidFill>
-                  <a:srgbClr val="000000"/>
-                </a:solidFill>
-                <a:cs typeface="Courier New"/>
-              </a:rPr>
-              <a:t>Tesla K40c</a:t>
-            </a:r>
-            <a:r>
-              <a:rPr lang="en-US" dirty="0" smtClean="0">
-                <a:solidFill>
-                  <a:srgbClr val="000000"/>
-                </a:solidFill>
-                <a:cs typeface="Courier New"/>
-              </a:rPr>
-              <a:t>, </a:t>
-            </a:r>
-            <a:r>
-              <a:rPr lang="en-US" dirty="0" smtClean="0">
-                <a:solidFill>
-                  <a:srgbClr val="000000"/>
-                </a:solidFill>
-                <a:cs typeface="Courier New"/>
-              </a:rPr>
-              <a:t>Tesla K20c</a:t>
-            </a:r>
-            <a:endParaRPr lang="en-US" dirty="0" smtClean="0">
-              <a:solidFill>
-                <a:srgbClr val="000000"/>
-              </a:solidFill>
-              <a:cs typeface="Courier New"/>
-            </a:endParaRPr>
+              <a:t>node20: NVIDIA Tesla K40c, Tesla K20c</a:t>
+            </a:r>
           </a:p>
           <a:p>
             <a:pPr lvl="1"/>
@@ -31025,12 +30984,6 @@
               </a:rPr>
               <a:t>node31: AMD Fury X, R9 290 X</a:t>
             </a:r>
-            <a:endParaRPr lang="en-US" dirty="0" smtClean="0">
-              <a:solidFill>
-                <a:srgbClr val="000000"/>
-              </a:solidFill>
-              <a:cs typeface="Courier New"/>
-            </a:endParaRPr>
           </a:p>
           <a:p>
             <a:pPr lvl="1"/>
@@ -31041,32 +30994,8 @@
                 </a:solidFill>
                 <a:cs typeface="Courier New"/>
               </a:rPr>
-              <a:t>node32: </a:t>
-            </a:r>
-            <a:r>
-              <a:rPr lang="en-US" dirty="0" smtClean="0">
-                <a:solidFill>
-                  <a:srgbClr val="000000"/>
-                </a:solidFill>
-                <a:cs typeface="Courier New"/>
-              </a:rPr>
-              <a:t>AMD </a:t>
-            </a:r>
-            <a:r>
-              <a:rPr lang="en-US" dirty="0" smtClean="0">
-                <a:solidFill>
-                  <a:srgbClr val="000000"/>
-                </a:solidFill>
-                <a:cs typeface="Courier New"/>
-              </a:rPr>
-              <a:t>RX 480</a:t>
-            </a:r>
-            <a:endParaRPr lang="en-US" dirty="0" smtClean="0">
-              <a:solidFill>
-                <a:srgbClr val="000000"/>
-              </a:solidFill>
-              <a:cs typeface="Courier New"/>
-            </a:endParaRPr>
+              <a:t>node32: AMD RX 480</a:t>
+            </a:r>
           </a:p>
           <a:p>
             <a:endParaRPr lang="en-US" b="1" dirty="0" smtClean="0">
@@ -31084,32 +31013,8 @@
                 </a:solidFill>
                 <a:cs typeface="Courier New"/>
               </a:rPr>
-              <a:t>Load the Intel OpenCL </a:t>
-            </a:r>
-            <a:r>
-              <a:rPr lang="en-US" b="1" dirty="0" smtClean="0">
-                <a:solidFill>
-                  <a:srgbClr val="000000"/>
-                </a:solidFill>
-                <a:cs typeface="Courier New"/>
-              </a:rPr>
-              <a:t>CPU </a:t>
-            </a:r>
-            <a:r>
-              <a:rPr lang="en-US" b="1" dirty="0" smtClean="0">
-                <a:solidFill>
-                  <a:srgbClr val="000000"/>
-                </a:solidFill>
-                <a:cs typeface="Courier New"/>
-              </a:rPr>
-              <a:t>runtime with</a:t>
-            </a:r>
-            <a:endParaRPr lang="en-US" b="1" dirty="0" smtClean="0">
-              <a:solidFill>
-                <a:srgbClr val="000000"/>
-              </a:solidFill>
-              <a:cs typeface="Courier New"/>
-            </a:endParaRPr>
+              <a:t>Load the Intel OpenCL CPU runtime with</a:t>
+            </a:r>
           </a:p>
           <a:p>
             <a:pPr marL="0" indent="0">
@@ -31121,11 +31026,7 @@
             </a:r>
             <a:r>
               <a:rPr lang="en-US" dirty="0" smtClean="0"/>
-              <a:t>  </a:t>
-            </a:r>
-            <a:r>
-              <a:rPr lang="en-US" dirty="0" smtClean="0"/>
-              <a:t>     </a:t>
+              <a:t>       </a:t>
             </a:r>
             <a:r>
               <a:rPr lang="en-US" sz="2600" dirty="0" smtClean="0">

</xml_diff>